<commit_message>
final updates to Packages in Go topic
</commit_message>
<xml_diff>
--- a/packages/Packages.pptx
+++ b/packages/Packages.pptx
@@ -20,6 +20,7 @@
     <p:sldId id="265" r:id="rId17"/>
     <p:sldId id="266" r:id="rId18"/>
     <p:sldId id="267" r:id="rId19"/>
+    <p:sldId id="268" r:id="rId20"/>
   </p:sldIdLst>
   <p:sldSz cx="24384000" cy="13716000"/>
   <p:notesSz cx="6858000" cy="9144000"/>
@@ -6516,13 +6517,13 @@
       </p:par>
     </p:tnLst>
     <p:bldLst>
+      <p:bldP build="whole" bldLvl="1" animBg="1" rev="0" advAuto="0" spid="577" grpId="5"/>
+      <p:bldP build="whole" bldLvl="1" animBg="1" rev="0" advAuto="0" spid="570" grpId="4"/>
       <p:bldP build="whole" bldLvl="1" animBg="1" rev="0" advAuto="0" spid="579" grpId="6"/>
-      <p:bldP build="whole" bldLvl="1" animBg="1" rev="0" advAuto="0" spid="577" grpId="5"/>
+      <p:bldP build="whole" bldLvl="1" animBg="1" rev="0" advAuto="0" spid="579" grpId="7"/>
       <p:bldP build="whole" bldLvl="1" animBg="1" rev="0" advAuto="0" spid="567" grpId="2"/>
-      <p:bldP build="whole" bldLvl="1" animBg="1" rev="0" advAuto="0" spid="579" grpId="7"/>
+      <p:bldP build="whole" bldLvl="1" animBg="1" rev="0" advAuto="0" spid="576" grpId="3"/>
       <p:bldP build="whole" bldLvl="1" animBg="1" rev="0" advAuto="0" spid="573" grpId="1"/>
-      <p:bldP build="whole" bldLvl="1" animBg="1" rev="0" advAuto="0" spid="576" grpId="3"/>
-      <p:bldP build="whole" bldLvl="1" animBg="1" rev="0" advAuto="0" spid="570" grpId="4"/>
     </p:bldLst>
   </p:timing>
 </p:sld>
@@ -6722,7 +6723,7 @@
         <p:spPr>
           <a:xfrm>
             <a:off x="2198371" y="5872162"/>
-            <a:ext cx="9411374" cy="1971676"/>
+            <a:ext cx="13713829" cy="1971676"/>
           </a:xfrm>
           <a:prstGeom prst="rect">
             <a:avLst/>
@@ -6768,21 +6769,21 @@
               </a:defRPr>
             </a:pPr>
             <a:r>
-              <a:t>of the same package</a:t>
+              <a:t>of the same package &amp; outside the package</a:t>
             </a:r>
           </a:p>
         </p:txBody>
       </p:sp>
       <p:sp>
         <p:nvSpPr>
-          <p:cNvPr id="586" name="Visible &amp; accessible inside the package, and…"/>
+          <p:cNvPr id="586" name="Visible &amp; accessible inside all files of the…"/>
           <p:cNvSpPr txBox="1"/>
           <p:nvPr/>
         </p:nvSpPr>
         <p:spPr>
           <a:xfrm>
             <a:off x="2198371" y="10117210"/>
-            <a:ext cx="14063168" cy="1971676"/>
+            <a:ext cx="13884796" cy="1971676"/>
           </a:xfrm>
           <a:prstGeom prst="rect">
             <a:avLst/>
@@ -6813,7 +6814,7 @@
               </a:defRPr>
             </a:pPr>
             <a:r>
-              <a:t>Visible &amp; accessible inside the package, and </a:t>
+              <a:t>Visible &amp; accessible inside all files of the</a:t>
             </a:r>
           </a:p>
           <a:p>
@@ -6828,7 +6829,7 @@
               </a:defRPr>
             </a:pPr>
             <a:r>
-              <a:t>inaccessible outside of it</a:t>
+              <a:t>same package, and inaccessible outside of it</a:t>
             </a:r>
           </a:p>
         </p:txBody>
@@ -6842,7 +6843,7 @@
         <p:spPr>
           <a:xfrm>
             <a:off x="2243566" y="5729320"/>
-            <a:ext cx="9411375" cy="204964"/>
+            <a:ext cx="14081836" cy="204964"/>
           </a:xfrm>
           <a:prstGeom prst="rect">
             <a:avLst/>
@@ -6887,7 +6888,7 @@
         <p:spPr>
           <a:xfrm>
             <a:off x="2243566" y="9874636"/>
-            <a:ext cx="13972778" cy="204965"/>
+            <a:ext cx="14081836" cy="204965"/>
           </a:xfrm>
           <a:prstGeom prst="rect">
             <a:avLst/>
@@ -7392,12 +7393,12 @@
       </p:par>
     </p:tnLst>
     <p:bldLst>
+      <p:bldP build="whole" bldLvl="1" animBg="1" rev="0" advAuto="0" spid="587" grpId="2"/>
+      <p:bldP build="whole" bldLvl="1" animBg="1" rev="0" advAuto="0" spid="583" grpId="1"/>
       <p:bldP build="whole" bldLvl="1" animBg="1" rev="0" advAuto="0" spid="585" grpId="3"/>
-      <p:bldP build="whole" bldLvl="1" animBg="1" rev="0" advAuto="0" spid="587" grpId="2"/>
       <p:bldP build="whole" bldLvl="1" animBg="1" rev="0" advAuto="0" spid="584" grpId="4"/>
+      <p:bldP build="whole" bldLvl="1" animBg="1" rev="0" advAuto="0" spid="586" grpId="6"/>
       <p:bldP build="whole" bldLvl="1" animBg="1" rev="0" advAuto="0" spid="588" grpId="5"/>
-      <p:bldP build="whole" bldLvl="1" animBg="1" rev="0" advAuto="0" spid="586" grpId="6"/>
-      <p:bldP build="whole" bldLvl="1" animBg="1" rev="0" advAuto="0" spid="583" grpId="1"/>
     </p:bldLst>
   </p:timing>
 </p:sld>
@@ -8997,20 +8998,1426 @@
       </p:par>
     </p:tnLst>
     <p:bldLst>
+      <p:bldP build="whole" bldLvl="1" animBg="1" rev="0" advAuto="0" spid="605" grpId="5"/>
+      <p:bldP build="whole" bldLvl="1" animBg="1" rev="0" advAuto="0" spid="608" grpId="3"/>
+      <p:bldP build="whole" bldLvl="1" animBg="1" rev="0" advAuto="0" spid="607" grpId="10"/>
+      <p:bldP build="whole" bldLvl="1" animBg="1" rev="0" advAuto="0" spid="600" grpId="14"/>
+      <p:bldP build="whole" bldLvl="1" animBg="1" rev="0" advAuto="0" spid="604" grpId="2"/>
+      <p:bldP build="whole" bldLvl="1" animBg="1" rev="0" advAuto="0" spid="598" grpId="4"/>
+      <p:bldP build="whole" bldLvl="1" animBg="1" rev="0" advAuto="0" spid="612" grpId="6"/>
+      <p:bldP build="whole" bldLvl="1" animBg="1" rev="0" advAuto="0" spid="614" grpId="9"/>
       <p:bldP build="whole" bldLvl="1" animBg="1" rev="0" advAuto="0" spid="597" grpId="1"/>
-      <p:bldP build="whole" bldLvl="1" animBg="1" rev="0" advAuto="0" spid="600" grpId="14"/>
       <p:bldP build="whole" bldLvl="1" animBg="1" rev="0" advAuto="0" spid="606" grpId="7"/>
-      <p:bldP build="whole" bldLvl="1" animBg="1" rev="0" advAuto="0" spid="598" grpId="4"/>
+      <p:bldP build="whole" bldLvl="1" animBg="1" rev="0" advAuto="0" spid="610" grpId="12"/>
+      <p:bldP build="whole" bldLvl="1" animBg="1" rev="0" advAuto="0" spid="599" grpId="13"/>
       <p:bldP build="whole" bldLvl="1" animBg="1" rev="0" advAuto="0" spid="616" grpId="8"/>
-      <p:bldP build="whole" bldLvl="1" animBg="1" rev="0" advAuto="0" spid="607" grpId="10"/>
       <p:bldP build="whole" bldLvl="1" animBg="1" rev="0" advAuto="0" spid="617" grpId="11"/>
-      <p:bldP build="whole" bldLvl="1" animBg="1" rev="0" advAuto="0" spid="608" grpId="3"/>
-      <p:bldP build="whole" bldLvl="1" animBg="1" rev="0" advAuto="0" spid="610" grpId="12"/>
-      <p:bldP build="whole" bldLvl="1" animBg="1" rev="0" advAuto="0" spid="612" grpId="6"/>
-      <p:bldP build="whole" bldLvl="1" animBg="1" rev="0" advAuto="0" spid="599" grpId="13"/>
-      <p:bldP build="whole" bldLvl="1" animBg="1" rev="0" advAuto="0" spid="604" grpId="2"/>
-      <p:bldP build="whole" bldLvl="1" animBg="1" rev="0" advAuto="0" spid="605" grpId="5"/>
-      <p:bldP build="whole" bldLvl="1" animBg="1" rev="0" advAuto="0" spid="614" grpId="9"/>
+    </p:bldLst>
+  </p:timing>
+</p:sld>
+</file>
+
+<file path=ppt/slides/slide13.xml><?xml version="1.0" encoding="utf-8"?>
+<p:sld xmlns:a="http://schemas.openxmlformats.org/drawingml/2006/main" xmlns:r="http://schemas.openxmlformats.org/officeDocument/2006/relationships" xmlns:p="http://schemas.openxmlformats.org/presentationml/2006/main" xmlns:m="http://schemas.openxmlformats.org/officeDocument/2006/math" xmlns:a14="http://schemas.microsoft.com/office/drawing/2010/main" showMasterSp="1" showMasterPhAnim="1">
+  <p:cSld>
+    <p:bg>
+      <p:bgPr>
+        <a:solidFill>
+          <a:srgbClr val="002833"/>
+        </a:solidFill>
+      </p:bgPr>
+    </p:bg>
+    <p:spTree>
+      <p:nvGrpSpPr>
+        <p:cNvPr id="1" name=""/>
+        <p:cNvGrpSpPr/>
+        <p:nvPr/>
+      </p:nvGrpSpPr>
+      <p:grpSpPr>
+        <a:xfrm>
+          <a:off x="0" y="0"/>
+          <a:ext cx="0" cy="0"/>
+          <a:chOff x="0" y="0"/>
+          <a:chExt cx="0" cy="0"/>
+        </a:xfrm>
+      </p:grpSpPr>
+      <p:sp>
+        <p:nvSpPr>
+          <p:cNvPr id="619" name="Title 6"/>
+          <p:cNvSpPr txBox="1"/>
+          <p:nvPr>
+            <p:ph type="title"/>
+          </p:nvPr>
+        </p:nvSpPr>
+        <p:spPr>
+          <a:xfrm>
+            <a:off x="7106129" y="1119893"/>
+            <a:ext cx="10171742" cy="1288881"/>
+          </a:xfrm>
+          <a:prstGeom prst="rect">
+            <a:avLst/>
+          </a:prstGeom>
+        </p:spPr>
+        <p:txBody>
+          <a:bodyPr/>
+          <a:lstStyle>
+            <a:lvl1pPr algn="ctr">
+              <a:defRPr sz="8000">
+                <a:solidFill>
+                  <a:srgbClr val="66C2FF"/>
+                </a:solidFill>
+              </a:defRPr>
+            </a:lvl1pPr>
+          </a:lstStyle>
+          <a:p>
+            <a:pPr/>
+            <a:r>
+              <a:t>Special directories</a:t>
+            </a:r>
+          </a:p>
+        </p:txBody>
+      </p:sp>
+      <p:pic>
+        <p:nvPicPr>
+          <p:cNvPr id="620" name="cubes.png" descr="cubes.png"/>
+          <p:cNvPicPr>
+            <a:picLocks noChangeAspect="1"/>
+          </p:cNvPicPr>
+          <p:nvPr/>
+        </p:nvPicPr>
+        <p:blipFill>
+          <a:blip r:embed="rId2">
+            <a:extLst/>
+          </a:blip>
+          <a:stretch>
+            <a:fillRect/>
+          </a:stretch>
+        </p:blipFill>
+        <p:spPr>
+          <a:xfrm>
+            <a:off x="20320000" y="3175000"/>
+            <a:ext cx="1905000" cy="1905000"/>
+          </a:xfrm>
+          <a:prstGeom prst="rect">
+            <a:avLst/>
+          </a:prstGeom>
+          <a:ln w="12700">
+            <a:miter lim="400000"/>
+          </a:ln>
+        </p:spPr>
+      </p:pic>
+      <p:grpSp>
+        <p:nvGrpSpPr>
+          <p:cNvPr id="623" name="Group"/>
+          <p:cNvGrpSpPr/>
+          <p:nvPr/>
+        </p:nvGrpSpPr>
+        <p:grpSpPr>
+          <a:xfrm>
+            <a:off x="1270000" y="3030639"/>
+            <a:ext cx="2160530" cy="1631514"/>
+            <a:chOff x="0" y="0"/>
+            <a:chExt cx="2160529" cy="1631512"/>
+          </a:xfrm>
+        </p:grpSpPr>
+        <p:pic>
+          <p:nvPicPr>
+            <p:cNvPr id="621" name="folder.png" descr="folder.png"/>
+            <p:cNvPicPr>
+              <a:picLocks noChangeAspect="1"/>
+            </p:cNvPicPr>
+            <p:nvPr/>
+          </p:nvPicPr>
+          <p:blipFill>
+            <a:blip r:embed="rId3">
+              <a:extLst/>
+            </a:blip>
+            <a:stretch>
+              <a:fillRect/>
+            </a:stretch>
+          </p:blipFill>
+          <p:spPr>
+            <a:xfrm>
+              <a:off x="0" y="0"/>
+              <a:ext cx="723026" cy="723026"/>
+            </a:xfrm>
+            <a:prstGeom prst="rect">
+              <a:avLst/>
+            </a:prstGeom>
+            <a:ln w="12700" cap="flat">
+              <a:noFill/>
+              <a:miter lim="400000"/>
+            </a:ln>
+            <a:effectLst/>
+          </p:spPr>
+        </p:pic>
+        <p:sp>
+          <p:nvSpPr>
+            <p:cNvPr id="622" name="vendor"/>
+            <p:cNvSpPr/>
+            <p:nvPr/>
+          </p:nvSpPr>
+          <p:spPr>
+            <a:xfrm>
+              <a:off x="890529" y="361512"/>
+              <a:ext cx="1270001" cy="1270001"/>
+            </a:xfrm>
+            <a:prstGeom prst="line">
+              <a:avLst/>
+            </a:prstGeom>
+            <a:noFill/>
+            <a:ln w="12700" cap="flat">
+              <a:noFill/>
+              <a:miter lim="400000"/>
+            </a:ln>
+            <a:effectLst/>
+            <a:extLst>
+              <a:ext uri="{C572A759-6A51-4108-AA02-DFA0A04FC94B}">
+                <ma14:wrappingTextBoxFlag xmlns:ma14="http://schemas.microsoft.com/office/mac/drawingml/2011/main" val="1"/>
+              </a:ext>
+            </a:extLst>
+          </p:spPr>
+          <p:txBody>
+            <a:bodyPr wrap="none" lIns="71437" tIns="71437" rIns="71437" bIns="71437" numCol="1" anchor="ctr">
+              <a:spAutoFit/>
+            </a:bodyPr>
+            <a:lstStyle>
+              <a:lvl1pPr>
+                <a:defRPr>
+                  <a:solidFill>
+                    <a:srgbClr val="FFFFFF"/>
+                  </a:solidFill>
+                  <a:latin typeface="Meslo LG M for Powerline"/>
+                  <a:ea typeface="Meslo LG M for Powerline"/>
+                  <a:cs typeface="Meslo LG M for Powerline"/>
+                  <a:sym typeface="Meslo LG M for Powerline"/>
+                </a:defRPr>
+              </a:lvl1pPr>
+            </a:lstStyle>
+            <a:p>
+              <a:pPr/>
+              <a:r>
+                <a:t>vendor</a:t>
+              </a:r>
+            </a:p>
+          </p:txBody>
+        </p:sp>
+      </p:grpSp>
+      <p:grpSp>
+        <p:nvGrpSpPr>
+          <p:cNvPr id="626" name="Group"/>
+          <p:cNvGrpSpPr/>
+          <p:nvPr/>
+        </p:nvGrpSpPr>
+        <p:grpSpPr>
+          <a:xfrm>
+            <a:off x="1270000" y="6591338"/>
+            <a:ext cx="2160530" cy="1631513"/>
+            <a:chOff x="0" y="0"/>
+            <a:chExt cx="2160529" cy="1631512"/>
+          </a:xfrm>
+        </p:grpSpPr>
+        <p:pic>
+          <p:nvPicPr>
+            <p:cNvPr id="624" name="folder.png" descr="folder.png"/>
+            <p:cNvPicPr>
+              <a:picLocks noChangeAspect="1"/>
+            </p:cNvPicPr>
+            <p:nvPr/>
+          </p:nvPicPr>
+          <p:blipFill>
+            <a:blip r:embed="rId3">
+              <a:extLst/>
+            </a:blip>
+            <a:stretch>
+              <a:fillRect/>
+            </a:stretch>
+          </p:blipFill>
+          <p:spPr>
+            <a:xfrm>
+              <a:off x="0" y="0"/>
+              <a:ext cx="723026" cy="723026"/>
+            </a:xfrm>
+            <a:prstGeom prst="rect">
+              <a:avLst/>
+            </a:prstGeom>
+            <a:ln w="12700" cap="flat">
+              <a:noFill/>
+              <a:miter lim="400000"/>
+            </a:ln>
+            <a:effectLst/>
+          </p:spPr>
+        </p:pic>
+        <p:sp>
+          <p:nvSpPr>
+            <p:cNvPr id="625" name="pkg"/>
+            <p:cNvSpPr/>
+            <p:nvPr/>
+          </p:nvSpPr>
+          <p:spPr>
+            <a:xfrm>
+              <a:off x="890529" y="361512"/>
+              <a:ext cx="1270001" cy="1270001"/>
+            </a:xfrm>
+            <a:prstGeom prst="line">
+              <a:avLst/>
+            </a:prstGeom>
+            <a:noFill/>
+            <a:ln w="12700" cap="flat">
+              <a:noFill/>
+              <a:miter lim="400000"/>
+            </a:ln>
+            <a:effectLst/>
+            <a:extLst>
+              <a:ext uri="{C572A759-6A51-4108-AA02-DFA0A04FC94B}">
+                <ma14:wrappingTextBoxFlag xmlns:ma14="http://schemas.microsoft.com/office/mac/drawingml/2011/main" val="1"/>
+              </a:ext>
+            </a:extLst>
+          </p:spPr>
+          <p:txBody>
+            <a:bodyPr wrap="none" lIns="71437" tIns="71437" rIns="71437" bIns="71437" numCol="1" anchor="ctr">
+              <a:spAutoFit/>
+            </a:bodyPr>
+            <a:lstStyle>
+              <a:lvl1pPr>
+                <a:defRPr>
+                  <a:solidFill>
+                    <a:srgbClr val="FFFFFF"/>
+                  </a:solidFill>
+                  <a:latin typeface="Meslo LG M for Powerline"/>
+                  <a:ea typeface="Meslo LG M for Powerline"/>
+                  <a:cs typeface="Meslo LG M for Powerline"/>
+                  <a:sym typeface="Meslo LG M for Powerline"/>
+                </a:defRPr>
+              </a:lvl1pPr>
+            </a:lstStyle>
+            <a:p>
+              <a:pPr/>
+              <a:r>
+                <a:t>pkg</a:t>
+              </a:r>
+            </a:p>
+          </p:txBody>
+        </p:sp>
+      </p:grpSp>
+      <p:grpSp>
+        <p:nvGrpSpPr>
+          <p:cNvPr id="629" name="Group"/>
+          <p:cNvGrpSpPr/>
+          <p:nvPr/>
+        </p:nvGrpSpPr>
+        <p:grpSpPr>
+          <a:xfrm>
+            <a:off x="1269999" y="4053066"/>
+            <a:ext cx="2160531" cy="1631514"/>
+            <a:chOff x="0" y="0"/>
+            <a:chExt cx="2160529" cy="1631512"/>
+          </a:xfrm>
+        </p:grpSpPr>
+        <p:pic>
+          <p:nvPicPr>
+            <p:cNvPr id="627" name="folder.png" descr="folder.png"/>
+            <p:cNvPicPr>
+              <a:picLocks noChangeAspect="1"/>
+            </p:cNvPicPr>
+            <p:nvPr/>
+          </p:nvPicPr>
+          <p:blipFill>
+            <a:blip r:embed="rId3">
+              <a:extLst/>
+            </a:blip>
+            <a:stretch>
+              <a:fillRect/>
+            </a:stretch>
+          </p:blipFill>
+          <p:spPr>
+            <a:xfrm>
+              <a:off x="0" y="0"/>
+              <a:ext cx="723026" cy="723026"/>
+            </a:xfrm>
+            <a:prstGeom prst="rect">
+              <a:avLst/>
+            </a:prstGeom>
+            <a:ln w="12700" cap="flat">
+              <a:noFill/>
+              <a:miter lim="400000"/>
+            </a:ln>
+            <a:effectLst/>
+          </p:spPr>
+        </p:pic>
+        <p:sp>
+          <p:nvSpPr>
+            <p:cNvPr id="628" name="internal"/>
+            <p:cNvSpPr/>
+            <p:nvPr/>
+          </p:nvSpPr>
+          <p:spPr>
+            <a:xfrm>
+              <a:off x="890529" y="361512"/>
+              <a:ext cx="1270001" cy="1270001"/>
+            </a:xfrm>
+            <a:prstGeom prst="line">
+              <a:avLst/>
+            </a:prstGeom>
+            <a:noFill/>
+            <a:ln w="12700" cap="flat">
+              <a:noFill/>
+              <a:miter lim="400000"/>
+            </a:ln>
+            <a:effectLst/>
+            <a:extLst>
+              <a:ext uri="{C572A759-6A51-4108-AA02-DFA0A04FC94B}">
+                <ma14:wrappingTextBoxFlag xmlns:ma14="http://schemas.microsoft.com/office/mac/drawingml/2011/main" val="1"/>
+              </a:ext>
+            </a:extLst>
+          </p:spPr>
+          <p:txBody>
+            <a:bodyPr wrap="none" lIns="71437" tIns="71437" rIns="71437" bIns="71437" numCol="1" anchor="ctr">
+              <a:spAutoFit/>
+            </a:bodyPr>
+            <a:lstStyle>
+              <a:lvl1pPr>
+                <a:defRPr>
+                  <a:solidFill>
+                    <a:srgbClr val="FFFFFF"/>
+                  </a:solidFill>
+                  <a:latin typeface="Meslo LG M for Powerline"/>
+                  <a:ea typeface="Meslo LG M for Powerline"/>
+                  <a:cs typeface="Meslo LG M for Powerline"/>
+                  <a:sym typeface="Meslo LG M for Powerline"/>
+                </a:defRPr>
+              </a:lvl1pPr>
+            </a:lstStyle>
+            <a:p>
+              <a:pPr/>
+              <a:r>
+                <a:t>internal</a:t>
+              </a:r>
+            </a:p>
+          </p:txBody>
+        </p:sp>
+      </p:grpSp>
+      <p:grpSp>
+        <p:nvGrpSpPr>
+          <p:cNvPr id="632" name="Group"/>
+          <p:cNvGrpSpPr/>
+          <p:nvPr/>
+        </p:nvGrpSpPr>
+        <p:grpSpPr>
+          <a:xfrm>
+            <a:off x="1270000" y="7700543"/>
+            <a:ext cx="2160530" cy="1631514"/>
+            <a:chOff x="0" y="0"/>
+            <a:chExt cx="2160529" cy="1631512"/>
+          </a:xfrm>
+        </p:grpSpPr>
+        <p:pic>
+          <p:nvPicPr>
+            <p:cNvPr id="630" name="folder.png" descr="folder.png"/>
+            <p:cNvPicPr>
+              <a:picLocks noChangeAspect="1"/>
+            </p:cNvPicPr>
+            <p:nvPr/>
+          </p:nvPicPr>
+          <p:blipFill>
+            <a:blip r:embed="rId3">
+              <a:extLst/>
+            </a:blip>
+            <a:stretch>
+              <a:fillRect/>
+            </a:stretch>
+          </p:blipFill>
+          <p:spPr>
+            <a:xfrm>
+              <a:off x="0" y="0"/>
+              <a:ext cx="723026" cy="723026"/>
+            </a:xfrm>
+            <a:prstGeom prst="rect">
+              <a:avLst/>
+            </a:prstGeom>
+            <a:ln w="12700" cap="flat">
+              <a:noFill/>
+              <a:miter lim="400000"/>
+            </a:ln>
+            <a:effectLst/>
+          </p:spPr>
+        </p:pic>
+        <p:sp>
+          <p:nvSpPr>
+            <p:cNvPr id="631" name="cmd"/>
+            <p:cNvSpPr/>
+            <p:nvPr/>
+          </p:nvSpPr>
+          <p:spPr>
+            <a:xfrm>
+              <a:off x="890529" y="361512"/>
+              <a:ext cx="1270001" cy="1270001"/>
+            </a:xfrm>
+            <a:prstGeom prst="line">
+              <a:avLst/>
+            </a:prstGeom>
+            <a:noFill/>
+            <a:ln w="12700" cap="flat">
+              <a:noFill/>
+              <a:miter lim="400000"/>
+            </a:ln>
+            <a:effectLst/>
+            <a:extLst>
+              <a:ext uri="{C572A759-6A51-4108-AA02-DFA0A04FC94B}">
+                <ma14:wrappingTextBoxFlag xmlns:ma14="http://schemas.microsoft.com/office/mac/drawingml/2011/main" val="1"/>
+              </a:ext>
+            </a:extLst>
+          </p:spPr>
+          <p:txBody>
+            <a:bodyPr wrap="none" lIns="71437" tIns="71437" rIns="71437" bIns="71437" numCol="1" anchor="ctr">
+              <a:spAutoFit/>
+            </a:bodyPr>
+            <a:lstStyle>
+              <a:lvl1pPr>
+                <a:defRPr>
+                  <a:solidFill>
+                    <a:srgbClr val="FFFFFF"/>
+                  </a:solidFill>
+                  <a:latin typeface="Meslo LG M for Powerline"/>
+                  <a:ea typeface="Meslo LG M for Powerline"/>
+                  <a:cs typeface="Meslo LG M for Powerline"/>
+                  <a:sym typeface="Meslo LG M for Powerline"/>
+                </a:defRPr>
+              </a:lvl1pPr>
+            </a:lstStyle>
+            <a:p>
+              <a:pPr/>
+              <a:r>
+                <a:t>cmd</a:t>
+              </a:r>
+            </a:p>
+          </p:txBody>
+        </p:sp>
+      </p:grpSp>
+      <p:grpSp>
+        <p:nvGrpSpPr>
+          <p:cNvPr id="635" name="Group"/>
+          <p:cNvGrpSpPr/>
+          <p:nvPr/>
+        </p:nvGrpSpPr>
+        <p:grpSpPr>
+          <a:xfrm>
+            <a:off x="1269999" y="8809749"/>
+            <a:ext cx="2160531" cy="1631513"/>
+            <a:chOff x="0" y="0"/>
+            <a:chExt cx="2160529" cy="1631512"/>
+          </a:xfrm>
+        </p:grpSpPr>
+        <p:pic>
+          <p:nvPicPr>
+            <p:cNvPr id="633" name="folder.png" descr="folder.png"/>
+            <p:cNvPicPr>
+              <a:picLocks noChangeAspect="1"/>
+            </p:cNvPicPr>
+            <p:nvPr/>
+          </p:nvPicPr>
+          <p:blipFill>
+            <a:blip r:embed="rId3">
+              <a:extLst/>
+            </a:blip>
+            <a:stretch>
+              <a:fillRect/>
+            </a:stretch>
+          </p:blipFill>
+          <p:spPr>
+            <a:xfrm>
+              <a:off x="0" y="0"/>
+              <a:ext cx="723026" cy="723026"/>
+            </a:xfrm>
+            <a:prstGeom prst="rect">
+              <a:avLst/>
+            </a:prstGeom>
+            <a:ln w="12700" cap="flat">
+              <a:noFill/>
+              <a:miter lim="400000"/>
+            </a:ln>
+            <a:effectLst/>
+          </p:spPr>
+        </p:pic>
+        <p:sp>
+          <p:nvSpPr>
+            <p:cNvPr id="634" name=".dir"/>
+            <p:cNvSpPr/>
+            <p:nvPr/>
+          </p:nvSpPr>
+          <p:spPr>
+            <a:xfrm>
+              <a:off x="890529" y="361512"/>
+              <a:ext cx="1270001" cy="1270001"/>
+            </a:xfrm>
+            <a:prstGeom prst="line">
+              <a:avLst/>
+            </a:prstGeom>
+            <a:noFill/>
+            <a:ln w="12700" cap="flat">
+              <a:noFill/>
+              <a:miter lim="400000"/>
+            </a:ln>
+            <a:effectLst/>
+            <a:extLst>
+              <a:ext uri="{C572A759-6A51-4108-AA02-DFA0A04FC94B}">
+                <ma14:wrappingTextBoxFlag xmlns:ma14="http://schemas.microsoft.com/office/mac/drawingml/2011/main" val="1"/>
+              </a:ext>
+            </a:extLst>
+          </p:spPr>
+          <p:txBody>
+            <a:bodyPr wrap="none" lIns="71437" tIns="71437" rIns="71437" bIns="71437" numCol="1" anchor="ctr">
+              <a:spAutoFit/>
+            </a:bodyPr>
+            <a:lstStyle>
+              <a:lvl1pPr>
+                <a:defRPr>
+                  <a:solidFill>
+                    <a:srgbClr val="FFFFFF"/>
+                  </a:solidFill>
+                  <a:latin typeface="Meslo LG M for Powerline"/>
+                  <a:ea typeface="Meslo LG M for Powerline"/>
+                  <a:cs typeface="Meslo LG M for Powerline"/>
+                  <a:sym typeface="Meslo LG M for Powerline"/>
+                </a:defRPr>
+              </a:lvl1pPr>
+            </a:lstStyle>
+            <a:p>
+              <a:pPr/>
+              <a:r>
+                <a:t>.dir</a:t>
+              </a:r>
+            </a:p>
+          </p:txBody>
+        </p:sp>
+      </p:grpSp>
+      <p:grpSp>
+        <p:nvGrpSpPr>
+          <p:cNvPr id="638" name="Group"/>
+          <p:cNvGrpSpPr/>
+          <p:nvPr/>
+        </p:nvGrpSpPr>
+        <p:grpSpPr>
+          <a:xfrm>
+            <a:off x="3522148" y="8809749"/>
+            <a:ext cx="2160530" cy="1631513"/>
+            <a:chOff x="0" y="0"/>
+            <a:chExt cx="2160529" cy="1631512"/>
+          </a:xfrm>
+        </p:grpSpPr>
+        <p:pic>
+          <p:nvPicPr>
+            <p:cNvPr id="636" name="folder.png" descr="folder.png"/>
+            <p:cNvPicPr>
+              <a:picLocks noChangeAspect="1"/>
+            </p:cNvPicPr>
+            <p:nvPr/>
+          </p:nvPicPr>
+          <p:blipFill>
+            <a:blip r:embed="rId3">
+              <a:extLst/>
+            </a:blip>
+            <a:stretch>
+              <a:fillRect/>
+            </a:stretch>
+          </p:blipFill>
+          <p:spPr>
+            <a:xfrm>
+              <a:off x="0" y="0"/>
+              <a:ext cx="723026" cy="723026"/>
+            </a:xfrm>
+            <a:prstGeom prst="rect">
+              <a:avLst/>
+            </a:prstGeom>
+            <a:ln w="12700" cap="flat">
+              <a:noFill/>
+              <a:miter lim="400000"/>
+            </a:ln>
+            <a:effectLst/>
+          </p:spPr>
+        </p:pic>
+        <p:sp>
+          <p:nvSpPr>
+            <p:cNvPr id="637" name="_dir"/>
+            <p:cNvSpPr/>
+            <p:nvPr/>
+          </p:nvSpPr>
+          <p:spPr>
+            <a:xfrm>
+              <a:off x="890529" y="361512"/>
+              <a:ext cx="1270001" cy="1270001"/>
+            </a:xfrm>
+            <a:prstGeom prst="line">
+              <a:avLst/>
+            </a:prstGeom>
+            <a:noFill/>
+            <a:ln w="12700" cap="flat">
+              <a:noFill/>
+              <a:miter lim="400000"/>
+            </a:ln>
+            <a:effectLst/>
+            <a:extLst>
+              <a:ext uri="{C572A759-6A51-4108-AA02-DFA0A04FC94B}">
+                <ma14:wrappingTextBoxFlag xmlns:ma14="http://schemas.microsoft.com/office/mac/drawingml/2011/main" val="1"/>
+              </a:ext>
+            </a:extLst>
+          </p:spPr>
+          <p:txBody>
+            <a:bodyPr wrap="none" lIns="71437" tIns="71437" rIns="71437" bIns="71437" numCol="1" anchor="ctr">
+              <a:spAutoFit/>
+            </a:bodyPr>
+            <a:lstStyle>
+              <a:lvl1pPr>
+                <a:defRPr>
+                  <a:solidFill>
+                    <a:srgbClr val="FFFFFF"/>
+                  </a:solidFill>
+                  <a:latin typeface="Meslo LG M for Powerline"/>
+                  <a:ea typeface="Meslo LG M for Powerline"/>
+                  <a:cs typeface="Meslo LG M for Powerline"/>
+                  <a:sym typeface="Meslo LG M for Powerline"/>
+                </a:defRPr>
+              </a:lvl1pPr>
+            </a:lstStyle>
+            <a:p>
+              <a:pPr/>
+              <a:r>
+                <a:t>_dir</a:t>
+              </a:r>
+            </a:p>
+          </p:txBody>
+        </p:sp>
+      </p:grpSp>
+      <p:grpSp>
+        <p:nvGrpSpPr>
+          <p:cNvPr id="641" name="Group"/>
+          <p:cNvGrpSpPr/>
+          <p:nvPr/>
+        </p:nvGrpSpPr>
+        <p:grpSpPr>
+          <a:xfrm>
+            <a:off x="1270000" y="9918954"/>
+            <a:ext cx="2160530" cy="1631514"/>
+            <a:chOff x="0" y="0"/>
+            <a:chExt cx="2160529" cy="1631512"/>
+          </a:xfrm>
+        </p:grpSpPr>
+        <p:pic>
+          <p:nvPicPr>
+            <p:cNvPr id="639" name="folder.png" descr="folder.png"/>
+            <p:cNvPicPr>
+              <a:picLocks noChangeAspect="1"/>
+            </p:cNvPicPr>
+            <p:nvPr/>
+          </p:nvPicPr>
+          <p:blipFill>
+            <a:blip r:embed="rId3">
+              <a:extLst/>
+            </a:blip>
+            <a:stretch>
+              <a:fillRect/>
+            </a:stretch>
+          </p:blipFill>
+          <p:spPr>
+            <a:xfrm>
+              <a:off x="0" y="0"/>
+              <a:ext cx="723026" cy="723026"/>
+            </a:xfrm>
+            <a:prstGeom prst="rect">
+              <a:avLst/>
+            </a:prstGeom>
+            <a:ln w="12700" cap="flat">
+              <a:noFill/>
+              <a:miter lim="400000"/>
+            </a:ln>
+            <a:effectLst/>
+          </p:spPr>
+        </p:pic>
+        <p:sp>
+          <p:nvSpPr>
+            <p:cNvPr id="640" name="testdata"/>
+            <p:cNvSpPr/>
+            <p:nvPr/>
+          </p:nvSpPr>
+          <p:spPr>
+            <a:xfrm>
+              <a:off x="890529" y="361512"/>
+              <a:ext cx="1270001" cy="1270001"/>
+            </a:xfrm>
+            <a:prstGeom prst="line">
+              <a:avLst/>
+            </a:prstGeom>
+            <a:noFill/>
+            <a:ln w="12700" cap="flat">
+              <a:noFill/>
+              <a:miter lim="400000"/>
+            </a:ln>
+            <a:effectLst/>
+            <a:extLst>
+              <a:ext uri="{C572A759-6A51-4108-AA02-DFA0A04FC94B}">
+                <ma14:wrappingTextBoxFlag xmlns:ma14="http://schemas.microsoft.com/office/mac/drawingml/2011/main" val="1"/>
+              </a:ext>
+            </a:extLst>
+          </p:spPr>
+          <p:txBody>
+            <a:bodyPr wrap="none" lIns="71437" tIns="71437" rIns="71437" bIns="71437" numCol="1" anchor="ctr">
+              <a:spAutoFit/>
+            </a:bodyPr>
+            <a:lstStyle>
+              <a:lvl1pPr>
+                <a:defRPr>
+                  <a:solidFill>
+                    <a:srgbClr val="FFFFFF"/>
+                  </a:solidFill>
+                  <a:latin typeface="Meslo LG M for Powerline"/>
+                  <a:ea typeface="Meslo LG M for Powerline"/>
+                  <a:cs typeface="Meslo LG M for Powerline"/>
+                  <a:sym typeface="Meslo LG M for Powerline"/>
+                </a:defRPr>
+              </a:lvl1pPr>
+            </a:lstStyle>
+            <a:p>
+              <a:pPr/>
+              <a:r>
+                <a:t>testdata</a:t>
+              </a:r>
+            </a:p>
+          </p:txBody>
+        </p:sp>
+      </p:grpSp>
+    </p:spTree>
+  </p:cSld>
+  <p:clrMapOvr>
+    <a:masterClrMapping/>
+  </p:clrMapOvr>
+  <mc:AlternateContent xmlns:mc="http://schemas.openxmlformats.org/markup-compatibility/2006">
+    <mc:Choice xmlns:p14="http://schemas.microsoft.com/office/powerpoint/2010/main" Requires="p14">
+      <p:transition spd="fast" advClick="1" p14:dur="699">
+        <p:push dir="u"/>
+      </p:transition>
+    </mc:Choice>
+    <mc:Fallback>
+      <p:transition spd="fast">
+        <p:fade/>
+      </p:transition>
+    </mc:Fallback>
+  </mc:AlternateContent>
+  <p:timing>
+    <p:tnLst>
+      <p:par>
+        <p:cTn id="1" nodeType="tmRoot" restart="never" dur="indefinite" fill="hold">
+          <p:childTnLst>
+            <p:seq concurrent="1" prevAc="none" nextAc="seek">
+              <p:cTn id="2" nodeType="mainSeq" dur="indefinite" fill="hold">
+                <p:childTnLst>
+                  <p:par>
+                    <p:cTn id="3" fill="hold">
+                      <p:stCondLst>
+                        <p:cond delay="indefinite"/>
+                        <p:cond evt="onBegin">
+                          <p:tn val="2"/>
+                        </p:cond>
+                      </p:stCondLst>
+                      <p:childTnLst>
+                        <p:par>
+                          <p:cTn id="4" fill="hold">
+                            <p:stCondLst>
+                              <p:cond delay="0"/>
+                            </p:stCondLst>
+                            <p:childTnLst>
+                              <p:par>
+                                <p:cTn id="5" presetClass="entr" nodeType="afterEffect" presetSubtype="16" presetID="23" grpId="1" fill="hold">
+                                  <p:stCondLst>
+                                    <p:cond delay="0"/>
+                                  </p:stCondLst>
+                                  <p:iterate type="el" backwards="0">
+                                    <p:tmAbs val="0"/>
+                                  </p:iterate>
+                                  <p:childTnLst>
+                                    <p:set>
+                                      <p:cBhvr>
+                                        <p:cTn id="6" fill="hold"/>
+                                        <p:tgtEl>
+                                          <p:spTgt spid="623"/>
+                                        </p:tgtEl>
+                                        <p:attrNameLst>
+                                          <p:attrName>style.visibility</p:attrName>
+                                        </p:attrNameLst>
+                                      </p:cBhvr>
+                                      <p:to>
+                                        <p:strVal val="visible"/>
+                                      </p:to>
+                                    </p:set>
+                                    <p:anim calcmode="lin" valueType="num">
+                                      <p:cBhvr>
+                                        <p:cTn id="7" dur="600" fill="hold"/>
+                                        <p:tgtEl>
+                                          <p:spTgt spid="623"/>
+                                        </p:tgtEl>
+                                        <p:attrNameLst>
+                                          <p:attrName>ppt_w</p:attrName>
+                                        </p:attrNameLst>
+                                      </p:cBhvr>
+                                      <p:tavLst>
+                                        <p:tav tm="0">
+                                          <p:val>
+                                            <p:fltVal val="0"/>
+                                          </p:val>
+                                        </p:tav>
+                                        <p:tav tm="100000">
+                                          <p:val>
+                                            <p:strVal val="#ppt_w"/>
+                                          </p:val>
+                                        </p:tav>
+                                      </p:tavLst>
+                                    </p:anim>
+                                    <p:anim calcmode="lin" valueType="num">
+                                      <p:cBhvr>
+                                        <p:cTn id="8" dur="600" fill="hold"/>
+                                        <p:tgtEl>
+                                          <p:spTgt spid="623"/>
+                                        </p:tgtEl>
+                                        <p:attrNameLst>
+                                          <p:attrName>ppt_h</p:attrName>
+                                        </p:attrNameLst>
+                                      </p:cBhvr>
+                                      <p:tavLst>
+                                        <p:tav tm="0">
+                                          <p:val>
+                                            <p:fltVal val="0"/>
+                                          </p:val>
+                                        </p:tav>
+                                        <p:tav tm="100000">
+                                          <p:val>
+                                            <p:strVal val="#ppt_h"/>
+                                          </p:val>
+                                        </p:tav>
+                                      </p:tavLst>
+                                    </p:anim>
+                                  </p:childTnLst>
+                                </p:cTn>
+                              </p:par>
+                            </p:childTnLst>
+                          </p:cTn>
+                        </p:par>
+                        <p:par>
+                          <p:cTn id="9" fill="hold">
+                            <p:stCondLst>
+                              <p:cond delay="600"/>
+                            </p:stCondLst>
+                            <p:childTnLst>
+                              <p:par>
+                                <p:cTn id="10" presetClass="entr" nodeType="afterEffect" presetSubtype="16" presetID="23" grpId="2" fill="hold">
+                                  <p:stCondLst>
+                                    <p:cond delay="0"/>
+                                  </p:stCondLst>
+                                  <p:iterate type="el" backwards="0">
+                                    <p:tmAbs val="0"/>
+                                  </p:iterate>
+                                  <p:childTnLst>
+                                    <p:set>
+                                      <p:cBhvr>
+                                        <p:cTn id="11" fill="hold"/>
+                                        <p:tgtEl>
+                                          <p:spTgt spid="629"/>
+                                        </p:tgtEl>
+                                        <p:attrNameLst>
+                                          <p:attrName>style.visibility</p:attrName>
+                                        </p:attrNameLst>
+                                      </p:cBhvr>
+                                      <p:to>
+                                        <p:strVal val="visible"/>
+                                      </p:to>
+                                    </p:set>
+                                    <p:anim calcmode="lin" valueType="num">
+                                      <p:cBhvr>
+                                        <p:cTn id="12" dur="600" fill="hold"/>
+                                        <p:tgtEl>
+                                          <p:spTgt spid="629"/>
+                                        </p:tgtEl>
+                                        <p:attrNameLst>
+                                          <p:attrName>ppt_w</p:attrName>
+                                        </p:attrNameLst>
+                                      </p:cBhvr>
+                                      <p:tavLst>
+                                        <p:tav tm="0">
+                                          <p:val>
+                                            <p:fltVal val="0"/>
+                                          </p:val>
+                                        </p:tav>
+                                        <p:tav tm="100000">
+                                          <p:val>
+                                            <p:strVal val="#ppt_w"/>
+                                          </p:val>
+                                        </p:tav>
+                                      </p:tavLst>
+                                    </p:anim>
+                                    <p:anim calcmode="lin" valueType="num">
+                                      <p:cBhvr>
+                                        <p:cTn id="13" dur="600" fill="hold"/>
+                                        <p:tgtEl>
+                                          <p:spTgt spid="629"/>
+                                        </p:tgtEl>
+                                        <p:attrNameLst>
+                                          <p:attrName>ppt_h</p:attrName>
+                                        </p:attrNameLst>
+                                      </p:cBhvr>
+                                      <p:tavLst>
+                                        <p:tav tm="0">
+                                          <p:val>
+                                            <p:fltVal val="0"/>
+                                          </p:val>
+                                        </p:tav>
+                                        <p:tav tm="100000">
+                                          <p:val>
+                                            <p:strVal val="#ppt_h"/>
+                                          </p:val>
+                                        </p:tav>
+                                      </p:tavLst>
+                                    </p:anim>
+                                  </p:childTnLst>
+                                </p:cTn>
+                              </p:par>
+                            </p:childTnLst>
+                          </p:cTn>
+                        </p:par>
+                        <p:par>
+                          <p:cTn id="14" fill="hold">
+                            <p:stCondLst>
+                              <p:cond delay="1200"/>
+                            </p:stCondLst>
+                            <p:childTnLst>
+                              <p:par>
+                                <p:cTn id="15" presetClass="entr" nodeType="afterEffect" presetSubtype="16" presetID="23" grpId="3" fill="hold">
+                                  <p:stCondLst>
+                                    <p:cond delay="0"/>
+                                  </p:stCondLst>
+                                  <p:iterate type="el" backwards="0">
+                                    <p:tmAbs val="0"/>
+                                  </p:iterate>
+                                  <p:childTnLst>
+                                    <p:set>
+                                      <p:cBhvr>
+                                        <p:cTn id="16" fill="hold"/>
+                                        <p:tgtEl>
+                                          <p:spTgt spid="626"/>
+                                        </p:tgtEl>
+                                        <p:attrNameLst>
+                                          <p:attrName>style.visibility</p:attrName>
+                                        </p:attrNameLst>
+                                      </p:cBhvr>
+                                      <p:to>
+                                        <p:strVal val="visible"/>
+                                      </p:to>
+                                    </p:set>
+                                    <p:anim calcmode="lin" valueType="num">
+                                      <p:cBhvr>
+                                        <p:cTn id="17" dur="600" fill="hold"/>
+                                        <p:tgtEl>
+                                          <p:spTgt spid="626"/>
+                                        </p:tgtEl>
+                                        <p:attrNameLst>
+                                          <p:attrName>ppt_w</p:attrName>
+                                        </p:attrNameLst>
+                                      </p:cBhvr>
+                                      <p:tavLst>
+                                        <p:tav tm="0">
+                                          <p:val>
+                                            <p:fltVal val="0"/>
+                                          </p:val>
+                                        </p:tav>
+                                        <p:tav tm="100000">
+                                          <p:val>
+                                            <p:strVal val="#ppt_w"/>
+                                          </p:val>
+                                        </p:tav>
+                                      </p:tavLst>
+                                    </p:anim>
+                                    <p:anim calcmode="lin" valueType="num">
+                                      <p:cBhvr>
+                                        <p:cTn id="18" dur="600" fill="hold"/>
+                                        <p:tgtEl>
+                                          <p:spTgt spid="626"/>
+                                        </p:tgtEl>
+                                        <p:attrNameLst>
+                                          <p:attrName>ppt_h</p:attrName>
+                                        </p:attrNameLst>
+                                      </p:cBhvr>
+                                      <p:tavLst>
+                                        <p:tav tm="0">
+                                          <p:val>
+                                            <p:fltVal val="0"/>
+                                          </p:val>
+                                        </p:tav>
+                                        <p:tav tm="100000">
+                                          <p:val>
+                                            <p:strVal val="#ppt_h"/>
+                                          </p:val>
+                                        </p:tav>
+                                      </p:tavLst>
+                                    </p:anim>
+                                  </p:childTnLst>
+                                </p:cTn>
+                              </p:par>
+                            </p:childTnLst>
+                          </p:cTn>
+                        </p:par>
+                        <p:par>
+                          <p:cTn id="19" fill="hold">
+                            <p:stCondLst>
+                              <p:cond delay="1800"/>
+                            </p:stCondLst>
+                            <p:childTnLst>
+                              <p:par>
+                                <p:cTn id="20" presetClass="entr" nodeType="afterEffect" presetSubtype="16" presetID="23" grpId="4" fill="hold">
+                                  <p:stCondLst>
+                                    <p:cond delay="0"/>
+                                  </p:stCondLst>
+                                  <p:iterate type="el" backwards="0">
+                                    <p:tmAbs val="0"/>
+                                  </p:iterate>
+                                  <p:childTnLst>
+                                    <p:set>
+                                      <p:cBhvr>
+                                        <p:cTn id="21" fill="hold"/>
+                                        <p:tgtEl>
+                                          <p:spTgt spid="632"/>
+                                        </p:tgtEl>
+                                        <p:attrNameLst>
+                                          <p:attrName>style.visibility</p:attrName>
+                                        </p:attrNameLst>
+                                      </p:cBhvr>
+                                      <p:to>
+                                        <p:strVal val="visible"/>
+                                      </p:to>
+                                    </p:set>
+                                    <p:anim calcmode="lin" valueType="num">
+                                      <p:cBhvr>
+                                        <p:cTn id="22" dur="600" fill="hold"/>
+                                        <p:tgtEl>
+                                          <p:spTgt spid="632"/>
+                                        </p:tgtEl>
+                                        <p:attrNameLst>
+                                          <p:attrName>ppt_w</p:attrName>
+                                        </p:attrNameLst>
+                                      </p:cBhvr>
+                                      <p:tavLst>
+                                        <p:tav tm="0">
+                                          <p:val>
+                                            <p:fltVal val="0"/>
+                                          </p:val>
+                                        </p:tav>
+                                        <p:tav tm="100000">
+                                          <p:val>
+                                            <p:strVal val="#ppt_w"/>
+                                          </p:val>
+                                        </p:tav>
+                                      </p:tavLst>
+                                    </p:anim>
+                                    <p:anim calcmode="lin" valueType="num">
+                                      <p:cBhvr>
+                                        <p:cTn id="23" dur="600" fill="hold"/>
+                                        <p:tgtEl>
+                                          <p:spTgt spid="632"/>
+                                        </p:tgtEl>
+                                        <p:attrNameLst>
+                                          <p:attrName>ppt_h</p:attrName>
+                                        </p:attrNameLst>
+                                      </p:cBhvr>
+                                      <p:tavLst>
+                                        <p:tav tm="0">
+                                          <p:val>
+                                            <p:fltVal val="0"/>
+                                          </p:val>
+                                        </p:tav>
+                                        <p:tav tm="100000">
+                                          <p:val>
+                                            <p:strVal val="#ppt_h"/>
+                                          </p:val>
+                                        </p:tav>
+                                      </p:tavLst>
+                                    </p:anim>
+                                  </p:childTnLst>
+                                </p:cTn>
+                              </p:par>
+                            </p:childTnLst>
+                          </p:cTn>
+                        </p:par>
+                        <p:par>
+                          <p:cTn id="24" fill="hold">
+                            <p:stCondLst>
+                              <p:cond delay="2400"/>
+                            </p:stCondLst>
+                            <p:childTnLst>
+                              <p:par>
+                                <p:cTn id="25" presetClass="entr" nodeType="afterEffect" presetSubtype="16" presetID="23" grpId="5" fill="hold">
+                                  <p:stCondLst>
+                                    <p:cond delay="0"/>
+                                  </p:stCondLst>
+                                  <p:iterate type="el" backwards="0">
+                                    <p:tmAbs val="0"/>
+                                  </p:iterate>
+                                  <p:childTnLst>
+                                    <p:set>
+                                      <p:cBhvr>
+                                        <p:cTn id="26" fill="hold"/>
+                                        <p:tgtEl>
+                                          <p:spTgt spid="635"/>
+                                        </p:tgtEl>
+                                        <p:attrNameLst>
+                                          <p:attrName>style.visibility</p:attrName>
+                                        </p:attrNameLst>
+                                      </p:cBhvr>
+                                      <p:to>
+                                        <p:strVal val="visible"/>
+                                      </p:to>
+                                    </p:set>
+                                    <p:anim calcmode="lin" valueType="num">
+                                      <p:cBhvr>
+                                        <p:cTn id="27" dur="600" fill="hold"/>
+                                        <p:tgtEl>
+                                          <p:spTgt spid="635"/>
+                                        </p:tgtEl>
+                                        <p:attrNameLst>
+                                          <p:attrName>ppt_w</p:attrName>
+                                        </p:attrNameLst>
+                                      </p:cBhvr>
+                                      <p:tavLst>
+                                        <p:tav tm="0">
+                                          <p:val>
+                                            <p:fltVal val="0"/>
+                                          </p:val>
+                                        </p:tav>
+                                        <p:tav tm="100000">
+                                          <p:val>
+                                            <p:strVal val="#ppt_w"/>
+                                          </p:val>
+                                        </p:tav>
+                                      </p:tavLst>
+                                    </p:anim>
+                                    <p:anim calcmode="lin" valueType="num">
+                                      <p:cBhvr>
+                                        <p:cTn id="28" dur="600" fill="hold"/>
+                                        <p:tgtEl>
+                                          <p:spTgt spid="635"/>
+                                        </p:tgtEl>
+                                        <p:attrNameLst>
+                                          <p:attrName>ppt_h</p:attrName>
+                                        </p:attrNameLst>
+                                      </p:cBhvr>
+                                      <p:tavLst>
+                                        <p:tav tm="0">
+                                          <p:val>
+                                            <p:fltVal val="0"/>
+                                          </p:val>
+                                        </p:tav>
+                                        <p:tav tm="100000">
+                                          <p:val>
+                                            <p:strVal val="#ppt_h"/>
+                                          </p:val>
+                                        </p:tav>
+                                      </p:tavLst>
+                                    </p:anim>
+                                  </p:childTnLst>
+                                </p:cTn>
+                              </p:par>
+                            </p:childTnLst>
+                          </p:cTn>
+                        </p:par>
+                        <p:par>
+                          <p:cTn id="29" fill="hold">
+                            <p:stCondLst>
+                              <p:cond delay="3000"/>
+                            </p:stCondLst>
+                            <p:childTnLst>
+                              <p:par>
+                                <p:cTn id="30" presetClass="entr" nodeType="afterEffect" presetSubtype="16" presetID="23" grpId="6" fill="hold">
+                                  <p:stCondLst>
+                                    <p:cond delay="0"/>
+                                  </p:stCondLst>
+                                  <p:iterate type="el" backwards="0">
+                                    <p:tmAbs val="0"/>
+                                  </p:iterate>
+                                  <p:childTnLst>
+                                    <p:set>
+                                      <p:cBhvr>
+                                        <p:cTn id="31" fill="hold"/>
+                                        <p:tgtEl>
+                                          <p:spTgt spid="638"/>
+                                        </p:tgtEl>
+                                        <p:attrNameLst>
+                                          <p:attrName>style.visibility</p:attrName>
+                                        </p:attrNameLst>
+                                      </p:cBhvr>
+                                      <p:to>
+                                        <p:strVal val="visible"/>
+                                      </p:to>
+                                    </p:set>
+                                    <p:anim calcmode="lin" valueType="num">
+                                      <p:cBhvr>
+                                        <p:cTn id="32" dur="600" fill="hold"/>
+                                        <p:tgtEl>
+                                          <p:spTgt spid="638"/>
+                                        </p:tgtEl>
+                                        <p:attrNameLst>
+                                          <p:attrName>ppt_w</p:attrName>
+                                        </p:attrNameLst>
+                                      </p:cBhvr>
+                                      <p:tavLst>
+                                        <p:tav tm="0">
+                                          <p:val>
+                                            <p:fltVal val="0"/>
+                                          </p:val>
+                                        </p:tav>
+                                        <p:tav tm="100000">
+                                          <p:val>
+                                            <p:strVal val="#ppt_w"/>
+                                          </p:val>
+                                        </p:tav>
+                                      </p:tavLst>
+                                    </p:anim>
+                                    <p:anim calcmode="lin" valueType="num">
+                                      <p:cBhvr>
+                                        <p:cTn id="33" dur="600" fill="hold"/>
+                                        <p:tgtEl>
+                                          <p:spTgt spid="638"/>
+                                        </p:tgtEl>
+                                        <p:attrNameLst>
+                                          <p:attrName>ppt_h</p:attrName>
+                                        </p:attrNameLst>
+                                      </p:cBhvr>
+                                      <p:tavLst>
+                                        <p:tav tm="0">
+                                          <p:val>
+                                            <p:fltVal val="0"/>
+                                          </p:val>
+                                        </p:tav>
+                                        <p:tav tm="100000">
+                                          <p:val>
+                                            <p:strVal val="#ppt_h"/>
+                                          </p:val>
+                                        </p:tav>
+                                      </p:tavLst>
+                                    </p:anim>
+                                  </p:childTnLst>
+                                </p:cTn>
+                              </p:par>
+                            </p:childTnLst>
+                          </p:cTn>
+                        </p:par>
+                        <p:par>
+                          <p:cTn id="34" fill="hold">
+                            <p:stCondLst>
+                              <p:cond delay="3600"/>
+                            </p:stCondLst>
+                            <p:childTnLst>
+                              <p:par>
+                                <p:cTn id="35" presetClass="entr" nodeType="afterEffect" presetSubtype="16" presetID="23" grpId="7" fill="hold">
+                                  <p:stCondLst>
+                                    <p:cond delay="0"/>
+                                  </p:stCondLst>
+                                  <p:iterate type="el" backwards="0">
+                                    <p:tmAbs val="0"/>
+                                  </p:iterate>
+                                  <p:childTnLst>
+                                    <p:set>
+                                      <p:cBhvr>
+                                        <p:cTn id="36" fill="hold"/>
+                                        <p:tgtEl>
+                                          <p:spTgt spid="641"/>
+                                        </p:tgtEl>
+                                        <p:attrNameLst>
+                                          <p:attrName>style.visibility</p:attrName>
+                                        </p:attrNameLst>
+                                      </p:cBhvr>
+                                      <p:to>
+                                        <p:strVal val="visible"/>
+                                      </p:to>
+                                    </p:set>
+                                    <p:anim calcmode="lin" valueType="num">
+                                      <p:cBhvr>
+                                        <p:cTn id="37" dur="600" fill="hold"/>
+                                        <p:tgtEl>
+                                          <p:spTgt spid="641"/>
+                                        </p:tgtEl>
+                                        <p:attrNameLst>
+                                          <p:attrName>ppt_w</p:attrName>
+                                        </p:attrNameLst>
+                                      </p:cBhvr>
+                                      <p:tavLst>
+                                        <p:tav tm="0">
+                                          <p:val>
+                                            <p:fltVal val="0"/>
+                                          </p:val>
+                                        </p:tav>
+                                        <p:tav tm="100000">
+                                          <p:val>
+                                            <p:strVal val="#ppt_w"/>
+                                          </p:val>
+                                        </p:tav>
+                                      </p:tavLst>
+                                    </p:anim>
+                                    <p:anim calcmode="lin" valueType="num">
+                                      <p:cBhvr>
+                                        <p:cTn id="38" dur="600" fill="hold"/>
+                                        <p:tgtEl>
+                                          <p:spTgt spid="641"/>
+                                        </p:tgtEl>
+                                        <p:attrNameLst>
+                                          <p:attrName>ppt_h</p:attrName>
+                                        </p:attrNameLst>
+                                      </p:cBhvr>
+                                      <p:tavLst>
+                                        <p:tav tm="0">
+                                          <p:val>
+                                            <p:fltVal val="0"/>
+                                          </p:val>
+                                        </p:tav>
+                                        <p:tav tm="100000">
+                                          <p:val>
+                                            <p:strVal val="#ppt_h"/>
+                                          </p:val>
+                                        </p:tav>
+                                      </p:tavLst>
+                                    </p:anim>
+                                  </p:childTnLst>
+                                </p:cTn>
+                              </p:par>
+                            </p:childTnLst>
+                          </p:cTn>
+                        </p:par>
+                      </p:childTnLst>
+                    </p:cTn>
+                  </p:par>
+                </p:childTnLst>
+              </p:cTn>
+              <p:prevCondLst>
+                <p:cond evt="onPrev">
+                  <p:tgtEl>
+                    <p:sldTgt/>
+                  </p:tgtEl>
+                </p:cond>
+              </p:prevCondLst>
+              <p:nextCondLst>
+                <p:cond evt="onNext">
+                  <p:tgtEl>
+                    <p:sldTgt/>
+                  </p:tgtEl>
+                </p:cond>
+              </p:nextCondLst>
+            </p:seq>
+          </p:childTnLst>
+        </p:cTn>
+      </p:par>
+    </p:tnLst>
+    <p:bldLst>
+      <p:bldP build="whole" bldLvl="1" animBg="1" rev="0" advAuto="0" spid="635" grpId="5"/>
+      <p:bldP build="whole" bldLvl="1" animBg="1" rev="0" advAuto="0" spid="638" grpId="6"/>
+      <p:bldP build="whole" bldLvl="1" animBg="1" rev="0" advAuto="0" spid="641" grpId="7"/>
+      <p:bldP build="whole" bldLvl="1" animBg="1" rev="0" advAuto="0" spid="629" grpId="2"/>
+      <p:bldP build="whole" bldLvl="1" animBg="1" rev="0" advAuto="0" spid="623" grpId="1"/>
+      <p:bldP build="whole" bldLvl="1" animBg="1" rev="0" advAuto="0" spid="626" grpId="3"/>
+      <p:bldP build="whole" bldLvl="1" animBg="1" rev="0" advAuto="0" spid="632" grpId="4"/>
     </p:bldLst>
   </p:timing>
 </p:sld>
@@ -9424,9 +10831,9 @@
       </p:par>
     </p:tnLst>
     <p:bldLst>
-      <p:bldP build="whole" bldLvl="1" animBg="1" rev="0" advAuto="0" spid="188" grpId="3"/>
       <p:bldP build="whole" bldLvl="1" animBg="1" rev="0" advAuto="0" spid="186" grpId="1"/>
       <p:bldP build="whole" bldLvl="1" animBg="1" rev="0" advAuto="0" spid="187" grpId="2"/>
+      <p:bldP build="whole" bldLvl="1" animBg="1" rev="0" advAuto="0" spid="188" grpId="3"/>
     </p:bldLst>
   </p:timing>
 </p:sld>
@@ -11106,13 +12513,13 @@
     </p:tnLst>
     <p:bldLst>
       <p:bldP build="whole" bldLvl="1" animBg="1" rev="0" advAuto="0" spid="200" grpId="7"/>
+      <p:bldP build="whole" bldLvl="1" animBg="1" rev="0" advAuto="0" spid="206" grpId="1"/>
+      <p:bldP build="whole" bldLvl="1" animBg="1" rev="0" advAuto="0" spid="215" grpId="3"/>
       <p:bldP build="whole" bldLvl="1" animBg="1" rev="0" advAuto="0" spid="212" grpId="4"/>
       <p:bldP build="whole" bldLvl="1" animBg="1" rev="0" advAuto="0" spid="194" grpId="5"/>
-      <p:bldP build="whole" bldLvl="1" animBg="1" rev="0" advAuto="0" spid="215" grpId="3"/>
+      <p:bldP build="whole" bldLvl="1" animBg="1" rev="0" advAuto="0" spid="197" grpId="6"/>
+      <p:bldP build="whole" bldLvl="1" animBg="1" rev="0" advAuto="0" spid="209" grpId="2"/>
       <p:bldP build="whole" bldLvl="1" animBg="1" rev="0" advAuto="0" spid="203" grpId="8"/>
-      <p:bldP build="whole" bldLvl="1" animBg="1" rev="0" advAuto="0" spid="206" grpId="1"/>
-      <p:bldP build="whole" bldLvl="1" animBg="1" rev="0" advAuto="0" spid="209" grpId="2"/>
-      <p:bldP build="whole" bldLvl="1" animBg="1" rev="0" advAuto="0" spid="197" grpId="6"/>
     </p:bldLst>
   </p:timing>
 </p:sld>
@@ -12522,12 +13929,12 @@
       </p:par>
     </p:tnLst>
     <p:bldLst>
+      <p:bldP build="whole" bldLvl="1" animBg="1" rev="0" advAuto="0" spid="224" grpId="5"/>
+      <p:bldP build="whole" bldLvl="1" animBg="1" rev="0" advAuto="0" spid="228" grpId="2"/>
+      <p:bldP build="whole" bldLvl="1" animBg="1" rev="0" advAuto="0" spid="236" grpId="6"/>
       <p:bldP build="whole" bldLvl="1" animBg="1" rev="0" advAuto="0" spid="221" grpId="1"/>
-      <p:bldP build="whole" bldLvl="1" animBg="1" rev="0" advAuto="0" spid="224" grpId="5"/>
-      <p:bldP build="whole" bldLvl="1" animBg="1" rev="0" advAuto="0" spid="236" grpId="6"/>
-      <p:bldP build="whole" bldLvl="1" animBg="1" rev="0" advAuto="0" spid="228" grpId="2"/>
+      <p:bldP build="whole" bldLvl="1" animBg="1" rev="0" advAuto="0" spid="239" grpId="4"/>
       <p:bldP build="whole" bldLvl="1" animBg="1" rev="0" advAuto="0" spid="232" grpId="3"/>
-      <p:bldP build="whole" bldLvl="1" animBg="1" rev="0" advAuto="0" spid="239" grpId="4"/>
     </p:bldLst>
   </p:timing>
 </p:sld>
@@ -12833,7 +14240,7 @@
           </p:pic>
           <p:sp>
             <p:nvSpPr>
-              <p:cNvPr id="248" name="src/network"/>
+              <p:cNvPr id="248" name="app/network"/>
               <p:cNvSpPr txBox="1"/>
               <p:nvPr/>
             </p:nvSpPr>
@@ -12877,7 +14284,7 @@
               <a:p>
                 <a:pPr/>
                 <a:r>
-                  <a:t>src/network</a:t>
+                  <a:t>app/network</a:t>
                 </a:r>
               </a:p>
             </p:txBody>
@@ -13095,7 +14502,7 @@
           </p:pic>
           <p:sp>
             <p:nvSpPr>
-              <p:cNvPr id="256" name="src/net"/>
+              <p:cNvPr id="256" name="app/net"/>
               <p:cNvSpPr/>
               <p:nvPr/>
             </p:nvSpPr>
@@ -13139,7 +14546,7 @@
               <a:p>
                 <a:pPr/>
                 <a:r>
-                  <a:t>src/net</a:t>
+                  <a:t>app/net</a:t>
                 </a:r>
               </a:p>
             </p:txBody>
@@ -13357,7 +14764,7 @@
           </p:pic>
           <p:sp>
             <p:nvSpPr>
-              <p:cNvPr id="264" name="src/net_err"/>
+              <p:cNvPr id="264" name="app/net_err"/>
               <p:cNvSpPr txBox="1"/>
               <p:nvPr/>
             </p:nvSpPr>
@@ -13401,7 +14808,7 @@
               <a:p>
                 <a:pPr/>
                 <a:r>
-                  <a:t>src/net_err</a:t>
+                  <a:t>app/net_err</a:t>
                 </a:r>
               </a:p>
             </p:txBody>
@@ -13619,7 +15026,7 @@
           </p:pic>
           <p:sp>
             <p:nvSpPr>
-              <p:cNvPr id="272" name="src/netErr"/>
+              <p:cNvPr id="272" name="app/netErr"/>
               <p:cNvSpPr/>
               <p:nvPr/>
             </p:nvSpPr>
@@ -13663,7 +15070,7 @@
               <a:p>
                 <a:pPr/>
                 <a:r>
-                  <a:t>src/netErr</a:t>
+                  <a:t>app/netErr</a:t>
                 </a:r>
               </a:p>
             </p:txBody>
@@ -13881,7 +15288,7 @@
           </p:pic>
           <p:sp>
             <p:nvSpPr>
-              <p:cNvPr id="280" name="src/utils"/>
+              <p:cNvPr id="280" name="app/utils"/>
               <p:cNvSpPr/>
               <p:nvPr/>
             </p:nvSpPr>
@@ -13925,7 +15332,7 @@
               <a:p>
                 <a:pPr/>
                 <a:r>
-                  <a:t>src/utils</a:t>
+                  <a:t>app/utils</a:t>
                 </a:r>
               </a:p>
             </p:txBody>
@@ -13993,7 +15400,7 @@
           </p:pic>
           <p:sp>
             <p:nvSpPr>
-              <p:cNvPr id="284" name="src/pkg"/>
+              <p:cNvPr id="284" name="app/pkg"/>
               <p:cNvSpPr/>
               <p:nvPr/>
             </p:nvSpPr>
@@ -14037,7 +15444,7 @@
               <a:p>
                 <a:pPr/>
                 <a:r>
-                  <a:t>src/pkg</a:t>
+                  <a:t>app/pkg</a:t>
                 </a:r>
               </a:p>
             </p:txBody>
@@ -14090,7 +15497,7 @@
           </p:pic>
           <p:sp>
             <p:nvSpPr>
-              <p:cNvPr id="287" name="src/sub_pkg"/>
+              <p:cNvPr id="287" name="app/sub_pkg"/>
               <p:cNvSpPr txBox="1"/>
               <p:nvPr/>
             </p:nvSpPr>
@@ -14134,7 +15541,7 @@
               <a:p>
                 <a:pPr/>
                 <a:r>
-                  <a:t>src/sub_pkg</a:t>
+                  <a:t>app/sub_pkg</a:t>
                 </a:r>
               </a:p>
             </p:txBody>
@@ -14187,7 +15594,7 @@
           </p:pic>
           <p:sp>
             <p:nvSpPr>
-              <p:cNvPr id="290" name="src/sub_pkg"/>
+              <p:cNvPr id="290" name="app/sub_pkg"/>
               <p:cNvSpPr txBox="1"/>
               <p:nvPr/>
             </p:nvSpPr>
@@ -14231,7 +15638,7 @@
               <a:p>
                 <a:pPr/>
                 <a:r>
-                  <a:t>src/sub_pkg</a:t>
+                  <a:t>app/sub_pkg</a:t>
                 </a:r>
               </a:p>
             </p:txBody>
@@ -14284,7 +15691,7 @@
           </p:pic>
           <p:sp>
             <p:nvSpPr>
-              <p:cNvPr id="293" name="src/sub_pkg"/>
+              <p:cNvPr id="293" name="app/sub_pkg"/>
               <p:cNvSpPr txBox="1"/>
               <p:nvPr/>
             </p:nvSpPr>
@@ -14328,7 +15735,7 @@
               <a:p>
                 <a:pPr/>
                 <a:r>
-                  <a:t>src/sub_pkg</a:t>
+                  <a:t>app/sub_pkg</a:t>
                 </a:r>
               </a:p>
             </p:txBody>
@@ -14454,7 +15861,7 @@
           </p:pic>
           <p:sp>
             <p:nvSpPr>
-              <p:cNvPr id="299" name="src/network"/>
+              <p:cNvPr id="299" name="app/network"/>
               <p:cNvSpPr txBox="1"/>
               <p:nvPr/>
             </p:nvSpPr>
@@ -14498,7 +15905,7 @@
               <a:p>
                 <a:pPr/>
                 <a:r>
-                  <a:t>src/network</a:t>
+                  <a:t>app/network</a:t>
                 </a:r>
               </a:p>
             </p:txBody>
@@ -14869,7 +16276,7 @@
           </p:pic>
           <p:sp>
             <p:nvSpPr>
-              <p:cNvPr id="310" name="src/pkg"/>
+              <p:cNvPr id="310" name="app/pkg"/>
               <p:cNvSpPr/>
               <p:nvPr/>
             </p:nvSpPr>
@@ -14913,7 +16320,7 @@
               <a:p>
                 <a:pPr/>
                 <a:r>
-                  <a:t>src/pkg</a:t>
+                  <a:t>app/pkg</a:t>
                 </a:r>
               </a:p>
             </p:txBody>
@@ -15553,7 +16960,7 @@
                             </p:stCondLst>
                             <p:childTnLst>
                               <p:par>
-                                <p:cTn id="32" presetClass="entr" nodeType="afterEffect" presetSubtype="0" presetID="1" grpId="7" fill="hold">
+                                <p:cTn id="32" presetClass="entr" nodeType="afterEffect" presetSubtype="8" presetID="22" grpId="7" fill="hold">
                                   <p:stCondLst>
                                     <p:cond delay="0"/>
                                   </p:stCondLst>
@@ -15564,6 +16971,49 @@
                                     <p:set>
                                       <p:cBhvr>
                                         <p:cTn id="33" fill="hold"/>
+                                        <p:tgtEl>
+                                          <p:spTgt spid="274"/>
+                                        </p:tgtEl>
+                                        <p:attrNameLst>
+                                          <p:attrName>style.visibility</p:attrName>
+                                        </p:attrNameLst>
+                                      </p:cBhvr>
+                                      <p:to>
+                                        <p:strVal val="visible"/>
+                                      </p:to>
+                                    </p:set>
+                                    <p:animEffect filter="wipe(left)" transition="in">
+                                      <p:cBhvr>
+                                        <p:cTn id="34" dur="700"/>
+                                        <p:tgtEl>
+                                          <p:spTgt spid="274"/>
+                                        </p:tgtEl>
+                                      </p:cBhvr>
+                                    </p:animEffect>
+                                  </p:childTnLst>
+                                </p:cTn>
+                              </p:par>
+                            </p:childTnLst>
+                          </p:cTn>
+                        </p:par>
+                        <p:par>
+                          <p:cTn id="35" fill="hold">
+                            <p:stCondLst>
+                              <p:cond delay="1400"/>
+                            </p:stCondLst>
+                            <p:childTnLst>
+                              <p:par>
+                                <p:cTn id="36" presetClass="entr" nodeType="afterEffect" presetSubtype="0" presetID="1" grpId="8" fill="hold">
+                                  <p:stCondLst>
+                                    <p:cond delay="0"/>
+                                  </p:stCondLst>
+                                  <p:iterate type="el" backwards="0">
+                                    <p:tmAbs val="0"/>
+                                  </p:iterate>
+                                  <p:childTnLst>
+                                    <p:set>
+                                      <p:cBhvr>
+                                        <p:cTn id="37" fill="hold"/>
                                         <p:tgtEl>
                                           <p:spTgt spid="259"/>
                                         </p:tgtEl>
@@ -15582,22 +17032,98 @@
                           </p:cTn>
                         </p:par>
                         <p:par>
-                          <p:cTn id="34" fill="hold">
+                          <p:cTn id="38" fill="hold">
+                            <p:stCondLst>
+                              <p:cond delay="1400"/>
+                            </p:stCondLst>
+                            <p:childTnLst>
+                              <p:par>
+                                <p:cTn id="39" presetClass="entr" nodeType="afterEffect" presetSubtype="0" presetID="1" grpId="9" fill="hold">
+                                  <p:stCondLst>
+                                    <p:cond delay="0"/>
+                                  </p:stCondLst>
+                                  <p:iterate type="el" backwards="0">
+                                    <p:tmAbs val="0"/>
+                                  </p:iterate>
+                                  <p:childTnLst>
+                                    <p:set>
+                                      <p:cBhvr>
+                                        <p:cTn id="40" fill="hold"/>
+                                        <p:tgtEl>
+                                          <p:spTgt spid="267"/>
+                                        </p:tgtEl>
+                                        <p:attrNameLst>
+                                          <p:attrName>style.visibility</p:attrName>
+                                        </p:attrNameLst>
+                                      </p:cBhvr>
+                                      <p:to>
+                                        <p:strVal val="visible"/>
+                                      </p:to>
+                                    </p:set>
+                                  </p:childTnLst>
+                                </p:cTn>
+                              </p:par>
+                            </p:childTnLst>
+                          </p:cTn>
+                        </p:par>
+                        <p:par>
+                          <p:cTn id="41" fill="hold">
                             <p:stCondLst>
                               <p:cond delay="0"/>
                             </p:stCondLst>
                             <p:childTnLst>
                               <p:par>
-                                <p:cTn id="35" presetClass="emph" nodeType="afterEffect" presetSubtype="0" presetID="35" grpId="8" repeatCount="3000" fill="hold">
+                                <p:cTn id="42" presetClass="emph" nodeType="afterEffect" presetSubtype="0" presetID="35" grpId="10" repeatCount="3000" fill="hold">
                                   <p:stCondLst>
                                     <p:cond delay="0"/>
                                   </p:stCondLst>
                                   <p:childTnLst>
                                     <p:anim calcmode="discrete" valueType="str">
                                       <p:cBhvr>
-                                        <p:cTn id="36" dur="700" fill="hold"/>
+                                        <p:cTn id="43" dur="700" fill="hold"/>
                                         <p:tgtEl>
                                           <p:spTgt spid="259"/>
+                                        </p:tgtEl>
+                                        <p:attrNameLst>
+                                          <p:attrName>style.visibility</p:attrName>
+                                        </p:attrNameLst>
+                                      </p:cBhvr>
+                                      <p:tavLst>
+                                        <p:tav tm="0">
+                                          <p:val>
+                                            <p:strVal val="hidden"/>
+                                          </p:val>
+                                        </p:tav>
+                                        <p:tav tm="50000">
+                                          <p:val>
+                                            <p:strVal val="visible"/>
+                                          </p:val>
+                                        </p:tav>
+                                      </p:tavLst>
+                                    </p:anim>
+                                  </p:childTnLst>
+                                </p:cTn>
+                              </p:par>
+                            </p:childTnLst>
+                          </p:cTn>
+                        </p:par>
+                        <p:par>
+                          <p:cTn id="44" fill="hold">
+                            <p:stCondLst>
+                              <p:cond delay="0"/>
+                            </p:stCondLst>
+                            <p:childTnLst>
+                              <p:par>
+                                <p:cTn id="45" presetClass="emph" nodeType="withEffect" presetSubtype="0" presetID="35" grpId="11" repeatCount="3000" fill="hold">
+                                  <p:stCondLst>
+                                    <p:cond delay="0"/>
+                                  </p:stCondLst>
+                                  <p:childTnLst>
+                                    <p:anim calcmode="discrete" valueType="str">
+                                      <p:cBhvr>
+                                        <p:cTn id="46" dur="700" fill="hold"/>
+                                        <p:tgtEl>
+                                          <p:spTgt spid="267"/>
                                         </p:tgtEl>
                                         <p:attrNameLst>
                                           <p:attrName>style.visibility</p:attrName>
@@ -15626,19 +17152,19 @@
                     </p:cTn>
                   </p:par>
                   <p:par>
-                    <p:cTn id="37" fill="hold">
+                    <p:cTn id="47" fill="hold">
                       <p:stCondLst>
                         <p:cond delay="indefinite"/>
                       </p:stCondLst>
                       <p:childTnLst>
                         <p:par>
-                          <p:cTn id="38" fill="hold">
+                          <p:cTn id="48" fill="hold">
                             <p:stCondLst>
                               <p:cond delay="0"/>
                             </p:stCondLst>
                             <p:childTnLst>
                               <p:par>
-                                <p:cTn id="39" presetClass="entr" nodeType="clickEffect" presetSubtype="8" presetID="22" grpId="9" fill="hold">
+                                <p:cTn id="49" presetClass="entr" nodeType="clickEffect" presetSubtype="8" presetID="22" grpId="12" fill="hold">
                                   <p:stCondLst>
                                     <p:cond delay="0"/>
                                   </p:stCondLst>
@@ -15648,9 +17174,9 @@
                                   <p:childTnLst>
                                     <p:set>
                                       <p:cBhvr>
-                                        <p:cTn id="40" fill="hold"/>
-                                        <p:tgtEl>
-                                          <p:spTgt spid="274"/>
+                                        <p:cTn id="50" fill="hold"/>
+                                        <p:tgtEl>
+                                          <p:spTgt spid="282"/>
                                         </p:tgtEl>
                                         <p:attrNameLst>
                                           <p:attrName>style.visibility</p:attrName>
@@ -15662,9 +17188,9 @@
                                     </p:set>
                                     <p:animEffect filter="wipe(left)" transition="in">
                                       <p:cBhvr>
-                                        <p:cTn id="41" dur="700"/>
-                                        <p:tgtEl>
-                                          <p:spTgt spid="274"/>
+                                        <p:cTn id="51" dur="700"/>
+                                        <p:tgtEl>
+                                          <p:spTgt spid="282"/>
                                         </p:tgtEl>
                                       </p:cBhvr>
                                     </p:animEffect>
@@ -15675,13 +17201,13 @@
                           </p:cTn>
                         </p:par>
                         <p:par>
-                          <p:cTn id="42" fill="hold">
+                          <p:cTn id="52" fill="hold">
                             <p:stCondLst>
                               <p:cond delay="700"/>
                             </p:stCondLst>
                             <p:childTnLst>
                               <p:par>
-                                <p:cTn id="43" presetClass="entr" nodeType="afterEffect" presetSubtype="0" presetID="1" grpId="10" fill="hold">
+                                <p:cTn id="53" presetClass="entr" nodeType="afterEffect" presetSubtype="0" presetID="1" grpId="13" fill="hold">
                                   <p:stCondLst>
                                     <p:cond delay="0"/>
                                   </p:stCondLst>
@@ -15691,9 +17217,9 @@
                                   <p:childTnLst>
                                     <p:set>
                                       <p:cBhvr>
-                                        <p:cTn id="44" fill="hold"/>
-                                        <p:tgtEl>
-                                          <p:spTgt spid="267"/>
+                                        <p:cTn id="54" fill="hold"/>
+                                        <p:tgtEl>
+                                          <p:spTgt spid="275"/>
                                         </p:tgtEl>
                                         <p:attrNameLst>
                                           <p:attrName>style.visibility</p:attrName>
@@ -15710,22 +17236,22 @@
                           </p:cTn>
                         </p:par>
                         <p:par>
-                          <p:cTn id="45" fill="hold">
+                          <p:cTn id="55" fill="hold">
                             <p:stCondLst>
                               <p:cond delay="0"/>
                             </p:stCondLst>
                             <p:childTnLst>
                               <p:par>
-                                <p:cTn id="46" presetClass="emph" nodeType="afterEffect" presetSubtype="0" presetID="35" grpId="11" repeatCount="3000" fill="hold">
+                                <p:cTn id="56" presetClass="emph" nodeType="afterEffect" presetSubtype="0" presetID="35" grpId="14" repeatCount="3000" fill="hold">
                                   <p:stCondLst>
                                     <p:cond delay="0"/>
                                   </p:stCondLst>
                                   <p:childTnLst>
                                     <p:anim calcmode="discrete" valueType="str">
                                       <p:cBhvr>
-                                        <p:cTn id="47" dur="700" fill="hold"/>
-                                        <p:tgtEl>
-                                          <p:spTgt spid="267"/>
+                                        <p:cTn id="57" dur="700" fill="hold"/>
+                                        <p:tgtEl>
+                                          <p:spTgt spid="275"/>
                                         </p:tgtEl>
                                         <p:attrNameLst>
                                           <p:attrName>style.visibility</p:attrName>
@@ -15754,19 +17280,19 @@
                     </p:cTn>
                   </p:par>
                   <p:par>
-                    <p:cTn id="48" fill="hold">
+                    <p:cTn id="58" fill="hold">
                       <p:stCondLst>
                         <p:cond delay="indefinite"/>
                       </p:stCondLst>
                       <p:childTnLst>
                         <p:par>
-                          <p:cTn id="49" fill="hold">
+                          <p:cTn id="59" fill="hold">
                             <p:stCondLst>
                               <p:cond delay="0"/>
                             </p:stCondLst>
                             <p:childTnLst>
                               <p:par>
-                                <p:cTn id="50" presetClass="entr" nodeType="clickEffect" presetSubtype="8" presetID="22" grpId="12" fill="hold">
+                                <p:cTn id="60" presetClass="entr" nodeType="clickEffect" presetSubtype="8" presetID="22" grpId="15" fill="hold">
                                   <p:stCondLst>
                                     <p:cond delay="0"/>
                                   </p:stCondLst>
@@ -15776,9 +17302,9 @@
                                   <p:childTnLst>
                                     <p:set>
                                       <p:cBhvr>
-                                        <p:cTn id="51" fill="hold"/>
-                                        <p:tgtEl>
-                                          <p:spTgt spid="282"/>
+                                        <p:cTn id="61" fill="hold"/>
+                                        <p:tgtEl>
+                                          <p:spTgt spid="295"/>
                                         </p:tgtEl>
                                         <p:attrNameLst>
                                           <p:attrName>style.visibility</p:attrName>
@@ -15790,9 +17316,9 @@
                                     </p:set>
                                     <p:animEffect filter="wipe(left)" transition="in">
                                       <p:cBhvr>
-                                        <p:cTn id="52" dur="700"/>
-                                        <p:tgtEl>
-                                          <p:spTgt spid="282"/>
+                                        <p:cTn id="62" dur="700"/>
+                                        <p:tgtEl>
+                                          <p:spTgt spid="295"/>
                                         </p:tgtEl>
                                       </p:cBhvr>
                                     </p:animEffect>
@@ -15803,13 +17329,13 @@
                           </p:cTn>
                         </p:par>
                         <p:par>
-                          <p:cTn id="53" fill="hold">
+                          <p:cTn id="63" fill="hold">
                             <p:stCondLst>
                               <p:cond delay="700"/>
                             </p:stCondLst>
                             <p:childTnLst>
                               <p:par>
-                                <p:cTn id="54" presetClass="entr" nodeType="afterEffect" presetSubtype="0" presetID="1" grpId="13" fill="hold">
+                                <p:cTn id="64" presetClass="entr" nodeType="afterEffect" presetSubtype="0" presetID="1" grpId="16" fill="hold">
                                   <p:stCondLst>
                                     <p:cond delay="0"/>
                                   </p:stCondLst>
@@ -15819,9 +17345,9 @@
                                   <p:childTnLst>
                                     <p:set>
                                       <p:cBhvr>
-                                        <p:cTn id="55" fill="hold"/>
-                                        <p:tgtEl>
-                                          <p:spTgt spid="275"/>
+                                        <p:cTn id="65" fill="hold"/>
+                                        <p:tgtEl>
+                                          <p:spTgt spid="296"/>
                                         </p:tgtEl>
                                         <p:attrNameLst>
                                           <p:attrName>style.visibility</p:attrName>
@@ -15838,22 +17364,22 @@
                           </p:cTn>
                         </p:par>
                         <p:par>
-                          <p:cTn id="56" fill="hold">
+                          <p:cTn id="66" fill="hold">
                             <p:stCondLst>
                               <p:cond delay="0"/>
                             </p:stCondLst>
                             <p:childTnLst>
                               <p:par>
-                                <p:cTn id="57" presetClass="emph" nodeType="afterEffect" presetSubtype="0" presetID="35" grpId="14" repeatCount="3000" fill="hold">
+                                <p:cTn id="67" presetClass="emph" nodeType="afterEffect" presetSubtype="0" presetID="35" grpId="17" repeatCount="3000" fill="hold">
                                   <p:stCondLst>
                                     <p:cond delay="0"/>
                                   </p:stCondLst>
                                   <p:childTnLst>
                                     <p:anim calcmode="discrete" valueType="str">
                                       <p:cBhvr>
-                                        <p:cTn id="58" dur="700" fill="hold"/>
-                                        <p:tgtEl>
-                                          <p:spTgt spid="275"/>
+                                        <p:cTn id="68" dur="700" fill="hold"/>
+                                        <p:tgtEl>
+                                          <p:spTgt spid="296"/>
                                         </p:tgtEl>
                                         <p:attrNameLst>
                                           <p:attrName>style.visibility</p:attrName>
@@ -15882,19 +17408,19 @@
                     </p:cTn>
                   </p:par>
                   <p:par>
-                    <p:cTn id="59" fill="hold">
+                    <p:cTn id="69" fill="hold">
                       <p:stCondLst>
                         <p:cond delay="indefinite"/>
                       </p:stCondLst>
                       <p:childTnLst>
                         <p:par>
-                          <p:cTn id="60" fill="hold">
+                          <p:cTn id="70" fill="hold">
                             <p:stCondLst>
                               <p:cond delay="0"/>
                             </p:stCondLst>
                             <p:childTnLst>
                               <p:par>
-                                <p:cTn id="61" presetClass="entr" nodeType="clickEffect" presetSubtype="8" presetID="22" grpId="15" fill="hold">
+                                <p:cTn id="71" presetClass="entr" nodeType="clickEffect" presetSubtype="8" presetID="22" grpId="18" fill="hold">
                                   <p:stCondLst>
                                     <p:cond delay="0"/>
                                   </p:stCondLst>
@@ -15904,9 +17430,9 @@
                                   <p:childTnLst>
                                     <p:set>
                                       <p:cBhvr>
-                                        <p:cTn id="62" fill="hold"/>
-                                        <p:tgtEl>
-                                          <p:spTgt spid="295"/>
+                                        <p:cTn id="72" fill="hold"/>
+                                        <p:tgtEl>
+                                          <p:spTgt spid="304"/>
                                         </p:tgtEl>
                                         <p:attrNameLst>
                                           <p:attrName>style.visibility</p:attrName>
@@ -15918,9 +17444,9 @@
                                     </p:set>
                                     <p:animEffect filter="wipe(left)" transition="in">
                                       <p:cBhvr>
-                                        <p:cTn id="63" dur="700"/>
-                                        <p:tgtEl>
-                                          <p:spTgt spid="295"/>
+                                        <p:cTn id="73" dur="700"/>
+                                        <p:tgtEl>
+                                          <p:spTgt spid="304"/>
                                         </p:tgtEl>
                                       </p:cBhvr>
                                     </p:animEffect>
@@ -15931,13 +17457,13 @@
                           </p:cTn>
                         </p:par>
                         <p:par>
-                          <p:cTn id="64" fill="hold">
+                          <p:cTn id="74" fill="hold">
                             <p:stCondLst>
                               <p:cond delay="700"/>
                             </p:stCondLst>
                             <p:childTnLst>
                               <p:par>
-                                <p:cTn id="65" presetClass="entr" nodeType="afterEffect" presetSubtype="0" presetID="1" grpId="16" fill="hold">
+                                <p:cTn id="75" presetClass="entr" nodeType="afterEffect" presetSubtype="0" presetID="15" grpId="19" fill="hold">
                                   <p:stCondLst>
                                     <p:cond delay="0"/>
                                   </p:stCondLst>
@@ -15947,135 +17473,7 @@
                                   <p:childTnLst>
                                     <p:set>
                                       <p:cBhvr>
-                                        <p:cTn id="66" fill="hold"/>
-                                        <p:tgtEl>
-                                          <p:spTgt spid="296"/>
-                                        </p:tgtEl>
-                                        <p:attrNameLst>
-                                          <p:attrName>style.visibility</p:attrName>
-                                        </p:attrNameLst>
-                                      </p:cBhvr>
-                                      <p:to>
-                                        <p:strVal val="visible"/>
-                                      </p:to>
-                                    </p:set>
-                                  </p:childTnLst>
-                                </p:cTn>
-                              </p:par>
-                            </p:childTnLst>
-                          </p:cTn>
-                        </p:par>
-                        <p:par>
-                          <p:cTn id="67" fill="hold">
-                            <p:stCondLst>
-                              <p:cond delay="0"/>
-                            </p:stCondLst>
-                            <p:childTnLst>
-                              <p:par>
-                                <p:cTn id="68" presetClass="emph" nodeType="afterEffect" presetSubtype="0" presetID="35" grpId="17" repeatCount="3000" fill="hold">
-                                  <p:stCondLst>
-                                    <p:cond delay="0"/>
-                                  </p:stCondLst>
-                                  <p:childTnLst>
-                                    <p:anim calcmode="discrete" valueType="str">
-                                      <p:cBhvr>
-                                        <p:cTn id="69" dur="700" fill="hold"/>
-                                        <p:tgtEl>
-                                          <p:spTgt spid="296"/>
-                                        </p:tgtEl>
-                                        <p:attrNameLst>
-                                          <p:attrName>style.visibility</p:attrName>
-                                        </p:attrNameLst>
-                                      </p:cBhvr>
-                                      <p:tavLst>
-                                        <p:tav tm="0">
-                                          <p:val>
-                                            <p:strVal val="hidden"/>
-                                          </p:val>
-                                        </p:tav>
-                                        <p:tav tm="50000">
-                                          <p:val>
-                                            <p:strVal val="visible"/>
-                                          </p:val>
-                                        </p:tav>
-                                      </p:tavLst>
-                                    </p:anim>
-                                  </p:childTnLst>
-                                </p:cTn>
-                              </p:par>
-                            </p:childTnLst>
-                          </p:cTn>
-                        </p:par>
-                      </p:childTnLst>
-                    </p:cTn>
-                  </p:par>
-                  <p:par>
-                    <p:cTn id="70" fill="hold">
-                      <p:stCondLst>
-                        <p:cond delay="indefinite"/>
-                      </p:stCondLst>
-                      <p:childTnLst>
-                        <p:par>
-                          <p:cTn id="71" fill="hold">
-                            <p:stCondLst>
-                              <p:cond delay="0"/>
-                            </p:stCondLst>
-                            <p:childTnLst>
-                              <p:par>
-                                <p:cTn id="72" presetClass="entr" nodeType="clickEffect" presetSubtype="8" presetID="22" grpId="18" fill="hold">
-                                  <p:stCondLst>
-                                    <p:cond delay="0"/>
-                                  </p:stCondLst>
-                                  <p:iterate type="el" backwards="0">
-                                    <p:tmAbs val="0"/>
-                                  </p:iterate>
-                                  <p:childTnLst>
-                                    <p:set>
-                                      <p:cBhvr>
-                                        <p:cTn id="73" fill="hold"/>
-                                        <p:tgtEl>
-                                          <p:spTgt spid="304"/>
-                                        </p:tgtEl>
-                                        <p:attrNameLst>
-                                          <p:attrName>style.visibility</p:attrName>
-                                        </p:attrNameLst>
-                                      </p:cBhvr>
-                                      <p:to>
-                                        <p:strVal val="visible"/>
-                                      </p:to>
-                                    </p:set>
-                                    <p:animEffect filter="wipe(left)" transition="in">
-                                      <p:cBhvr>
-                                        <p:cTn id="74" dur="700"/>
-                                        <p:tgtEl>
-                                          <p:spTgt spid="304"/>
-                                        </p:tgtEl>
-                                      </p:cBhvr>
-                                    </p:animEffect>
-                                  </p:childTnLst>
-                                </p:cTn>
-                              </p:par>
-                            </p:childTnLst>
-                          </p:cTn>
-                        </p:par>
-                        <p:par>
-                          <p:cTn id="75" fill="hold">
-                            <p:stCondLst>
-                              <p:cond delay="700"/>
-                            </p:stCondLst>
-                            <p:childTnLst>
-                              <p:par>
-                                <p:cTn id="76" presetClass="entr" nodeType="afterEffect" presetSubtype="0" presetID="15" grpId="19" fill="hold">
-                                  <p:stCondLst>
-                                    <p:cond delay="0"/>
-                                  </p:stCondLst>
-                                  <p:iterate type="el" backwards="0">
-                                    <p:tmAbs val="0"/>
-                                  </p:iterate>
-                                  <p:childTnLst>
-                                    <p:set>
-                                      <p:cBhvr>
-                                        <p:cTn id="77" fill="hold"/>
+                                        <p:cTn id="76" fill="hold"/>
                                         <p:tgtEl>
                                           <p:spTgt spid="297"/>
                                         </p:tgtEl>
@@ -16089,7 +17487,7 @@
                                     </p:set>
                                     <p:anim calcmode="lin" valueType="num">
                                       <p:cBhvr>
-                                        <p:cTn id="78" dur="500" fill="hold"/>
+                                        <p:cTn id="77" dur="500" fill="hold"/>
                                         <p:tgtEl>
                                           <p:spTgt spid="297"/>
                                         </p:tgtEl>
@@ -16112,7 +17510,7 @@
                                     </p:anim>
                                     <p:anim calcmode="lin" valueType="num">
                                       <p:cBhvr>
-                                        <p:cTn id="79" dur="500" fill="hold"/>
+                                        <p:cTn id="78" dur="500" fill="hold"/>
                                         <p:tgtEl>
                                           <p:spTgt spid="297"/>
                                         </p:tgtEl>
@@ -16135,7 +17533,7 @@
                                     </p:anim>
                                     <p:anim calcmode="lin" valueType="num">
                                       <p:cBhvr>
-                                        <p:cTn id="80" dur="500" fill="hold"/>
+                                        <p:cTn id="79" dur="500" fill="hold"/>
                                         <p:tgtEl>
                                           <p:spTgt spid="297"/>
                                         </p:tgtEl>
@@ -16158,7 +17556,7 @@
                                     </p:anim>
                                     <p:anim calcmode="lin" valueType="num">
                                       <p:cBhvr>
-                                        <p:cTn id="81" dur="500" fill="hold"/>
+                                        <p:cTn id="80" dur="500" fill="hold"/>
                                         <p:tgtEl>
                                           <p:spTgt spid="297"/>
                                         </p:tgtEl>
@@ -16189,19 +17587,19 @@
                     </p:cTn>
                   </p:par>
                   <p:par>
-                    <p:cTn id="82" fill="hold">
+                    <p:cTn id="81" fill="hold">
                       <p:stCondLst>
                         <p:cond delay="indefinite"/>
                       </p:stCondLst>
                       <p:childTnLst>
                         <p:par>
-                          <p:cTn id="83" fill="hold">
+                          <p:cTn id="82" fill="hold">
                             <p:stCondLst>
                               <p:cond delay="0"/>
                             </p:stCondLst>
                             <p:childTnLst>
                               <p:par>
-                                <p:cTn id="84" presetClass="entr" nodeType="clickEffect" presetSubtype="8" presetID="22" grpId="20" fill="hold">
+                                <p:cTn id="83" presetClass="entr" nodeType="clickEffect" presetSubtype="8" presetID="22" grpId="20" fill="hold">
                                   <p:stCondLst>
                                     <p:cond delay="0"/>
                                   </p:stCondLst>
@@ -16211,7 +17609,7 @@
                                   <p:childTnLst>
                                     <p:set>
                                       <p:cBhvr>
-                                        <p:cTn id="85" fill="hold"/>
+                                        <p:cTn id="84" fill="hold"/>
                                         <p:tgtEl>
                                           <p:spTgt spid="318"/>
                                         </p:tgtEl>
@@ -16225,7 +17623,7 @@
                                     </p:set>
                                     <p:animEffect filter="wipe(left)" transition="in">
                                       <p:cBhvr>
-                                        <p:cTn id="86" dur="700"/>
+                                        <p:cTn id="85" dur="700"/>
                                         <p:tgtEl>
                                           <p:spTgt spid="318"/>
                                         </p:tgtEl>
@@ -16238,13 +17636,13 @@
                           </p:cTn>
                         </p:par>
                         <p:par>
-                          <p:cTn id="87" fill="hold">
+                          <p:cTn id="86" fill="hold">
                             <p:stCondLst>
                               <p:cond delay="700"/>
                             </p:stCondLst>
                             <p:childTnLst>
                               <p:par>
-                                <p:cTn id="88" presetClass="entr" nodeType="afterEffect" presetSubtype="0" presetID="1" grpId="21" fill="hold">
+                                <p:cTn id="87" presetClass="entr" nodeType="afterEffect" presetSubtype="0" presetID="1" grpId="21" fill="hold">
                                   <p:stCondLst>
                                     <p:cond delay="0"/>
                                   </p:stCondLst>
@@ -16254,7 +17652,7 @@
                                   <p:childTnLst>
                                     <p:set>
                                       <p:cBhvr>
-                                        <p:cTn id="89" fill="hold"/>
+                                        <p:cTn id="88" fill="hold"/>
                                         <p:tgtEl>
                                           <p:spTgt spid="305"/>
                                         </p:tgtEl>
@@ -16273,20 +17671,20 @@
                           </p:cTn>
                         </p:par>
                         <p:par>
-                          <p:cTn id="90" fill="hold">
+                          <p:cTn id="89" fill="hold">
                             <p:stCondLst>
                               <p:cond delay="0"/>
                             </p:stCondLst>
                             <p:childTnLst>
                               <p:par>
-                                <p:cTn id="91" presetClass="emph" nodeType="afterEffect" presetSubtype="0" presetID="35" grpId="22" repeatCount="3000" fill="hold">
+                                <p:cTn id="90" presetClass="emph" nodeType="afterEffect" presetSubtype="0" presetID="35" grpId="22" repeatCount="3000" fill="hold">
                                   <p:stCondLst>
                                     <p:cond delay="0"/>
                                   </p:stCondLst>
                                   <p:childTnLst>
                                     <p:anim calcmode="discrete" valueType="str">
                                       <p:cBhvr>
-                                        <p:cTn id="92" dur="700" fill="hold"/>
+                                        <p:cTn id="91" dur="700" fill="hold"/>
                                         <p:tgtEl>
                                           <p:spTgt spid="305"/>
                                         </p:tgtEl>
@@ -16338,28 +17736,28 @@
       </p:par>
     </p:tnLst>
     <p:bldLst>
+      <p:bldP build="whole" bldLvl="1" animBg="1" rev="0" advAuto="0" spid="318" grpId="20"/>
+      <p:bldP build="whole" bldLvl="1" animBg="1" rev="0" advAuto="0" spid="266" grpId="6"/>
+      <p:bldP build="whole" bldLvl="1" animBg="1" rev="0" advAuto="0" spid="267" grpId="9"/>
+      <p:bldP build="whole" bldLvl="1" animBg="1" rev="0" advAuto="0" spid="267" grpId="11"/>
+      <p:bldP build="whole" bldLvl="1" animBg="1" rev="0" advAuto="0" spid="243" grpId="2"/>
+      <p:bldP build="whole" bldLvl="1" animBg="1" rev="0" advAuto="0" spid="296" grpId="16"/>
+      <p:bldP build="whole" bldLvl="1" animBg="1" rev="0" advAuto="0" spid="250" grpId="1"/>
+      <p:bldP build="whole" bldLvl="1" animBg="1" rev="0" advAuto="0" spid="296" grpId="17"/>
+      <p:bldP build="whole" bldLvl="1" animBg="1" rev="0" advAuto="0" spid="297" grpId="19"/>
+      <p:bldP build="whole" bldLvl="1" animBg="1" rev="0" advAuto="0" spid="258" grpId="3"/>
+      <p:bldP build="whole" bldLvl="1" animBg="1" rev="0" advAuto="0" spid="274" grpId="7"/>
+      <p:bldP build="whole" bldLvl="1" animBg="1" rev="0" advAuto="0" spid="251" grpId="4"/>
+      <p:bldP build="whole" bldLvl="1" animBg="1" rev="0" advAuto="0" spid="251" grpId="5"/>
       <p:bldP build="whole" bldLvl="1" animBg="1" rev="0" advAuto="0" spid="259" grpId="8"/>
-      <p:bldP build="whole" bldLvl="1" animBg="1" rev="0" advAuto="0" spid="304" grpId="18"/>
-      <p:bldP build="whole" bldLvl="1" animBg="1" rev="0" advAuto="0" spid="266" grpId="6"/>
+      <p:bldP build="whole" bldLvl="1" animBg="1" rev="0" advAuto="0" spid="259" grpId="10"/>
       <p:bldP build="whole" bldLvl="1" animBg="1" rev="0" advAuto="0" spid="295" grpId="15"/>
       <p:bldP build="whole" bldLvl="1" animBg="1" rev="0" advAuto="0" spid="275" grpId="13"/>
       <p:bldP build="whole" bldLvl="1" animBg="1" rev="0" advAuto="0" spid="275" grpId="14"/>
-      <p:bldP build="whole" bldLvl="1" animBg="1" rev="0" advAuto="0" spid="296" grpId="16"/>
-      <p:bldP build="whole" bldLvl="1" animBg="1" rev="0" advAuto="0" spid="296" grpId="17"/>
-      <p:bldP build="whole" bldLvl="1" animBg="1" rev="0" advAuto="0" spid="274" grpId="9"/>
-      <p:bldP build="whole" bldLvl="1" animBg="1" rev="0" advAuto="0" spid="251" grpId="4"/>
-      <p:bldP build="whole" bldLvl="1" animBg="1" rev="0" advAuto="0" spid="251" grpId="5"/>
-      <p:bldP build="whole" bldLvl="1" animBg="1" rev="0" advAuto="0" spid="297" grpId="19"/>
-      <p:bldP build="whole" bldLvl="1" animBg="1" rev="0" advAuto="0" spid="243" grpId="2"/>
       <p:bldP build="whole" bldLvl="1" animBg="1" rev="0" advAuto="0" spid="282" grpId="12"/>
-      <p:bldP build="whole" bldLvl="1" animBg="1" rev="0" advAuto="0" spid="267" grpId="10"/>
-      <p:bldP build="whole" bldLvl="1" animBg="1" rev="0" advAuto="0" spid="267" grpId="11"/>
-      <p:bldP build="whole" bldLvl="1" animBg="1" rev="0" advAuto="0" spid="318" grpId="20"/>
-      <p:bldP build="whole" bldLvl="1" animBg="1" rev="0" advAuto="0" spid="250" grpId="1"/>
+      <p:bldP build="whole" bldLvl="1" animBg="1" rev="0" advAuto="0" spid="304" grpId="18"/>
       <p:bldP build="whole" bldLvl="1" animBg="1" rev="0" advAuto="0" spid="305" grpId="21"/>
       <p:bldP build="whole" bldLvl="1" animBg="1" rev="0" advAuto="0" spid="305" grpId="22"/>
-      <p:bldP build="whole" bldLvl="1" animBg="1" rev="0" advAuto="0" spid="258" grpId="3"/>
-      <p:bldP build="whole" bldLvl="1" animBg="1" rev="0" advAuto="0" spid="259" grpId="7"/>
     </p:bldLst>
   </p:timing>
 </p:sld>
@@ -18374,19 +19772,19 @@
       </p:par>
     </p:tnLst>
     <p:bldLst>
+      <p:bldP build="whole" bldLvl="1" animBg="1" rev="0" advAuto="0" spid="345" grpId="10"/>
+      <p:bldP build="whole" bldLvl="1" animBg="1" rev="0" advAuto="0" spid="330" grpId="9"/>
+      <p:bldP build="whole" bldLvl="1" animBg="1" rev="0" advAuto="0" spid="326" grpId="3"/>
+      <p:bldP build="whole" bldLvl="1" animBg="1" rev="0" advAuto="0" spid="349" grpId="7"/>
+      <p:bldP build="whole" bldLvl="1" animBg="1" rev="0" advAuto="0" spid="332" grpId="12"/>
+      <p:bldP build="whole" bldLvl="1" animBg="1" rev="0" advAuto="0" spid="336" grpId="8"/>
+      <p:bldP build="whole" bldLvl="1" animBg="1" rev="0" advAuto="0" spid="341" grpId="4"/>
+      <p:bldP build="whole" bldLvl="1" animBg="1" rev="0" advAuto="0" spid="328" grpId="6"/>
+      <p:bldP build="whole" bldLvl="1" animBg="1" rev="0" advAuto="0" spid="334" grpId="2"/>
+      <p:bldP build="whole" bldLvl="1" animBg="1" rev="0" advAuto="0" spid="335" grpId="5"/>
       <p:bldP build="whole" bldLvl="1" animBg="1" rev="0" advAuto="0" spid="325" grpId="1"/>
-      <p:bldP build="whole" bldLvl="1" animBg="1" rev="0" advAuto="0" spid="330" grpId="9"/>
-      <p:bldP build="whole" bldLvl="1" animBg="1" rev="0" advAuto="0" spid="345" grpId="10"/>
-      <p:bldP build="whole" bldLvl="1" animBg="1" rev="0" advAuto="0" spid="349" grpId="7"/>
+      <p:bldP build="whole" bldLvl="1" animBg="1" rev="0" advAuto="0" spid="337" grpId="11"/>
       <p:bldP build="whole" bldLvl="1" animBg="1" rev="0" advAuto="0" spid="353" grpId="13"/>
-      <p:bldP build="whole" bldLvl="1" animBg="1" rev="0" advAuto="0" spid="328" grpId="6"/>
-      <p:bldP build="whole" bldLvl="1" animBg="1" rev="0" advAuto="0" spid="326" grpId="3"/>
-      <p:bldP build="whole" bldLvl="1" animBg="1" rev="0" advAuto="0" spid="336" grpId="8"/>
-      <p:bldP build="whole" bldLvl="1" animBg="1" rev="0" advAuto="0" spid="334" grpId="2"/>
-      <p:bldP build="whole" bldLvl="1" animBg="1" rev="0" advAuto="0" spid="337" grpId="11"/>
-      <p:bldP build="whole" bldLvl="1" animBg="1" rev="0" advAuto="0" spid="341" grpId="4"/>
-      <p:bldP build="whole" bldLvl="1" animBg="1" rev="0" advAuto="0" spid="332" grpId="12"/>
-      <p:bldP build="whole" bldLvl="1" animBg="1" rev="0" advAuto="0" spid="335" grpId="5"/>
     </p:bldLst>
   </p:timing>
 </p:sld>
@@ -26469,70 +27867,70 @@
       </p:par>
     </p:tnLst>
     <p:bldLst>
-      <p:bldP build="whole" bldLvl="1" animBg="1" rev="0" advAuto="0" spid="477" grpId="36"/>
-      <p:bldP build="whole" bldLvl="1" animBg="1" rev="0" advAuto="0" spid="408" grpId="48"/>
+      <p:bldP build="whole" bldLvl="1" animBg="1" rev="0" advAuto="0" spid="489" grpId="31"/>
       <p:bldP build="whole" bldLvl="1" animBg="1" rev="0" advAuto="0" spid="390" grpId="19"/>
+      <p:bldP build="whole" bldLvl="1" animBg="1" rev="0" advAuto="0" spid="443" grpId="5"/>
       <p:bldP build="whole" bldLvl="1" animBg="1" rev="0" advAuto="0" spid="378" grpId="44"/>
+      <p:bldP build="whole" bldLvl="1" animBg="1" rev="0" advAuto="0" spid="366" grpId="3"/>
+      <p:bldP build="whole" bldLvl="1" animBg="1" rev="0" advAuto="0" spid="399" grpId="46"/>
+      <p:bldP build="whole" bldLvl="1" animBg="1" rev="0" advAuto="0" spid="499" grpId="57"/>
+      <p:bldP build="whole" bldLvl="1" animBg="1" rev="0" advAuto="0" spid="505" grpId="62"/>
+      <p:bldP build="whole" bldLvl="1" animBg="1" rev="0" advAuto="0" spid="509" grpId="64"/>
       <p:bldP build="whole" bldLvl="1" animBg="1" rev="0" advAuto="0" spid="455" grpId="41"/>
-      <p:bldP build="whole" bldLvl="1" animBg="1" rev="0" advAuto="0" spid="429" grpId="52"/>
-      <p:bldP build="whole" bldLvl="1" animBg="1" rev="0" advAuto="0" spid="438" grpId="21"/>
-      <p:bldP build="whole" bldLvl="1" animBg="1" rev="0" advAuto="0" spid="503" grpId="61"/>
-      <p:bldP build="whole" bldLvl="1" animBg="1" rev="0" advAuto="0" spid="491" grpId="58"/>
-      <p:bldP build="whole" bldLvl="1" animBg="1" rev="0" advAuto="0" spid="399" grpId="46"/>
-      <p:bldP build="whole" bldLvl="1" animBg="1" rev="0" advAuto="0" spid="443" grpId="5"/>
+      <p:bldP build="whole" bldLvl="1" animBg="1" rev="0" advAuto="0" spid="471" grpId="27"/>
       <p:bldP build="whole" bldLvl="1" animBg="1" rev="0" advAuto="0" spid="402" grpId="17"/>
-      <p:bldP build="whole" bldLvl="1" animBg="1" rev="0" advAuto="0" spid="487" grpId="30"/>
-      <p:bldP build="whole" bldLvl="1" animBg="1" rev="0" advAuto="0" spid="483" grpId="28"/>
       <p:bldP build="whole" bldLvl="1" animBg="1" rev="0" advAuto="0" spid="423" grpId="15"/>
-      <p:bldP build="whole" bldLvl="1" animBg="1" rev="0" advAuto="0" spid="495" grpId="55"/>
       <p:bldP build="whole" bldLvl="1" animBg="1" rev="0" advAuto="0" spid="357" grpId="32"/>
-      <p:bldP build="whole" bldLvl="1" animBg="1" rev="0" advAuto="0" spid="471" grpId="27"/>
+      <p:bldP build="whole" bldLvl="1" animBg="1" rev="0" advAuto="0" spid="461" grpId="43"/>
+      <p:bldP build="whole" bldLvl="1" animBg="1" rev="0" advAuto="0" spid="479" grpId="38"/>
       <p:bldP build="whole" bldLvl="1" animBg="1" rev="0" advAuto="0" spid="381" grpId="33"/>
-      <p:bldP build="whole" bldLvl="1" animBg="1" rev="0" advAuto="0" spid="453" grpId="12"/>
       <p:bldP build="whole" bldLvl="1" animBg="1" rev="0" advAuto="0" spid="393" grpId="16"/>
       <p:bldP build="whole" bldLvl="1" animBg="1" rev="0" advAuto="0" spid="411" grpId="49"/>
-      <p:bldP build="whole" bldLvl="1" animBg="1" rev="0" advAuto="0" spid="439" grpId="6"/>
-      <p:bldP build="whole" bldLvl="1" animBg="1" rev="0" advAuto="0" spid="493" grpId="63"/>
       <p:bldP build="whole" bldLvl="1" animBg="1" rev="0" advAuto="0" spid="465" grpId="26"/>
+      <p:bldP build="whole" bldLvl="1" animBg="1" rev="0" advAuto="0" spid="375" grpId="50"/>
+      <p:bldP build="whole" bldLvl="1" animBg="1" rev="0" advAuto="0" spid="449" grpId="10"/>
       <p:bldP build="whole" bldLvl="1" animBg="1" rev="0" advAuto="0" spid="432" grpId="53"/>
+      <p:bldP build="whole" bldLvl="1" animBg="1" rev="0" advAuto="0" spid="469" grpId="23"/>
+      <p:bldP build="whole" bldLvl="1" animBg="1" rev="0" advAuto="0" spid="369" grpId="4"/>
+      <p:bldP build="whole" bldLvl="1" animBg="1" rev="0" advAuto="0" spid="457" grpId="42"/>
       <p:bldP build="whole" bldLvl="1" animBg="1" rev="0" advAuto="0" spid="384" grpId="13"/>
-      <p:bldP build="whole" bldLvl="1" animBg="1" rev="0" advAuto="0" spid="501" grpId="59"/>
+      <p:bldP build="whole" bldLvl="1" animBg="1" rev="0" advAuto="0" spid="435" grpId="54"/>
+      <p:bldP build="whole" bldLvl="1" animBg="1" rev="0" advAuto="0" spid="453" grpId="12"/>
+      <p:bldP build="whole" bldLvl="1" animBg="1" rev="0" advAuto="0" spid="495" grpId="55"/>
       <p:bldP build="whole" bldLvl="1" animBg="1" rev="0" advAuto="0" spid="360" grpId="1"/>
       <p:bldP build="whole" bldLvl="1" animBg="1" rev="0" advAuto="0" spid="414" grpId="34"/>
-      <p:bldP build="whole" bldLvl="1" animBg="1" rev="0" advAuto="0" spid="372" grpId="47"/>
-      <p:bldP build="whole" bldLvl="1" animBg="1" rev="0" advAuto="0" spid="505" grpId="62"/>
-      <p:bldP build="whole" bldLvl="1" animBg="1" rev="0" advAuto="0" spid="366" grpId="3"/>
       <p:bldP build="whole" bldLvl="1" animBg="1" rev="0" advAuto="0" spid="445" grpId="9"/>
+      <p:bldP build="whole" bldLvl="1" animBg="1" rev="0" advAuto="0" spid="463" grpId="25"/>
+      <p:bldP build="whole" bldLvl="1" animBg="1" rev="0" advAuto="0" spid="438" grpId="21"/>
+      <p:bldP build="whole" bldLvl="1" animBg="1" rev="0" advAuto="0" spid="491" grpId="58"/>
+      <p:bldP build="whole" bldLvl="1" animBg="1" rev="0" advAuto="0" spid="501" grpId="59"/>
+      <p:bldP build="whole" bldLvl="1" animBg="1" rev="0" advAuto="0" spid="503" grpId="61"/>
       <p:bldP build="whole" bldLvl="1" animBg="1" rev="0" advAuto="0" spid="475" grpId="39"/>
+      <p:bldP build="whole" bldLvl="1" animBg="1" rev="0" advAuto="0" spid="396" grpId="20"/>
       <p:bldP build="whole" bldLvl="1" animBg="1" rev="0" advAuto="0" spid="473" grpId="22"/>
-      <p:bldP build="whole" bldLvl="1" animBg="1" rev="0" advAuto="0" spid="485" grpId="29"/>
-      <p:bldP build="whole" bldLvl="1" animBg="1" rev="0" advAuto="0" spid="396" grpId="20"/>
-      <p:bldP build="whole" bldLvl="1" animBg="1" rev="0" advAuto="0" spid="457" grpId="42"/>
+      <p:bldP build="whole" bldLvl="1" animBg="1" rev="0" advAuto="0" spid="483" grpId="28"/>
+      <p:bldP build="whole" bldLvl="1" animBg="1" rev="0" advAuto="0" spid="405" grpId="45"/>
+      <p:bldP build="whole" bldLvl="1" animBg="1" rev="0" advAuto="0" spid="481" grpId="37"/>
       <p:bldP build="whole" bldLvl="1" animBg="1" rev="0" advAuto="0" spid="497" grpId="56"/>
-      <p:bldP build="whole" bldLvl="1" animBg="1" rev="0" advAuto="0" spid="459" grpId="40"/>
-      <p:bldP build="whole" bldLvl="1" animBg="1" rev="0" advAuto="0" spid="461" grpId="43"/>
-      <p:bldP build="whole" bldLvl="1" animBg="1" rev="0" advAuto="0" spid="435" grpId="54"/>
-      <p:bldP build="whole" bldLvl="1" animBg="1" rev="0" advAuto="0" spid="481" grpId="37"/>
-      <p:bldP build="whole" bldLvl="1" animBg="1" rev="0" advAuto="0" spid="405" grpId="45"/>
-      <p:bldP build="whole" bldLvl="1" animBg="1" rev="0" advAuto="0" spid="499" grpId="57"/>
       <p:bldP build="whole" bldLvl="1" animBg="1" rev="0" advAuto="0" spid="387" grpId="18"/>
-      <p:bldP build="whole" bldLvl="1" animBg="1" rev="0" advAuto="0" spid="489" grpId="31"/>
-      <p:bldP build="whole" bldLvl="1" animBg="1" rev="0" advAuto="0" spid="479" grpId="38"/>
+      <p:bldP build="whole" bldLvl="1" animBg="1" rev="0" advAuto="0" spid="451" grpId="11"/>
+      <p:bldP build="whole" bldLvl="1" animBg="1" rev="0" advAuto="0" spid="439" grpId="6"/>
       <p:bldP build="whole" bldLvl="1" animBg="1" rev="0" advAuto="0" spid="363" grpId="2"/>
       <p:bldP build="whole" bldLvl="1" animBg="1" rev="0" advAuto="0" spid="426" grpId="51"/>
       <p:bldP build="whole" bldLvl="1" animBg="1" rev="0" advAuto="0" spid="417" grpId="35"/>
-      <p:bldP build="whole" bldLvl="1" animBg="1" rev="0" advAuto="0" spid="509" grpId="64"/>
-      <p:bldP build="whole" bldLvl="1" animBg="1" rev="0" advAuto="0" spid="463" grpId="25"/>
+      <p:bldP build="whole" bldLvl="1" animBg="1" rev="0" advAuto="0" spid="441" grpId="7"/>
+      <p:bldP build="whole" bldLvl="1" animBg="1" rev="0" advAuto="0" spid="477" grpId="36"/>
       <p:bldP build="whole" bldLvl="1" animBg="1" rev="0" advAuto="0" spid="507" grpId="60"/>
-      <p:bldP build="whole" bldLvl="1" animBg="1" rev="0" advAuto="0" spid="375" grpId="50"/>
       <p:bldP build="whole" bldLvl="1" animBg="1" rev="0" advAuto="0" spid="467" grpId="24"/>
-      <p:bldP build="whole" bldLvl="1" animBg="1" rev="0" advAuto="0" spid="449" grpId="10"/>
+      <p:bldP build="whole" bldLvl="1" animBg="1" rev="0" advAuto="0" spid="487" grpId="30"/>
       <p:bldP build="whole" bldLvl="1" animBg="1" rev="0" advAuto="0" spid="447" grpId="8"/>
-      <p:bldP build="whole" bldLvl="1" animBg="1" rev="0" advAuto="0" spid="441" grpId="7"/>
-      <p:bldP build="whole" bldLvl="1" animBg="1" rev="0" advAuto="0" spid="369" grpId="4"/>
       <p:bldP build="whole" bldLvl="1" animBg="1" rev="0" advAuto="0" spid="420" grpId="14"/>
-      <p:bldP build="whole" bldLvl="1" animBg="1" rev="0" advAuto="0" spid="469" grpId="23"/>
-      <p:bldP build="whole" bldLvl="1" animBg="1" rev="0" advAuto="0" spid="451" grpId="11"/>
+      <p:bldP build="whole" bldLvl="1" animBg="1" rev="0" advAuto="0" spid="459" grpId="40"/>
+      <p:bldP build="whole" bldLvl="1" animBg="1" rev="0" advAuto="0" spid="485" grpId="29"/>
+      <p:bldP build="whole" bldLvl="1" animBg="1" rev="0" advAuto="0" spid="493" grpId="63"/>
+      <p:bldP build="whole" bldLvl="1" animBg="1" rev="0" advAuto="0" spid="429" grpId="52"/>
+      <p:bldP build="whole" bldLvl="1" animBg="1" rev="0" advAuto="0" spid="372" grpId="47"/>
+      <p:bldP build="whole" bldLvl="1" animBg="1" rev="0" advAuto="0" spid="408" grpId="48"/>
     </p:bldLst>
   </p:timing>
 </p:sld>
@@ -27508,14 +28906,14 @@
       </p:par>
     </p:tnLst>
     <p:bldLst>
+      <p:bldP build="whole" bldLvl="1" animBg="1" rev="0" advAuto="0" spid="531" grpId="2"/>
       <p:bldP build="whole" bldLvl="1" animBg="1" rev="0" advAuto="0" spid="529" grpId="6"/>
+      <p:bldP build="whole" bldLvl="1" animBg="1" rev="0" advAuto="0" spid="527" grpId="4"/>
+      <p:bldP build="whole" bldLvl="1" animBg="1" rev="0" advAuto="0" spid="516" grpId="5"/>
+      <p:bldP build="whole" bldLvl="1" animBg="1" rev="0" advAuto="0" spid="519" grpId="3"/>
+      <p:bldP build="whole" bldLvl="1" animBg="1" rev="0" advAuto="0" spid="526" grpId="7"/>
+      <p:bldP build="whole" bldLvl="1" animBg="1" rev="0" advAuto="0" spid="522" grpId="1"/>
       <p:bldP build="whole" bldLvl="1" animBg="1" rev="0" advAuto="0" spid="526" grpId="8"/>
-      <p:bldP build="whole" bldLvl="1" animBg="1" rev="0" advAuto="0" spid="519" grpId="3"/>
-      <p:bldP build="whole" bldLvl="1" animBg="1" rev="0" advAuto="0" spid="527" grpId="4"/>
-      <p:bldP build="whole" bldLvl="1" animBg="1" rev="0" advAuto="0" spid="522" grpId="1"/>
-      <p:bldP build="whole" bldLvl="1" animBg="1" rev="0" advAuto="0" spid="531" grpId="2"/>
-      <p:bldP build="whole" bldLvl="1" animBg="1" rev="0" advAuto="0" spid="516" grpId="5"/>
-      <p:bldP build="whole" bldLvl="1" animBg="1" rev="0" advAuto="0" spid="526" grpId="7"/>
     </p:bldLst>
   </p:timing>
 </p:sld>
@@ -29219,13 +30617,13 @@
       </p:par>
     </p:tnLst>
     <p:bldLst>
+      <p:bldP build="whole" bldLvl="1" animBg="1" rev="0" advAuto="0" spid="561" grpId="4"/>
+      <p:bldP build="whole" bldLvl="1" animBg="1" rev="0" advAuto="0" spid="558" grpId="1"/>
       <p:bldP build="whole" bldLvl="1" animBg="1" rev="0" advAuto="0" spid="543" grpId="3"/>
+      <p:bldP build="whole" bldLvl="1" animBg="1" rev="0" advAuto="0" spid="539" grpId="2"/>
+      <p:bldP build="whole" bldLvl="1" animBg="1" rev="0" advAuto="0" spid="547" grpId="5"/>
       <p:bldP build="whole" bldLvl="1" animBg="1" rev="0" advAuto="0" spid="551" grpId="6"/>
-      <p:bldP build="whole" bldLvl="1" animBg="1" rev="0" advAuto="0" spid="547" grpId="5"/>
-      <p:bldP build="whole" bldLvl="1" animBg="1" rev="0" advAuto="0" spid="558" grpId="1"/>
       <p:bldP build="whole" bldLvl="1" animBg="1" rev="0" advAuto="0" spid="555" grpId="7"/>
-      <p:bldP build="whole" bldLvl="1" animBg="1" rev="0" advAuto="0" spid="561" grpId="4"/>
-      <p:bldP build="whole" bldLvl="1" animBg="1" rev="0" advAuto="0" spid="539" grpId="2"/>
     </p:bldLst>
   </p:timing>
 </p:sld>

</xml_diff>

<commit_message>
slightly update the packages presentation + add medium reference to readme.md
</commit_message>
<xml_diff>
--- a/packages/Packages.pptx
+++ b/packages/Packages.pptx
@@ -5489,7 +5489,7 @@
       </p:grpSpPr>
       <p:sp>
         <p:nvSpPr>
-          <p:cNvPr id="563" name="Title 6"/>
+          <p:cNvPr id="567" name="Title 6"/>
           <p:cNvSpPr txBox="1"/>
           <p:nvPr>
             <p:ph type="title"/>
@@ -5525,7 +5525,7 @@
       </p:sp>
       <p:pic>
         <p:nvPicPr>
-          <p:cNvPr id="564" name="cubes.png" descr="cubes.png"/>
+          <p:cNvPr id="568" name="cubes.png" descr="cubes.png"/>
           <p:cNvPicPr>
             <a:picLocks noChangeAspect="1"/>
           </p:cNvPicPr>
@@ -5554,7 +5554,7 @@
       </p:pic>
       <p:grpSp>
         <p:nvGrpSpPr>
-          <p:cNvPr id="567" name="Group"/>
+          <p:cNvPr id="571" name="Group"/>
           <p:cNvGrpSpPr/>
           <p:nvPr/>
         </p:nvGrpSpPr>
@@ -5568,7 +5568,7 @@
         </p:grpSpPr>
         <p:sp>
           <p:nvSpPr>
-            <p:cNvPr id="565" name="Rectangle"/>
+            <p:cNvPr id="569" name="Rectangle"/>
             <p:cNvSpPr/>
             <p:nvPr/>
           </p:nvSpPr>
@@ -5623,7 +5623,7 @@
         </p:sp>
         <p:sp>
           <p:nvSpPr>
-            <p:cNvPr id="566" name="package p1"/>
+            <p:cNvPr id="570" name="package p1"/>
             <p:cNvSpPr/>
             <p:nvPr/>
           </p:nvSpPr>
@@ -5681,7 +5681,7 @@
       </p:grpSp>
       <p:grpSp>
         <p:nvGrpSpPr>
-          <p:cNvPr id="570" name="Group"/>
+          <p:cNvPr id="574" name="Group"/>
           <p:cNvGrpSpPr/>
           <p:nvPr/>
         </p:nvGrpSpPr>
@@ -5695,7 +5695,7 @@
         </p:grpSpPr>
         <p:sp>
           <p:nvSpPr>
-            <p:cNvPr id="568" name="Rectangle"/>
+            <p:cNvPr id="572" name="Rectangle"/>
             <p:cNvSpPr/>
             <p:nvPr/>
           </p:nvSpPr>
@@ -5750,7 +5750,7 @@
         </p:sp>
         <p:sp>
           <p:nvSpPr>
-            <p:cNvPr id="569" name="package p2"/>
+            <p:cNvPr id="573" name="package p2"/>
             <p:cNvSpPr/>
             <p:nvPr/>
           </p:nvSpPr>
@@ -5808,7 +5808,7 @@
       </p:grpSp>
       <p:grpSp>
         <p:nvGrpSpPr>
-          <p:cNvPr id="573" name="Group"/>
+          <p:cNvPr id="577" name="Group"/>
           <p:cNvGrpSpPr/>
           <p:nvPr/>
         </p:nvGrpSpPr>
@@ -5822,7 +5822,7 @@
         </p:grpSpPr>
         <p:sp>
           <p:nvSpPr>
-            <p:cNvPr id="571" name="p1_test.go"/>
+            <p:cNvPr id="575" name="p1_test.go"/>
             <p:cNvSpPr/>
             <p:nvPr/>
           </p:nvSpPr>
@@ -5873,7 +5873,7 @@
         </p:sp>
         <p:sp>
           <p:nvSpPr>
-            <p:cNvPr id="572" name="Rectangle"/>
+            <p:cNvPr id="576" name="Rectangle"/>
             <p:cNvSpPr/>
             <p:nvPr/>
           </p:nvSpPr>
@@ -5923,7 +5923,7 @@
       </p:grpSp>
       <p:grpSp>
         <p:nvGrpSpPr>
-          <p:cNvPr id="576" name="Group"/>
+          <p:cNvPr id="580" name="Group"/>
           <p:cNvGrpSpPr/>
           <p:nvPr/>
         </p:nvGrpSpPr>
@@ -5937,7 +5937,7 @@
         </p:grpSpPr>
         <p:sp>
           <p:nvSpPr>
-            <p:cNvPr id="574" name="p2_test.go"/>
+            <p:cNvPr id="578" name="p2_test.go"/>
             <p:cNvSpPr/>
             <p:nvPr/>
           </p:nvSpPr>
@@ -5988,7 +5988,7 @@
         </p:sp>
         <p:sp>
           <p:nvSpPr>
-            <p:cNvPr id="575" name="Rectangle"/>
+            <p:cNvPr id="579" name="Rectangle"/>
             <p:cNvSpPr/>
             <p:nvPr/>
           </p:nvSpPr>
@@ -6038,7 +6038,7 @@
       </p:grpSp>
       <p:pic>
         <p:nvPicPr>
-          <p:cNvPr id="577" name="Line Line" descr="Line Line"/>
+          <p:cNvPr id="581" name="Line Line" descr="Line Line"/>
           <p:cNvPicPr>
             <a:picLocks noChangeAspect="0"/>
           </p:cNvPicPr>
@@ -6064,7 +6064,7 @@
       </p:pic>
       <p:pic>
         <p:nvPicPr>
-          <p:cNvPr id="579" name="no-entry.png" descr="no-entry.png"/>
+          <p:cNvPr id="583" name="no-entry.png" descr="no-entry.png"/>
           <p:cNvPicPr>
             <a:picLocks noChangeAspect="1"/>
           </p:cNvPicPr>
@@ -6144,7 +6144,7 @@
                                       <p:cBhvr>
                                         <p:cTn id="6" fill="hold"/>
                                         <p:tgtEl>
-                                          <p:spTgt spid="573"/>
+                                          <p:spTgt spid="577"/>
                                         </p:tgtEl>
                                         <p:attrNameLst>
                                           <p:attrName>style.visibility</p:attrName>
@@ -6158,7 +6158,7 @@
                                       <p:cBhvr>
                                         <p:cTn id="7" dur="700" fill="hold"/>
                                         <p:tgtEl>
-                                          <p:spTgt spid="573"/>
+                                          <p:spTgt spid="577"/>
                                         </p:tgtEl>
                                         <p:attrNameLst>
                                           <p:attrName>ppt_x</p:attrName>
@@ -6181,7 +6181,7 @@
                                       <p:cBhvr>
                                         <p:cTn id="8" dur="700" fill="hold"/>
                                         <p:tgtEl>
-                                          <p:spTgt spid="573"/>
+                                          <p:spTgt spid="577"/>
                                         </p:tgtEl>
                                         <p:attrNameLst>
                                           <p:attrName>ppt_y</p:attrName>
@@ -6225,7 +6225,7 @@
                                       <p:cBhvr>
                                         <p:cTn id="11" fill="hold"/>
                                         <p:tgtEl>
-                                          <p:spTgt spid="567"/>
+                                          <p:spTgt spid="571"/>
                                         </p:tgtEl>
                                         <p:attrNameLst>
                                           <p:attrName>style.visibility</p:attrName>
@@ -6239,7 +6239,7 @@
                                       <p:cBhvr>
                                         <p:cTn id="12" dur="700"/>
                                         <p:tgtEl>
-                                          <p:spTgt spid="567"/>
+                                          <p:spTgt spid="571"/>
                                         </p:tgtEl>
                                       </p:cBhvr>
                                     </p:animEffect>
@@ -6268,7 +6268,7 @@
                                       <p:cBhvr>
                                         <p:cTn id="15" fill="hold"/>
                                         <p:tgtEl>
-                                          <p:spTgt spid="576"/>
+                                          <p:spTgt spid="580"/>
                                         </p:tgtEl>
                                         <p:attrNameLst>
                                           <p:attrName>style.visibility</p:attrName>
@@ -6282,7 +6282,7 @@
                                       <p:cBhvr>
                                         <p:cTn id="16" dur="700" fill="hold"/>
                                         <p:tgtEl>
-                                          <p:spTgt spid="576"/>
+                                          <p:spTgt spid="580"/>
                                         </p:tgtEl>
                                         <p:attrNameLst>
                                           <p:attrName>ppt_x</p:attrName>
@@ -6305,7 +6305,7 @@
                                       <p:cBhvr>
                                         <p:cTn id="17" dur="700" fill="hold"/>
                                         <p:tgtEl>
-                                          <p:spTgt spid="576"/>
+                                          <p:spTgt spid="580"/>
                                         </p:tgtEl>
                                         <p:attrNameLst>
                                           <p:attrName>ppt_y</p:attrName>
@@ -6349,7 +6349,7 @@
                                       <p:cBhvr>
                                         <p:cTn id="20" fill="hold"/>
                                         <p:tgtEl>
-                                          <p:spTgt spid="570"/>
+                                          <p:spTgt spid="574"/>
                                         </p:tgtEl>
                                         <p:attrNameLst>
                                           <p:attrName>style.visibility</p:attrName>
@@ -6363,7 +6363,7 @@
                                       <p:cBhvr>
                                         <p:cTn id="21" dur="700"/>
                                         <p:tgtEl>
-                                          <p:spTgt spid="570"/>
+                                          <p:spTgt spid="574"/>
                                         </p:tgtEl>
                                       </p:cBhvr>
                                     </p:animEffect>
@@ -6392,7 +6392,7 @@
                                       <p:cBhvr>
                                         <p:cTn id="24" fill="hold"/>
                                         <p:tgtEl>
-                                          <p:spTgt spid="577"/>
+                                          <p:spTgt spid="581"/>
                                         </p:tgtEl>
                                         <p:attrNameLst>
                                           <p:attrName>style.visibility</p:attrName>
@@ -6406,7 +6406,7 @@
                                       <p:cBhvr>
                                         <p:cTn id="25" dur="500"/>
                                         <p:tgtEl>
-                                          <p:spTgt spid="577"/>
+                                          <p:spTgt spid="581"/>
                                         </p:tgtEl>
                                       </p:cBhvr>
                                     </p:animEffect>
@@ -6435,7 +6435,7 @@
                                       <p:cBhvr>
                                         <p:cTn id="28" fill="hold"/>
                                         <p:tgtEl>
-                                          <p:spTgt spid="579"/>
+                                          <p:spTgt spid="583"/>
                                         </p:tgtEl>
                                         <p:attrNameLst>
                                           <p:attrName>style.visibility</p:attrName>
@@ -6467,7 +6467,7 @@
                                       <p:cBhvr>
                                         <p:cTn id="31" dur="700" fill="hold"/>
                                         <p:tgtEl>
-                                          <p:spTgt spid="579"/>
+                                          <p:spTgt spid="583"/>
                                         </p:tgtEl>
                                         <p:attrNameLst>
                                           <p:attrName>style.visibility</p:attrName>
@@ -6517,13 +6517,13 @@
       </p:par>
     </p:tnLst>
     <p:bldLst>
-      <p:bldP build="whole" bldLvl="1" animBg="1" rev="0" advAuto="0" spid="577" grpId="5"/>
-      <p:bldP build="whole" bldLvl="1" animBg="1" rev="0" advAuto="0" spid="570" grpId="4"/>
-      <p:bldP build="whole" bldLvl="1" animBg="1" rev="0" advAuto="0" spid="579" grpId="6"/>
-      <p:bldP build="whole" bldLvl="1" animBg="1" rev="0" advAuto="0" spid="579" grpId="7"/>
-      <p:bldP build="whole" bldLvl="1" animBg="1" rev="0" advAuto="0" spid="567" grpId="2"/>
-      <p:bldP build="whole" bldLvl="1" animBg="1" rev="0" advAuto="0" spid="576" grpId="3"/>
-      <p:bldP build="whole" bldLvl="1" animBg="1" rev="0" advAuto="0" spid="573" grpId="1"/>
+      <p:bldP build="whole" bldLvl="1" animBg="1" rev="0" advAuto="0" spid="581" grpId="5"/>
+      <p:bldP build="whole" bldLvl="1" animBg="1" rev="0" advAuto="0" spid="574" grpId="4"/>
+      <p:bldP build="whole" bldLvl="1" animBg="1" rev="0" advAuto="0" spid="583" grpId="6"/>
+      <p:bldP build="whole" bldLvl="1" animBg="1" rev="0" advAuto="0" spid="583" grpId="7"/>
+      <p:bldP build="whole" bldLvl="1" animBg="1" rev="0" advAuto="0" spid="571" grpId="2"/>
+      <p:bldP build="whole" bldLvl="1" animBg="1" rev="0" advAuto="0" spid="577" grpId="1"/>
+      <p:bldP build="whole" bldLvl="1" animBg="1" rev="0" advAuto="0" spid="580" grpId="3"/>
     </p:bldLst>
   </p:timing>
 </p:sld>
@@ -6555,7 +6555,7 @@
       </p:grpSpPr>
       <p:sp>
         <p:nvSpPr>
-          <p:cNvPr id="581" name="Title 6"/>
+          <p:cNvPr id="585" name="Title 6"/>
           <p:cNvSpPr txBox="1"/>
           <p:nvPr>
             <p:ph type="title"/>
@@ -6591,7 +6591,7 @@
       </p:sp>
       <p:pic>
         <p:nvPicPr>
-          <p:cNvPr id="582" name="cubes.png" descr="cubes.png"/>
+          <p:cNvPr id="586" name="cubes.png" descr="cubes.png"/>
           <p:cNvPicPr>
             <a:picLocks noChangeAspect="1"/>
           </p:cNvPicPr>
@@ -6620,7 +6620,7 @@
       </p:pic>
       <p:sp>
         <p:nvSpPr>
-          <p:cNvPr id="583" name="Exported"/>
+          <p:cNvPr id="587" name="Exported"/>
           <p:cNvSpPr txBox="1"/>
           <p:nvPr/>
         </p:nvSpPr>
@@ -6668,7 +6668,7 @@
       </p:sp>
       <p:sp>
         <p:nvSpPr>
-          <p:cNvPr id="584" name="unExported"/>
+          <p:cNvPr id="588" name="unExported"/>
           <p:cNvSpPr txBox="1"/>
           <p:nvPr/>
         </p:nvSpPr>
@@ -6716,7 +6716,7 @@
       </p:sp>
       <p:sp>
         <p:nvSpPr>
-          <p:cNvPr id="585" name="Visible &amp; accessible in all files…"/>
+          <p:cNvPr id="589" name="Visible &amp; accessible in all files…"/>
           <p:cNvSpPr txBox="1"/>
           <p:nvPr/>
         </p:nvSpPr>
@@ -6776,7 +6776,7 @@
       </p:sp>
       <p:sp>
         <p:nvSpPr>
-          <p:cNvPr id="586" name="Visible &amp; accessible inside all files of the…"/>
+          <p:cNvPr id="590" name="Visible &amp; accessible inside all files of the…"/>
           <p:cNvSpPr txBox="1"/>
           <p:nvPr/>
         </p:nvSpPr>
@@ -6836,7 +6836,7 @@
       </p:sp>
       <p:sp>
         <p:nvSpPr>
-          <p:cNvPr id="587" name="Rectangle"/>
+          <p:cNvPr id="591" name="Rectangle"/>
           <p:cNvSpPr/>
           <p:nvPr/>
         </p:nvSpPr>
@@ -6881,7 +6881,7 @@
       </p:sp>
       <p:sp>
         <p:nvSpPr>
-          <p:cNvPr id="588" name="Rectangle"/>
+          <p:cNvPr id="592" name="Rectangle"/>
           <p:cNvSpPr/>
           <p:nvPr/>
         </p:nvSpPr>
@@ -6977,7 +6977,7 @@
                                       <p:cBhvr>
                                         <p:cTn id="6" fill="hold"/>
                                         <p:tgtEl>
-                                          <p:spTgt spid="583"/>
+                                          <p:spTgt spid="587"/>
                                         </p:tgtEl>
                                         <p:attrNameLst>
                                           <p:attrName>style.visibility</p:attrName>
@@ -6991,7 +6991,7 @@
                                       <p:cBhvr>
                                         <p:cTn id="7" dur="800" fill="hold"/>
                                         <p:tgtEl>
-                                          <p:spTgt spid="583"/>
+                                          <p:spTgt spid="587"/>
                                         </p:tgtEl>
                                         <p:attrNameLst>
                                           <p:attrName>ppt_x</p:attrName>
@@ -7014,7 +7014,7 @@
                                       <p:cBhvr>
                                         <p:cTn id="8" dur="800" fill="hold"/>
                                         <p:tgtEl>
-                                          <p:spTgt spid="583"/>
+                                          <p:spTgt spid="587"/>
                                         </p:tgtEl>
                                         <p:attrNameLst>
                                           <p:attrName>ppt_y</p:attrName>
@@ -7058,7 +7058,7 @@
                                       <p:cBhvr>
                                         <p:cTn id="11" fill="hold"/>
                                         <p:tgtEl>
-                                          <p:spTgt spid="587"/>
+                                          <p:spTgt spid="591"/>
                                         </p:tgtEl>
                                         <p:attrNameLst>
                                           <p:attrName>style.visibility</p:attrName>
@@ -7072,7 +7072,7 @@
                                       <p:cBhvr>
                                         <p:cTn id="12" dur="700" fill="hold"/>
                                         <p:tgtEl>
-                                          <p:spTgt spid="587"/>
+                                          <p:spTgt spid="591"/>
                                         </p:tgtEl>
                                         <p:attrNameLst>
                                           <p:attrName>ppt_x</p:attrName>
@@ -7095,7 +7095,7 @@
                                       <p:cBhvr>
                                         <p:cTn id="13" dur="700" fill="hold"/>
                                         <p:tgtEl>
-                                          <p:spTgt spid="587"/>
+                                          <p:spTgt spid="591"/>
                                         </p:tgtEl>
                                         <p:attrNameLst>
                                           <p:attrName>ppt_y</p:attrName>
@@ -7139,7 +7139,7 @@
                                       <p:cBhvr>
                                         <p:cTn id="16" fill="hold"/>
                                         <p:tgtEl>
-                                          <p:spTgt spid="585"/>
+                                          <p:spTgt spid="589"/>
                                         </p:tgtEl>
                                         <p:attrNameLst>
                                           <p:attrName>style.visibility</p:attrName>
@@ -7153,7 +7153,7 @@
                                       <p:cBhvr>
                                         <p:cTn id="17" dur="700"/>
                                         <p:tgtEl>
-                                          <p:spTgt spid="585"/>
+                                          <p:spTgt spid="589"/>
                                         </p:tgtEl>
                                       </p:cBhvr>
                                     </p:animEffect>
@@ -7182,7 +7182,7 @@
                                       <p:cBhvr>
                                         <p:cTn id="20" fill="hold"/>
                                         <p:tgtEl>
-                                          <p:spTgt spid="584"/>
+                                          <p:spTgt spid="588"/>
                                         </p:tgtEl>
                                         <p:attrNameLst>
                                           <p:attrName>style.visibility</p:attrName>
@@ -7196,7 +7196,7 @@
                                       <p:cBhvr>
                                         <p:cTn id="21" dur="800" fill="hold"/>
                                         <p:tgtEl>
-                                          <p:spTgt spid="584"/>
+                                          <p:spTgt spid="588"/>
                                         </p:tgtEl>
                                         <p:attrNameLst>
                                           <p:attrName>ppt_x</p:attrName>
@@ -7219,7 +7219,7 @@
                                       <p:cBhvr>
                                         <p:cTn id="22" dur="800" fill="hold"/>
                                         <p:tgtEl>
-                                          <p:spTgt spid="584"/>
+                                          <p:spTgt spid="588"/>
                                         </p:tgtEl>
                                         <p:attrNameLst>
                                           <p:attrName>ppt_y</p:attrName>
@@ -7263,7 +7263,7 @@
                                       <p:cBhvr>
                                         <p:cTn id="25" fill="hold"/>
                                         <p:tgtEl>
-                                          <p:spTgt spid="588"/>
+                                          <p:spTgt spid="592"/>
                                         </p:tgtEl>
                                         <p:attrNameLst>
                                           <p:attrName>style.visibility</p:attrName>
@@ -7277,7 +7277,7 @@
                                       <p:cBhvr>
                                         <p:cTn id="26" dur="700" fill="hold"/>
                                         <p:tgtEl>
-                                          <p:spTgt spid="588"/>
+                                          <p:spTgt spid="592"/>
                                         </p:tgtEl>
                                         <p:attrNameLst>
                                           <p:attrName>ppt_x</p:attrName>
@@ -7300,7 +7300,7 @@
                                       <p:cBhvr>
                                         <p:cTn id="27" dur="700" fill="hold"/>
                                         <p:tgtEl>
-                                          <p:spTgt spid="588"/>
+                                          <p:spTgt spid="592"/>
                                         </p:tgtEl>
                                         <p:attrNameLst>
                                           <p:attrName>ppt_y</p:attrName>
@@ -7344,7 +7344,7 @@
                                       <p:cBhvr>
                                         <p:cTn id="30" fill="hold"/>
                                         <p:tgtEl>
-                                          <p:spTgt spid="586"/>
+                                          <p:spTgt spid="590"/>
                                         </p:tgtEl>
                                         <p:attrNameLst>
                                           <p:attrName>style.visibility</p:attrName>
@@ -7358,7 +7358,7 @@
                                       <p:cBhvr>
                                         <p:cTn id="31" dur="700"/>
                                         <p:tgtEl>
-                                          <p:spTgt spid="586"/>
+                                          <p:spTgt spid="590"/>
                                         </p:tgtEl>
                                       </p:cBhvr>
                                     </p:animEffect>
@@ -7393,12 +7393,12 @@
       </p:par>
     </p:tnLst>
     <p:bldLst>
-      <p:bldP build="whole" bldLvl="1" animBg="1" rev="0" advAuto="0" spid="587" grpId="2"/>
-      <p:bldP build="whole" bldLvl="1" animBg="1" rev="0" advAuto="0" spid="583" grpId="1"/>
-      <p:bldP build="whole" bldLvl="1" animBg="1" rev="0" advAuto="0" spid="585" grpId="3"/>
-      <p:bldP build="whole" bldLvl="1" animBg="1" rev="0" advAuto="0" spid="584" grpId="4"/>
-      <p:bldP build="whole" bldLvl="1" animBg="1" rev="0" advAuto="0" spid="586" grpId="6"/>
-      <p:bldP build="whole" bldLvl="1" animBg="1" rev="0" advAuto="0" spid="588" grpId="5"/>
+      <p:bldP build="whole" bldLvl="1" animBg="1" rev="0" advAuto="0" spid="590" grpId="6"/>
+      <p:bldP build="whole" bldLvl="1" animBg="1" rev="0" advAuto="0" spid="589" grpId="3"/>
+      <p:bldP build="whole" bldLvl="1" animBg="1" rev="0" advAuto="0" spid="587" grpId="1"/>
+      <p:bldP build="whole" bldLvl="1" animBg="1" rev="0" advAuto="0" spid="588" grpId="4"/>
+      <p:bldP build="whole" bldLvl="1" animBg="1" rev="0" advAuto="0" spid="592" grpId="5"/>
+      <p:bldP build="whole" bldLvl="1" animBg="1" rev="0" advAuto="0" spid="591" grpId="2"/>
     </p:bldLst>
   </p:timing>
 </p:sld>
@@ -7430,7 +7430,7 @@
       </p:grpSpPr>
       <p:sp>
         <p:nvSpPr>
-          <p:cNvPr id="590" name="Title 6"/>
+          <p:cNvPr id="594" name="Title 6"/>
           <p:cNvSpPr txBox="1"/>
           <p:nvPr>
             <p:ph type="title"/>
@@ -7466,7 +7466,7 @@
       </p:sp>
       <p:pic>
         <p:nvPicPr>
-          <p:cNvPr id="591" name="cubes.png" descr="cubes.png"/>
+          <p:cNvPr id="595" name="cubes.png" descr="cubes.png"/>
           <p:cNvPicPr>
             <a:picLocks noChangeAspect="1"/>
           </p:cNvPicPr>
@@ -7495,7 +7495,7 @@
       </p:pic>
       <p:grpSp>
         <p:nvGrpSpPr>
-          <p:cNvPr id="597" name="Group"/>
+          <p:cNvPr id="601" name="Group"/>
           <p:cNvGrpSpPr/>
           <p:nvPr/>
         </p:nvGrpSpPr>
@@ -7509,7 +7509,7 @@
         </p:grpSpPr>
         <p:sp>
           <p:nvSpPr>
-            <p:cNvPr id="592" name="Rounded Rectangle"/>
+            <p:cNvPr id="596" name="Rounded Rectangle"/>
             <p:cNvSpPr/>
             <p:nvPr/>
           </p:nvSpPr>
@@ -7560,7 +7560,7 @@
         </p:sp>
         <p:sp>
           <p:nvSpPr>
-            <p:cNvPr id="593" name="Circle"/>
+            <p:cNvPr id="597" name="Circle"/>
             <p:cNvSpPr/>
             <p:nvPr/>
           </p:nvSpPr>
@@ -7609,7 +7609,7 @@
         </p:sp>
         <p:sp>
           <p:nvSpPr>
-            <p:cNvPr id="594" name="Circle"/>
+            <p:cNvPr id="598" name="Circle"/>
             <p:cNvSpPr/>
             <p:nvPr/>
           </p:nvSpPr>
@@ -7658,7 +7658,7 @@
         </p:sp>
         <p:sp>
           <p:nvSpPr>
-            <p:cNvPr id="595" name="Circle"/>
+            <p:cNvPr id="599" name="Circle"/>
             <p:cNvSpPr/>
             <p:nvPr/>
           </p:nvSpPr>
@@ -7707,7 +7707,7 @@
         </p:sp>
         <p:sp>
           <p:nvSpPr>
-            <p:cNvPr id="596" name="Rectangle"/>
+            <p:cNvPr id="600" name="Rectangle"/>
             <p:cNvSpPr/>
             <p:nvPr/>
           </p:nvSpPr>
@@ -7757,7 +7757,7 @@
       </p:grpSp>
       <p:pic>
         <p:nvPicPr>
-          <p:cNvPr id="598" name="server.png" descr="server.png"/>
+          <p:cNvPr id="602" name="server.png" descr="server.png"/>
           <p:cNvPicPr>
             <a:picLocks noChangeAspect="1"/>
           </p:cNvPicPr>
@@ -7786,7 +7786,7 @@
       </p:pic>
       <p:pic>
         <p:nvPicPr>
-          <p:cNvPr id="599" name="folder.png" descr="folder.png"/>
+          <p:cNvPr id="603" name="folder.png" descr="folder.png"/>
           <p:cNvPicPr>
             <a:picLocks noChangeAspect="1"/>
           </p:cNvPicPr>
@@ -7815,7 +7815,7 @@
       </p:pic>
       <p:sp>
         <p:nvSpPr>
-          <p:cNvPr id="600" name="$GOPATH/src"/>
+          <p:cNvPr id="604" name="$GOPATH/src"/>
           <p:cNvSpPr txBox="1"/>
           <p:nvPr/>
         </p:nvSpPr>
@@ -7863,7 +7863,7 @@
       </p:sp>
       <p:grpSp>
         <p:nvGrpSpPr>
-          <p:cNvPr id="604" name="Group"/>
+          <p:cNvPr id="608" name="Group"/>
           <p:cNvGrpSpPr/>
           <p:nvPr/>
         </p:nvGrpSpPr>
@@ -7877,7 +7877,7 @@
         </p:grpSpPr>
         <p:sp>
           <p:nvSpPr>
-            <p:cNvPr id="601" name="Rectangle"/>
+            <p:cNvPr id="605" name="Rectangle"/>
             <p:cNvSpPr/>
             <p:nvPr/>
           </p:nvSpPr>
@@ -7926,7 +7926,7 @@
         </p:sp>
         <p:sp>
           <p:nvSpPr>
-            <p:cNvPr id="602" name="go get ./..."/>
+            <p:cNvPr id="606" name="go get ./..."/>
             <p:cNvSpPr/>
             <p:nvPr/>
           </p:nvSpPr>
@@ -7977,7 +7977,7 @@
         </p:sp>
         <p:sp>
           <p:nvSpPr>
-            <p:cNvPr id="603" name="Rectangle"/>
+            <p:cNvPr id="607" name="Rectangle"/>
             <p:cNvSpPr/>
             <p:nvPr/>
           </p:nvSpPr>
@@ -8027,7 +8027,7 @@
       </p:grpSp>
       <p:sp>
         <p:nvSpPr>
-          <p:cNvPr id="605" name="github.com"/>
+          <p:cNvPr id="609" name="github.com"/>
           <p:cNvSpPr txBox="1"/>
           <p:nvPr/>
         </p:nvSpPr>
@@ -8075,7 +8075,7 @@
       </p:sp>
       <p:pic>
         <p:nvPicPr>
-          <p:cNvPr id="606" name="man.png" descr="man.png"/>
+          <p:cNvPr id="610" name="man.png" descr="man.png"/>
           <p:cNvPicPr>
             <a:picLocks noChangeAspect="1"/>
           </p:cNvPicPr>
@@ -8104,7 +8104,7 @@
       </p:pic>
       <p:pic>
         <p:nvPicPr>
-          <p:cNvPr id="607" name="cloud.png" descr="cloud.png"/>
+          <p:cNvPr id="611" name="cloud.png" descr="cloud.png"/>
           <p:cNvPicPr>
             <a:picLocks noChangeAspect="1"/>
           </p:cNvPicPr>
@@ -8133,7 +8133,7 @@
       </p:pic>
       <p:pic>
         <p:nvPicPr>
-          <p:cNvPr id="608" name="Line Line" descr="Line Line"/>
+          <p:cNvPr id="612" name="Line Line" descr="Line Line"/>
           <p:cNvPicPr>
             <a:picLocks noChangeAspect="0"/>
           </p:cNvPicPr>
@@ -8159,7 +8159,7 @@
       </p:pic>
       <p:pic>
         <p:nvPicPr>
-          <p:cNvPr id="610" name="Line Line" descr="Line Line"/>
+          <p:cNvPr id="614" name="Line Line" descr="Line Line"/>
           <p:cNvPicPr>
             <a:picLocks noChangeAspect="0"/>
           </p:cNvPicPr>
@@ -8185,7 +8185,7 @@
       </p:pic>
       <p:pic>
         <p:nvPicPr>
-          <p:cNvPr id="612" name="Line Line" descr="Line Line"/>
+          <p:cNvPr id="616" name="Line Line" descr="Line Line"/>
           <p:cNvPicPr>
             <a:picLocks noChangeAspect="0"/>
           </p:cNvPicPr>
@@ -8211,7 +8211,7 @@
       </p:pic>
       <p:pic>
         <p:nvPicPr>
-          <p:cNvPr id="614" name="Line Line" descr="Line Line"/>
+          <p:cNvPr id="618" name="Line Line" descr="Line Line"/>
           <p:cNvPicPr>
             <a:picLocks noChangeAspect="0"/>
           </p:cNvPicPr>
@@ -8237,7 +8237,7 @@
       </p:pic>
       <p:sp>
         <p:nvSpPr>
-          <p:cNvPr id="616" name="steevehook"/>
+          <p:cNvPr id="620" name="steevehook"/>
           <p:cNvSpPr txBox="1"/>
           <p:nvPr/>
         </p:nvSpPr>
@@ -8285,7 +8285,7 @@
       </p:sp>
       <p:sp>
         <p:nvSpPr>
-          <p:cNvPr id="617" name="repo"/>
+          <p:cNvPr id="621" name="repo"/>
           <p:cNvSpPr txBox="1"/>
           <p:nvPr/>
         </p:nvSpPr>
@@ -8384,7 +8384,7 @@
                                       <p:cBhvr>
                                         <p:cTn id="6" fill="hold"/>
                                         <p:tgtEl>
-                                          <p:spTgt spid="597"/>
+                                          <p:spTgt spid="601"/>
                                         </p:tgtEl>
                                         <p:attrNameLst>
                                           <p:attrName>style.visibility</p:attrName>
@@ -8398,7 +8398,7 @@
                                       <p:cBhvr>
                                         <p:cTn id="7" dur="700"/>
                                         <p:tgtEl>
-                                          <p:spTgt spid="597"/>
+                                          <p:spTgt spid="601"/>
                                         </p:tgtEl>
                                       </p:cBhvr>
                                     </p:animEffect>
@@ -8427,7 +8427,7 @@
                                       <p:cBhvr>
                                         <p:cTn id="10" fill="hold"/>
                                         <p:tgtEl>
-                                          <p:spTgt spid="604"/>
+                                          <p:spTgt spid="608"/>
                                         </p:tgtEl>
                                         <p:attrNameLst>
                                           <p:attrName>style.visibility</p:attrName>
@@ -8441,7 +8441,7 @@
                                       <p:cBhvr>
                                         <p:cTn id="11" dur="700" fill="hold"/>
                                         <p:tgtEl>
-                                          <p:spTgt spid="604"/>
+                                          <p:spTgt spid="608"/>
                                         </p:tgtEl>
                                         <p:attrNameLst>
                                           <p:attrName>ppt_x</p:attrName>
@@ -8464,7 +8464,7 @@
                                       <p:cBhvr>
                                         <p:cTn id="12" dur="700" fill="hold"/>
                                         <p:tgtEl>
-                                          <p:spTgt spid="604"/>
+                                          <p:spTgt spid="608"/>
                                         </p:tgtEl>
                                         <p:attrNameLst>
                                           <p:attrName>ppt_y</p:attrName>
@@ -8508,7 +8508,7 @@
                                       <p:cBhvr>
                                         <p:cTn id="15" fill="hold"/>
                                         <p:tgtEl>
-                                          <p:spTgt spid="608"/>
+                                          <p:spTgt spid="612"/>
                                         </p:tgtEl>
                                         <p:attrNameLst>
                                           <p:attrName>style.visibility</p:attrName>
@@ -8522,7 +8522,7 @@
                                       <p:cBhvr>
                                         <p:cTn id="16" dur="500"/>
                                         <p:tgtEl>
-                                          <p:spTgt spid="608"/>
+                                          <p:spTgt spid="612"/>
                                         </p:tgtEl>
                                       </p:cBhvr>
                                     </p:animEffect>
@@ -8551,7 +8551,7 @@
                                       <p:cBhvr>
                                         <p:cTn id="19" fill="hold"/>
                                         <p:tgtEl>
-                                          <p:spTgt spid="598"/>
+                                          <p:spTgt spid="602"/>
                                         </p:tgtEl>
                                         <p:attrNameLst>
                                           <p:attrName>style.visibility</p:attrName>
@@ -8565,7 +8565,7 @@
                                       <p:cBhvr>
                                         <p:cTn id="20" dur="700"/>
                                         <p:tgtEl>
-                                          <p:spTgt spid="598"/>
+                                          <p:spTgt spid="602"/>
                                         </p:tgtEl>
                                       </p:cBhvr>
                                     </p:animEffect>
@@ -8594,7 +8594,7 @@
                                       <p:cBhvr>
                                         <p:cTn id="23" fill="hold"/>
                                         <p:tgtEl>
-                                          <p:spTgt spid="605"/>
+                                          <p:spTgt spid="609"/>
                                         </p:tgtEl>
                                         <p:attrNameLst>
                                           <p:attrName>style.visibility</p:attrName>
@@ -8629,7 +8629,7 @@
                                       <p:cBhvr>
                                         <p:cTn id="26" fill="hold"/>
                                         <p:tgtEl>
-                                          <p:spTgt spid="612"/>
+                                          <p:spTgt spid="616"/>
                                         </p:tgtEl>
                                         <p:attrNameLst>
                                           <p:attrName>style.visibility</p:attrName>
@@ -8643,7 +8643,7 @@
                                       <p:cBhvr>
                                         <p:cTn id="27" dur="500"/>
                                         <p:tgtEl>
-                                          <p:spTgt spid="612"/>
+                                          <p:spTgt spid="616"/>
                                         </p:tgtEl>
                                       </p:cBhvr>
                                     </p:animEffect>
@@ -8672,7 +8672,7 @@
                                       <p:cBhvr>
                                         <p:cTn id="30" fill="hold"/>
                                         <p:tgtEl>
-                                          <p:spTgt spid="606"/>
+                                          <p:spTgt spid="610"/>
                                         </p:tgtEl>
                                         <p:attrNameLst>
                                           <p:attrName>style.visibility</p:attrName>
@@ -8686,7 +8686,7 @@
                                       <p:cBhvr>
                                         <p:cTn id="31" dur="700"/>
                                         <p:tgtEl>
-                                          <p:spTgt spid="606"/>
+                                          <p:spTgt spid="610"/>
                                         </p:tgtEl>
                                       </p:cBhvr>
                                     </p:animEffect>
@@ -8715,7 +8715,7 @@
                                       <p:cBhvr>
                                         <p:cTn id="34" fill="hold"/>
                                         <p:tgtEl>
-                                          <p:spTgt spid="616"/>
+                                          <p:spTgt spid="620"/>
                                         </p:tgtEl>
                                         <p:attrNameLst>
                                           <p:attrName>style.visibility</p:attrName>
@@ -8750,7 +8750,7 @@
                                       <p:cBhvr>
                                         <p:cTn id="37" fill="hold"/>
                                         <p:tgtEl>
-                                          <p:spTgt spid="614"/>
+                                          <p:spTgt spid="618"/>
                                         </p:tgtEl>
                                         <p:attrNameLst>
                                           <p:attrName>style.visibility</p:attrName>
@@ -8764,7 +8764,7 @@
                                       <p:cBhvr>
                                         <p:cTn id="38" dur="500"/>
                                         <p:tgtEl>
-                                          <p:spTgt spid="614"/>
+                                          <p:spTgt spid="618"/>
                                         </p:tgtEl>
                                       </p:cBhvr>
                                     </p:animEffect>
@@ -8793,7 +8793,7 @@
                                       <p:cBhvr>
                                         <p:cTn id="41" fill="hold"/>
                                         <p:tgtEl>
-                                          <p:spTgt spid="607"/>
+                                          <p:spTgt spid="611"/>
                                         </p:tgtEl>
                                         <p:attrNameLst>
                                           <p:attrName>style.visibility</p:attrName>
@@ -8807,7 +8807,7 @@
                                       <p:cBhvr>
                                         <p:cTn id="42" dur="700"/>
                                         <p:tgtEl>
-                                          <p:spTgt spid="607"/>
+                                          <p:spTgt spid="611"/>
                                         </p:tgtEl>
                                       </p:cBhvr>
                                     </p:animEffect>
@@ -8836,7 +8836,7 @@
                                       <p:cBhvr>
                                         <p:cTn id="45" fill="hold"/>
                                         <p:tgtEl>
-                                          <p:spTgt spid="617"/>
+                                          <p:spTgt spid="621"/>
                                         </p:tgtEl>
                                         <p:attrNameLst>
                                           <p:attrName>style.visibility</p:attrName>
@@ -8871,7 +8871,7 @@
                                       <p:cBhvr>
                                         <p:cTn id="48" fill="hold"/>
                                         <p:tgtEl>
-                                          <p:spTgt spid="610"/>
+                                          <p:spTgt spid="614"/>
                                         </p:tgtEl>
                                         <p:attrNameLst>
                                           <p:attrName>style.visibility</p:attrName>
@@ -8885,7 +8885,7 @@
                                       <p:cBhvr>
                                         <p:cTn id="49" dur="500"/>
                                         <p:tgtEl>
-                                          <p:spTgt spid="610"/>
+                                          <p:spTgt spid="614"/>
                                         </p:tgtEl>
                                       </p:cBhvr>
                                     </p:animEffect>
@@ -8914,7 +8914,7 @@
                                       <p:cBhvr>
                                         <p:cTn id="52" fill="hold"/>
                                         <p:tgtEl>
-                                          <p:spTgt spid="599"/>
+                                          <p:spTgt spid="603"/>
                                         </p:tgtEl>
                                         <p:attrNameLst>
                                           <p:attrName>style.visibility</p:attrName>
@@ -8928,7 +8928,7 @@
                                       <p:cBhvr>
                                         <p:cTn id="53" dur="700"/>
                                         <p:tgtEl>
-                                          <p:spTgt spid="599"/>
+                                          <p:spTgt spid="603"/>
                                         </p:tgtEl>
                                       </p:cBhvr>
                                     </p:animEffect>
@@ -8957,7 +8957,7 @@
                                       <p:cBhvr>
                                         <p:cTn id="56" fill="hold"/>
                                         <p:tgtEl>
-                                          <p:spTgt spid="600"/>
+                                          <p:spTgt spid="604"/>
                                         </p:tgtEl>
                                         <p:attrNameLst>
                                           <p:attrName>style.visibility</p:attrName>
@@ -8998,20 +8998,20 @@
       </p:par>
     </p:tnLst>
     <p:bldLst>
-      <p:bldP build="whole" bldLvl="1" animBg="1" rev="0" advAuto="0" spid="605" grpId="5"/>
-      <p:bldP build="whole" bldLvl="1" animBg="1" rev="0" advAuto="0" spid="608" grpId="3"/>
-      <p:bldP build="whole" bldLvl="1" animBg="1" rev="0" advAuto="0" spid="607" grpId="10"/>
-      <p:bldP build="whole" bldLvl="1" animBg="1" rev="0" advAuto="0" spid="600" grpId="14"/>
-      <p:bldP build="whole" bldLvl="1" animBg="1" rev="0" advAuto="0" spid="604" grpId="2"/>
-      <p:bldP build="whole" bldLvl="1" animBg="1" rev="0" advAuto="0" spid="598" grpId="4"/>
-      <p:bldP build="whole" bldLvl="1" animBg="1" rev="0" advAuto="0" spid="612" grpId="6"/>
-      <p:bldP build="whole" bldLvl="1" animBg="1" rev="0" advAuto="0" spid="614" grpId="9"/>
-      <p:bldP build="whole" bldLvl="1" animBg="1" rev="0" advAuto="0" spid="597" grpId="1"/>
-      <p:bldP build="whole" bldLvl="1" animBg="1" rev="0" advAuto="0" spid="606" grpId="7"/>
-      <p:bldP build="whole" bldLvl="1" animBg="1" rev="0" advAuto="0" spid="610" grpId="12"/>
-      <p:bldP build="whole" bldLvl="1" animBg="1" rev="0" advAuto="0" spid="599" grpId="13"/>
-      <p:bldP build="whole" bldLvl="1" animBg="1" rev="0" advAuto="0" spid="616" grpId="8"/>
-      <p:bldP build="whole" bldLvl="1" animBg="1" rev="0" advAuto="0" spid="617" grpId="11"/>
+      <p:bldP build="whole" bldLvl="1" animBg="1" rev="0" advAuto="0" spid="620" grpId="8"/>
+      <p:bldP build="whole" bldLvl="1" animBg="1" rev="0" advAuto="0" spid="608" grpId="2"/>
+      <p:bldP build="whole" bldLvl="1" animBg="1" rev="0" advAuto="0" spid="621" grpId="11"/>
+      <p:bldP build="whole" bldLvl="1" animBg="1" rev="0" advAuto="0" spid="616" grpId="6"/>
+      <p:bldP build="whole" bldLvl="1" animBg="1" rev="0" advAuto="0" spid="609" grpId="5"/>
+      <p:bldP build="whole" bldLvl="1" animBg="1" rev="0" advAuto="0" spid="611" grpId="10"/>
+      <p:bldP build="whole" bldLvl="1" animBg="1" rev="0" advAuto="0" spid="614" grpId="12"/>
+      <p:bldP build="whole" bldLvl="1" animBg="1" rev="0" advAuto="0" spid="603" grpId="13"/>
+      <p:bldP build="whole" bldLvl="1" animBg="1" rev="0" advAuto="0" spid="602" grpId="4"/>
+      <p:bldP build="whole" bldLvl="1" animBg="1" rev="0" advAuto="0" spid="618" grpId="9"/>
+      <p:bldP build="whole" bldLvl="1" animBg="1" rev="0" advAuto="0" spid="610" grpId="7"/>
+      <p:bldP build="whole" bldLvl="1" animBg="1" rev="0" advAuto="0" spid="601" grpId="1"/>
+      <p:bldP build="whole" bldLvl="1" animBg="1" rev="0" advAuto="0" spid="604" grpId="14"/>
+      <p:bldP build="whole" bldLvl="1" animBg="1" rev="0" advAuto="0" spid="612" grpId="3"/>
     </p:bldLst>
   </p:timing>
 </p:sld>
@@ -9043,7 +9043,7 @@
       </p:grpSpPr>
       <p:sp>
         <p:nvSpPr>
-          <p:cNvPr id="619" name="Title 6"/>
+          <p:cNvPr id="623" name="Title 6"/>
           <p:cNvSpPr txBox="1"/>
           <p:nvPr>
             <p:ph type="title"/>
@@ -9079,7 +9079,7 @@
       </p:sp>
       <p:pic>
         <p:nvPicPr>
-          <p:cNvPr id="620" name="cubes.png" descr="cubes.png"/>
+          <p:cNvPr id="624" name="cubes.png" descr="cubes.png"/>
           <p:cNvPicPr>
             <a:picLocks noChangeAspect="1"/>
           </p:cNvPicPr>
@@ -9108,7 +9108,7 @@
       </p:pic>
       <p:grpSp>
         <p:nvGrpSpPr>
-          <p:cNvPr id="623" name="Group"/>
+          <p:cNvPr id="627" name="Group"/>
           <p:cNvGrpSpPr/>
           <p:nvPr/>
         </p:nvGrpSpPr>
@@ -9122,7 +9122,7 @@
         </p:grpSpPr>
         <p:pic>
           <p:nvPicPr>
-            <p:cNvPr id="621" name="folder.png" descr="folder.png"/>
+            <p:cNvPr id="625" name="folder.png" descr="folder.png"/>
             <p:cNvPicPr>
               <a:picLocks noChangeAspect="1"/>
             </p:cNvPicPr>
@@ -9153,7 +9153,7 @@
         </p:pic>
         <p:sp>
           <p:nvSpPr>
-            <p:cNvPr id="622" name="vendor"/>
+            <p:cNvPr id="626" name="vendor"/>
             <p:cNvSpPr/>
             <p:nvPr/>
           </p:nvSpPr>
@@ -9205,21 +9205,21 @@
       </p:grpSp>
       <p:grpSp>
         <p:nvGrpSpPr>
-          <p:cNvPr id="626" name="Group"/>
+          <p:cNvPr id="630" name="Group"/>
           <p:cNvGrpSpPr/>
           <p:nvPr/>
         </p:nvGrpSpPr>
         <p:grpSpPr>
           <a:xfrm>
-            <a:off x="1270000" y="6591338"/>
-            <a:ext cx="2160530" cy="1631513"/>
+            <a:off x="1270000" y="6591337"/>
+            <a:ext cx="2160530" cy="1631514"/>
             <a:chOff x="0" y="0"/>
             <a:chExt cx="2160529" cy="1631512"/>
           </a:xfrm>
         </p:grpSpPr>
         <p:pic>
           <p:nvPicPr>
-            <p:cNvPr id="624" name="folder.png" descr="folder.png"/>
+            <p:cNvPr id="628" name="folder.png" descr="folder.png"/>
             <p:cNvPicPr>
               <a:picLocks noChangeAspect="1"/>
             </p:cNvPicPr>
@@ -9250,7 +9250,7 @@
         </p:pic>
         <p:sp>
           <p:nvSpPr>
-            <p:cNvPr id="625" name="pkg"/>
+            <p:cNvPr id="629" name="pkg"/>
             <p:cNvSpPr/>
             <p:nvPr/>
           </p:nvSpPr>
@@ -9302,21 +9302,21 @@
       </p:grpSp>
       <p:grpSp>
         <p:nvGrpSpPr>
-          <p:cNvPr id="629" name="Group"/>
+          <p:cNvPr id="633" name="Group"/>
           <p:cNvGrpSpPr/>
           <p:nvPr/>
         </p:nvGrpSpPr>
         <p:grpSpPr>
           <a:xfrm>
-            <a:off x="1269999" y="4053066"/>
-            <a:ext cx="2160531" cy="1631514"/>
+            <a:off x="1270000" y="4053066"/>
+            <a:ext cx="2160530" cy="1631514"/>
             <a:chOff x="0" y="0"/>
             <a:chExt cx="2160529" cy="1631512"/>
           </a:xfrm>
         </p:grpSpPr>
         <p:pic>
           <p:nvPicPr>
-            <p:cNvPr id="627" name="folder.png" descr="folder.png"/>
+            <p:cNvPr id="631" name="folder.png" descr="folder.png"/>
             <p:cNvPicPr>
               <a:picLocks noChangeAspect="1"/>
             </p:cNvPicPr>
@@ -9347,7 +9347,7 @@
         </p:pic>
         <p:sp>
           <p:nvSpPr>
-            <p:cNvPr id="628" name="internal"/>
+            <p:cNvPr id="632" name="internal"/>
             <p:cNvSpPr/>
             <p:nvPr/>
           </p:nvSpPr>
@@ -9399,7 +9399,7 @@
       </p:grpSp>
       <p:grpSp>
         <p:nvGrpSpPr>
-          <p:cNvPr id="632" name="Group"/>
+          <p:cNvPr id="636" name="Group"/>
           <p:cNvGrpSpPr/>
           <p:nvPr/>
         </p:nvGrpSpPr>
@@ -9413,7 +9413,7 @@
         </p:grpSpPr>
         <p:pic>
           <p:nvPicPr>
-            <p:cNvPr id="630" name="folder.png" descr="folder.png"/>
+            <p:cNvPr id="634" name="folder.png" descr="folder.png"/>
             <p:cNvPicPr>
               <a:picLocks noChangeAspect="1"/>
             </p:cNvPicPr>
@@ -9444,7 +9444,7 @@
         </p:pic>
         <p:sp>
           <p:nvSpPr>
-            <p:cNvPr id="631" name="cmd"/>
+            <p:cNvPr id="635" name="cmd"/>
             <p:cNvSpPr/>
             <p:nvPr/>
           </p:nvSpPr>
@@ -9496,21 +9496,21 @@
       </p:grpSp>
       <p:grpSp>
         <p:nvGrpSpPr>
-          <p:cNvPr id="635" name="Group"/>
+          <p:cNvPr id="639" name="Group"/>
           <p:cNvGrpSpPr/>
           <p:nvPr/>
         </p:nvGrpSpPr>
         <p:grpSpPr>
           <a:xfrm>
-            <a:off x="1269999" y="8809749"/>
-            <a:ext cx="2160531" cy="1631513"/>
+            <a:off x="1270000" y="8809749"/>
+            <a:ext cx="2160530" cy="1631513"/>
             <a:chOff x="0" y="0"/>
             <a:chExt cx="2160529" cy="1631512"/>
           </a:xfrm>
         </p:grpSpPr>
         <p:pic>
           <p:nvPicPr>
-            <p:cNvPr id="633" name="folder.png" descr="folder.png"/>
+            <p:cNvPr id="637" name="folder.png" descr="folder.png"/>
             <p:cNvPicPr>
               <a:picLocks noChangeAspect="1"/>
             </p:cNvPicPr>
@@ -9541,7 +9541,7 @@
         </p:pic>
         <p:sp>
           <p:nvSpPr>
-            <p:cNvPr id="634" name=".dir"/>
+            <p:cNvPr id="638" name=".dir"/>
             <p:cNvSpPr/>
             <p:nvPr/>
           </p:nvSpPr>
@@ -9593,7 +9593,7 @@
       </p:grpSp>
       <p:grpSp>
         <p:nvGrpSpPr>
-          <p:cNvPr id="638" name="Group"/>
+          <p:cNvPr id="642" name="Group"/>
           <p:cNvGrpSpPr/>
           <p:nvPr/>
         </p:nvGrpSpPr>
@@ -9607,7 +9607,7 @@
         </p:grpSpPr>
         <p:pic>
           <p:nvPicPr>
-            <p:cNvPr id="636" name="folder.png" descr="folder.png"/>
+            <p:cNvPr id="640" name="folder.png" descr="folder.png"/>
             <p:cNvPicPr>
               <a:picLocks noChangeAspect="1"/>
             </p:cNvPicPr>
@@ -9638,7 +9638,7 @@
         </p:pic>
         <p:sp>
           <p:nvSpPr>
-            <p:cNvPr id="637" name="_dir"/>
+            <p:cNvPr id="641" name="_dir"/>
             <p:cNvSpPr/>
             <p:nvPr/>
           </p:nvSpPr>
@@ -9690,21 +9690,21 @@
       </p:grpSp>
       <p:grpSp>
         <p:nvGrpSpPr>
-          <p:cNvPr id="641" name="Group"/>
+          <p:cNvPr id="645" name="Group"/>
           <p:cNvGrpSpPr/>
           <p:nvPr/>
         </p:nvGrpSpPr>
         <p:grpSpPr>
           <a:xfrm>
-            <a:off x="1270000" y="9918954"/>
-            <a:ext cx="2160530" cy="1631514"/>
+            <a:off x="1270000" y="9918955"/>
+            <a:ext cx="2160530" cy="1631513"/>
             <a:chOff x="0" y="0"/>
             <a:chExt cx="2160529" cy="1631512"/>
           </a:xfrm>
         </p:grpSpPr>
         <p:pic>
           <p:nvPicPr>
-            <p:cNvPr id="639" name="folder.png" descr="folder.png"/>
+            <p:cNvPr id="643" name="folder.png" descr="folder.png"/>
             <p:cNvPicPr>
               <a:picLocks noChangeAspect="1"/>
             </p:cNvPicPr>
@@ -9735,7 +9735,7 @@
         </p:pic>
         <p:sp>
           <p:nvSpPr>
-            <p:cNvPr id="640" name="testdata"/>
+            <p:cNvPr id="644" name="testdata"/>
             <p:cNvSpPr/>
             <p:nvPr/>
           </p:nvSpPr>
@@ -9838,7 +9838,7 @@
                                       <p:cBhvr>
                                         <p:cTn id="6" fill="hold"/>
                                         <p:tgtEl>
-                                          <p:spTgt spid="623"/>
+                                          <p:spTgt spid="627"/>
                                         </p:tgtEl>
                                         <p:attrNameLst>
                                           <p:attrName>style.visibility</p:attrName>
@@ -9852,7 +9852,7 @@
                                       <p:cBhvr>
                                         <p:cTn id="7" dur="600" fill="hold"/>
                                         <p:tgtEl>
-                                          <p:spTgt spid="623"/>
+                                          <p:spTgt spid="627"/>
                                         </p:tgtEl>
                                         <p:attrNameLst>
                                           <p:attrName>ppt_w</p:attrName>
@@ -9875,7 +9875,7 @@
                                       <p:cBhvr>
                                         <p:cTn id="8" dur="600" fill="hold"/>
                                         <p:tgtEl>
-                                          <p:spTgt spid="623"/>
+                                          <p:spTgt spid="627"/>
                                         </p:tgtEl>
                                         <p:attrNameLst>
                                           <p:attrName>ppt_h</p:attrName>
@@ -9919,7 +9919,7 @@
                                       <p:cBhvr>
                                         <p:cTn id="11" fill="hold"/>
                                         <p:tgtEl>
-                                          <p:spTgt spid="629"/>
+                                          <p:spTgt spid="633"/>
                                         </p:tgtEl>
                                         <p:attrNameLst>
                                           <p:attrName>style.visibility</p:attrName>
@@ -9933,7 +9933,7 @@
                                       <p:cBhvr>
                                         <p:cTn id="12" dur="600" fill="hold"/>
                                         <p:tgtEl>
-                                          <p:spTgt spid="629"/>
+                                          <p:spTgt spid="633"/>
                                         </p:tgtEl>
                                         <p:attrNameLst>
                                           <p:attrName>ppt_w</p:attrName>
@@ -9956,7 +9956,7 @@
                                       <p:cBhvr>
                                         <p:cTn id="13" dur="600" fill="hold"/>
                                         <p:tgtEl>
-                                          <p:spTgt spid="629"/>
+                                          <p:spTgt spid="633"/>
                                         </p:tgtEl>
                                         <p:attrNameLst>
                                           <p:attrName>ppt_h</p:attrName>
@@ -10000,7 +10000,7 @@
                                       <p:cBhvr>
                                         <p:cTn id="16" fill="hold"/>
                                         <p:tgtEl>
-                                          <p:spTgt spid="626"/>
+                                          <p:spTgt spid="630"/>
                                         </p:tgtEl>
                                         <p:attrNameLst>
                                           <p:attrName>style.visibility</p:attrName>
@@ -10014,7 +10014,7 @@
                                       <p:cBhvr>
                                         <p:cTn id="17" dur="600" fill="hold"/>
                                         <p:tgtEl>
-                                          <p:spTgt spid="626"/>
+                                          <p:spTgt spid="630"/>
                                         </p:tgtEl>
                                         <p:attrNameLst>
                                           <p:attrName>ppt_w</p:attrName>
@@ -10037,7 +10037,7 @@
                                       <p:cBhvr>
                                         <p:cTn id="18" dur="600" fill="hold"/>
                                         <p:tgtEl>
-                                          <p:spTgt spid="626"/>
+                                          <p:spTgt spid="630"/>
                                         </p:tgtEl>
                                         <p:attrNameLst>
                                           <p:attrName>ppt_h</p:attrName>
@@ -10081,7 +10081,7 @@
                                       <p:cBhvr>
                                         <p:cTn id="21" fill="hold"/>
                                         <p:tgtEl>
-                                          <p:spTgt spid="632"/>
+                                          <p:spTgt spid="636"/>
                                         </p:tgtEl>
                                         <p:attrNameLst>
                                           <p:attrName>style.visibility</p:attrName>
@@ -10095,7 +10095,7 @@
                                       <p:cBhvr>
                                         <p:cTn id="22" dur="600" fill="hold"/>
                                         <p:tgtEl>
-                                          <p:spTgt spid="632"/>
+                                          <p:spTgt spid="636"/>
                                         </p:tgtEl>
                                         <p:attrNameLst>
                                           <p:attrName>ppt_w</p:attrName>
@@ -10118,7 +10118,7 @@
                                       <p:cBhvr>
                                         <p:cTn id="23" dur="600" fill="hold"/>
                                         <p:tgtEl>
-                                          <p:spTgt spid="632"/>
+                                          <p:spTgt spid="636"/>
                                         </p:tgtEl>
                                         <p:attrNameLst>
                                           <p:attrName>ppt_h</p:attrName>
@@ -10162,7 +10162,7 @@
                                       <p:cBhvr>
                                         <p:cTn id="26" fill="hold"/>
                                         <p:tgtEl>
-                                          <p:spTgt spid="635"/>
+                                          <p:spTgt spid="639"/>
                                         </p:tgtEl>
                                         <p:attrNameLst>
                                           <p:attrName>style.visibility</p:attrName>
@@ -10176,7 +10176,7 @@
                                       <p:cBhvr>
                                         <p:cTn id="27" dur="600" fill="hold"/>
                                         <p:tgtEl>
-                                          <p:spTgt spid="635"/>
+                                          <p:spTgt spid="639"/>
                                         </p:tgtEl>
                                         <p:attrNameLst>
                                           <p:attrName>ppt_w</p:attrName>
@@ -10199,7 +10199,7 @@
                                       <p:cBhvr>
                                         <p:cTn id="28" dur="600" fill="hold"/>
                                         <p:tgtEl>
-                                          <p:spTgt spid="635"/>
+                                          <p:spTgt spid="639"/>
                                         </p:tgtEl>
                                         <p:attrNameLst>
                                           <p:attrName>ppt_h</p:attrName>
@@ -10243,7 +10243,7 @@
                                       <p:cBhvr>
                                         <p:cTn id="31" fill="hold"/>
                                         <p:tgtEl>
-                                          <p:spTgt spid="638"/>
+                                          <p:spTgt spid="642"/>
                                         </p:tgtEl>
                                         <p:attrNameLst>
                                           <p:attrName>style.visibility</p:attrName>
@@ -10257,7 +10257,7 @@
                                       <p:cBhvr>
                                         <p:cTn id="32" dur="600" fill="hold"/>
                                         <p:tgtEl>
-                                          <p:spTgt spid="638"/>
+                                          <p:spTgt spid="642"/>
                                         </p:tgtEl>
                                         <p:attrNameLst>
                                           <p:attrName>ppt_w</p:attrName>
@@ -10280,7 +10280,7 @@
                                       <p:cBhvr>
                                         <p:cTn id="33" dur="600" fill="hold"/>
                                         <p:tgtEl>
-                                          <p:spTgt spid="638"/>
+                                          <p:spTgt spid="642"/>
                                         </p:tgtEl>
                                         <p:attrNameLst>
                                           <p:attrName>ppt_h</p:attrName>
@@ -10324,7 +10324,7 @@
                                       <p:cBhvr>
                                         <p:cTn id="36" fill="hold"/>
                                         <p:tgtEl>
-                                          <p:spTgt spid="641"/>
+                                          <p:spTgt spid="645"/>
                                         </p:tgtEl>
                                         <p:attrNameLst>
                                           <p:attrName>style.visibility</p:attrName>
@@ -10338,7 +10338,7 @@
                                       <p:cBhvr>
                                         <p:cTn id="37" dur="600" fill="hold"/>
                                         <p:tgtEl>
-                                          <p:spTgt spid="641"/>
+                                          <p:spTgt spid="645"/>
                                         </p:tgtEl>
                                         <p:attrNameLst>
                                           <p:attrName>ppt_w</p:attrName>
@@ -10361,7 +10361,7 @@
                                       <p:cBhvr>
                                         <p:cTn id="38" dur="600" fill="hold"/>
                                         <p:tgtEl>
-                                          <p:spTgt spid="641"/>
+                                          <p:spTgt spid="645"/>
                                         </p:tgtEl>
                                         <p:attrNameLst>
                                           <p:attrName>ppt_h</p:attrName>
@@ -10411,13 +10411,13 @@
       </p:par>
     </p:tnLst>
     <p:bldLst>
-      <p:bldP build="whole" bldLvl="1" animBg="1" rev="0" advAuto="0" spid="635" grpId="5"/>
-      <p:bldP build="whole" bldLvl="1" animBg="1" rev="0" advAuto="0" spid="638" grpId="6"/>
-      <p:bldP build="whole" bldLvl="1" animBg="1" rev="0" advAuto="0" spid="641" grpId="7"/>
-      <p:bldP build="whole" bldLvl="1" animBg="1" rev="0" advAuto="0" spid="629" grpId="2"/>
-      <p:bldP build="whole" bldLvl="1" animBg="1" rev="0" advAuto="0" spid="623" grpId="1"/>
-      <p:bldP build="whole" bldLvl="1" animBg="1" rev="0" advAuto="0" spid="626" grpId="3"/>
-      <p:bldP build="whole" bldLvl="1" animBg="1" rev="0" advAuto="0" spid="632" grpId="4"/>
+      <p:bldP build="whole" bldLvl="1" animBg="1" rev="0" advAuto="0" spid="630" grpId="3"/>
+      <p:bldP build="whole" bldLvl="1" animBg="1" rev="0" advAuto="0" spid="627" grpId="1"/>
+      <p:bldP build="whole" bldLvl="1" animBg="1" rev="0" advAuto="0" spid="636" grpId="4"/>
+      <p:bldP build="whole" bldLvl="1" animBg="1" rev="0" advAuto="0" spid="639" grpId="5"/>
+      <p:bldP build="whole" bldLvl="1" animBg="1" rev="0" advAuto="0" spid="645" grpId="7"/>
+      <p:bldP build="whole" bldLvl="1" animBg="1" rev="0" advAuto="0" spid="633" grpId="2"/>
+      <p:bldP build="whole" bldLvl="1" animBg="1" rev="0" advAuto="0" spid="642" grpId="6"/>
     </p:bldLst>
   </p:timing>
 </p:sld>
@@ -10831,9 +10831,9 @@
       </p:par>
     </p:tnLst>
     <p:bldLst>
-      <p:bldP build="whole" bldLvl="1" animBg="1" rev="0" advAuto="0" spid="186" grpId="1"/>
       <p:bldP build="whole" bldLvl="1" animBg="1" rev="0" advAuto="0" spid="187" grpId="2"/>
       <p:bldP build="whole" bldLvl="1" animBg="1" rev="0" advAuto="0" spid="188" grpId="3"/>
+      <p:bldP build="whole" bldLvl="1" animBg="1" rev="0" advAuto="0" spid="186" grpId="1"/>
     </p:bldLst>
   </p:timing>
 </p:sld>
@@ -12512,14 +12512,14 @@
       </p:par>
     </p:tnLst>
     <p:bldLst>
-      <p:bldP build="whole" bldLvl="1" animBg="1" rev="0" advAuto="0" spid="200" grpId="7"/>
-      <p:bldP build="whole" bldLvl="1" animBg="1" rev="0" advAuto="0" spid="206" grpId="1"/>
-      <p:bldP build="whole" bldLvl="1" animBg="1" rev="0" advAuto="0" spid="215" grpId="3"/>
+      <p:bldP build="whole" bldLvl="1" animBg="1" rev="0" advAuto="0" spid="197" grpId="6"/>
       <p:bldP build="whole" bldLvl="1" animBg="1" rev="0" advAuto="0" spid="212" grpId="4"/>
       <p:bldP build="whole" bldLvl="1" animBg="1" rev="0" advAuto="0" spid="194" grpId="5"/>
-      <p:bldP build="whole" bldLvl="1" animBg="1" rev="0" advAuto="0" spid="197" grpId="6"/>
       <p:bldP build="whole" bldLvl="1" animBg="1" rev="0" advAuto="0" spid="209" grpId="2"/>
+      <p:bldP build="whole" bldLvl="1" animBg="1" rev="0" advAuto="0" spid="206" grpId="1"/>
       <p:bldP build="whole" bldLvl="1" animBg="1" rev="0" advAuto="0" spid="203" grpId="8"/>
+      <p:bldP build="whole" bldLvl="1" animBg="1" rev="0" advAuto="0" spid="215" grpId="3"/>
+      <p:bldP build="whole" bldLvl="1" animBg="1" rev="0" advAuto="0" spid="200" grpId="7"/>
     </p:bldLst>
   </p:timing>
 </p:sld>
@@ -13929,12 +13929,12 @@
       </p:par>
     </p:tnLst>
     <p:bldLst>
+      <p:bldP build="whole" bldLvl="1" animBg="1" rev="0" advAuto="0" spid="228" grpId="2"/>
+      <p:bldP build="whole" bldLvl="1" animBg="1" rev="0" advAuto="0" spid="232" grpId="3"/>
+      <p:bldP build="whole" bldLvl="1" animBg="1" rev="0" advAuto="0" spid="221" grpId="1"/>
       <p:bldP build="whole" bldLvl="1" animBg="1" rev="0" advAuto="0" spid="224" grpId="5"/>
-      <p:bldP build="whole" bldLvl="1" animBg="1" rev="0" advAuto="0" spid="228" grpId="2"/>
       <p:bldP build="whole" bldLvl="1" animBg="1" rev="0" advAuto="0" spid="236" grpId="6"/>
-      <p:bldP build="whole" bldLvl="1" animBg="1" rev="0" advAuto="0" spid="221" grpId="1"/>
       <p:bldP build="whole" bldLvl="1" animBg="1" rev="0" advAuto="0" spid="239" grpId="4"/>
-      <p:bldP build="whole" bldLvl="1" animBg="1" rev="0" advAuto="0" spid="232" grpId="3"/>
     </p:bldLst>
   </p:timing>
 </p:sld>
@@ -17736,28 +17736,28 @@
       </p:par>
     </p:tnLst>
     <p:bldLst>
-      <p:bldP build="whole" bldLvl="1" animBg="1" rev="0" advAuto="0" spid="318" grpId="20"/>
-      <p:bldP build="whole" bldLvl="1" animBg="1" rev="0" advAuto="0" spid="266" grpId="6"/>
-      <p:bldP build="whole" bldLvl="1" animBg="1" rev="0" advAuto="0" spid="267" grpId="9"/>
-      <p:bldP build="whole" bldLvl="1" animBg="1" rev="0" advAuto="0" spid="267" grpId="11"/>
-      <p:bldP build="whole" bldLvl="1" animBg="1" rev="0" advAuto="0" spid="243" grpId="2"/>
-      <p:bldP build="whole" bldLvl="1" animBg="1" rev="0" advAuto="0" spid="296" grpId="16"/>
-      <p:bldP build="whole" bldLvl="1" animBg="1" rev="0" advAuto="0" spid="250" grpId="1"/>
-      <p:bldP build="whole" bldLvl="1" animBg="1" rev="0" advAuto="0" spid="296" grpId="17"/>
-      <p:bldP build="whole" bldLvl="1" animBg="1" rev="0" advAuto="0" spid="297" grpId="19"/>
-      <p:bldP build="whole" bldLvl="1" animBg="1" rev="0" advAuto="0" spid="258" grpId="3"/>
-      <p:bldP build="whole" bldLvl="1" animBg="1" rev="0" advAuto="0" spid="274" grpId="7"/>
-      <p:bldP build="whole" bldLvl="1" animBg="1" rev="0" advAuto="0" spid="251" grpId="4"/>
-      <p:bldP build="whole" bldLvl="1" animBg="1" rev="0" advAuto="0" spid="251" grpId="5"/>
-      <p:bldP build="whole" bldLvl="1" animBg="1" rev="0" advAuto="0" spid="259" grpId="8"/>
-      <p:bldP build="whole" bldLvl="1" animBg="1" rev="0" advAuto="0" spid="259" grpId="10"/>
-      <p:bldP build="whole" bldLvl="1" animBg="1" rev="0" advAuto="0" spid="295" grpId="15"/>
       <p:bldP build="whole" bldLvl="1" animBg="1" rev="0" advAuto="0" spid="275" grpId="13"/>
       <p:bldP build="whole" bldLvl="1" animBg="1" rev="0" advAuto="0" spid="275" grpId="14"/>
+      <p:bldP build="whole" bldLvl="1" animBg="1" rev="0" advAuto="0" spid="296" grpId="16"/>
+      <p:bldP build="whole" bldLvl="1" animBg="1" rev="0" advAuto="0" spid="296" grpId="17"/>
+      <p:bldP build="whole" bldLvl="1" animBg="1" rev="0" advAuto="0" spid="266" grpId="6"/>
+      <p:bldP build="whole" bldLvl="1" animBg="1" rev="0" advAuto="0" spid="297" grpId="19"/>
+      <p:bldP build="whole" bldLvl="1" animBg="1" rev="0" advAuto="0" spid="250" grpId="1"/>
+      <p:bldP build="whole" bldLvl="1" animBg="1" rev="0" advAuto="0" spid="274" grpId="7"/>
+      <p:bldP build="whole" bldLvl="1" animBg="1" rev="0" advAuto="0" spid="267" grpId="9"/>
+      <p:bldP build="whole" bldLvl="1" animBg="1" rev="0" advAuto="0" spid="251" grpId="4"/>
+      <p:bldP build="whole" bldLvl="1" animBg="1" rev="0" advAuto="0" spid="243" grpId="2"/>
+      <p:bldP build="whole" bldLvl="1" animBg="1" rev="0" advAuto="0" spid="267" grpId="11"/>
+      <p:bldP build="whole" bldLvl="1" animBg="1" rev="0" advAuto="0" spid="251" grpId="5"/>
+      <p:bldP build="whole" bldLvl="1" animBg="1" rev="0" advAuto="0" spid="258" grpId="3"/>
       <p:bldP build="whole" bldLvl="1" animBg="1" rev="0" advAuto="0" spid="282" grpId="12"/>
+      <p:bldP build="whole" bldLvl="1" animBg="1" rev="0" advAuto="0" spid="318" grpId="20"/>
       <p:bldP build="whole" bldLvl="1" animBg="1" rev="0" advAuto="0" spid="304" grpId="18"/>
       <p:bldP build="whole" bldLvl="1" animBg="1" rev="0" advAuto="0" spid="305" grpId="21"/>
       <p:bldP build="whole" bldLvl="1" animBg="1" rev="0" advAuto="0" spid="305" grpId="22"/>
+      <p:bldP build="whole" bldLvl="1" animBg="1" rev="0" advAuto="0" spid="295" grpId="15"/>
+      <p:bldP build="whole" bldLvl="1" animBg="1" rev="0" advAuto="0" spid="259" grpId="8"/>
+      <p:bldP build="whole" bldLvl="1" animBg="1" rev="0" advAuto="0" spid="259" grpId="10"/>
     </p:bldLst>
   </p:timing>
 </p:sld>
@@ -19772,19 +19772,19 @@
       </p:par>
     </p:tnLst>
     <p:bldLst>
-      <p:bldP build="whole" bldLvl="1" animBg="1" rev="0" advAuto="0" spid="345" grpId="10"/>
-      <p:bldP build="whole" bldLvl="1" animBg="1" rev="0" advAuto="0" spid="330" grpId="9"/>
+      <p:bldP build="whole" bldLvl="1" animBg="1" rev="0" advAuto="0" spid="337" grpId="11"/>
       <p:bldP build="whole" bldLvl="1" animBg="1" rev="0" advAuto="0" spid="326" grpId="3"/>
       <p:bldP build="whole" bldLvl="1" animBg="1" rev="0" advAuto="0" spid="349" grpId="7"/>
+      <p:bldP build="whole" bldLvl="1" animBg="1" rev="0" advAuto="0" spid="341" grpId="4"/>
+      <p:bldP build="whole" bldLvl="1" animBg="1" rev="0" advAuto="0" spid="336" grpId="8"/>
+      <p:bldP build="whole" bldLvl="1" animBg="1" rev="0" advAuto="0" spid="330" grpId="9"/>
+      <p:bldP build="whole" bldLvl="1" animBg="1" rev="0" advAuto="0" spid="353" grpId="13"/>
+      <p:bldP build="whole" bldLvl="1" animBg="1" rev="0" advAuto="0" spid="334" grpId="2"/>
+      <p:bldP build="whole" bldLvl="1" animBg="1" rev="0" advAuto="0" spid="325" grpId="1"/>
+      <p:bldP build="whole" bldLvl="1" animBg="1" rev="0" advAuto="0" spid="335" grpId="5"/>
+      <p:bldP build="whole" bldLvl="1" animBg="1" rev="0" advAuto="0" spid="345" grpId="10"/>
       <p:bldP build="whole" bldLvl="1" animBg="1" rev="0" advAuto="0" spid="332" grpId="12"/>
-      <p:bldP build="whole" bldLvl="1" animBg="1" rev="0" advAuto="0" spid="336" grpId="8"/>
-      <p:bldP build="whole" bldLvl="1" animBg="1" rev="0" advAuto="0" spid="341" grpId="4"/>
       <p:bldP build="whole" bldLvl="1" animBg="1" rev="0" advAuto="0" spid="328" grpId="6"/>
-      <p:bldP build="whole" bldLvl="1" animBg="1" rev="0" advAuto="0" spid="334" grpId="2"/>
-      <p:bldP build="whole" bldLvl="1" animBg="1" rev="0" advAuto="0" spid="335" grpId="5"/>
-      <p:bldP build="whole" bldLvl="1" animBg="1" rev="0" advAuto="0" spid="325" grpId="1"/>
-      <p:bldP build="whole" bldLvl="1" animBg="1" rev="0" advAuto="0" spid="337" grpId="11"/>
-      <p:bldP build="whole" bldLvl="1" animBg="1" rev="0" advAuto="0" spid="353" grpId="13"/>
     </p:bldLst>
   </p:timing>
 </p:sld>
@@ -27867,70 +27867,70 @@
       </p:par>
     </p:tnLst>
     <p:bldLst>
-      <p:bldP build="whole" bldLvl="1" animBg="1" rev="0" advAuto="0" spid="489" grpId="31"/>
-      <p:bldP build="whole" bldLvl="1" animBg="1" rev="0" advAuto="0" spid="390" grpId="19"/>
-      <p:bldP build="whole" bldLvl="1" animBg="1" rev="0" advAuto="0" spid="443" grpId="5"/>
-      <p:bldP build="whole" bldLvl="1" animBg="1" rev="0" advAuto="0" spid="378" grpId="44"/>
-      <p:bldP build="whole" bldLvl="1" animBg="1" rev="0" advAuto="0" spid="366" grpId="3"/>
-      <p:bldP build="whole" bldLvl="1" animBg="1" rev="0" advAuto="0" spid="399" grpId="46"/>
-      <p:bldP build="whole" bldLvl="1" animBg="1" rev="0" advAuto="0" spid="499" grpId="57"/>
-      <p:bldP build="whole" bldLvl="1" animBg="1" rev="0" advAuto="0" spid="505" grpId="62"/>
+      <p:bldP build="whole" bldLvl="1" animBg="1" rev="0" advAuto="0" spid="414" grpId="34"/>
+      <p:bldP build="whole" bldLvl="1" animBg="1" rev="0" advAuto="0" spid="372" grpId="47"/>
+      <p:bldP build="whole" bldLvl="1" animBg="1" rev="0" advAuto="0" spid="473" grpId="22"/>
+      <p:bldP build="whole" bldLvl="1" animBg="1" rev="0" advAuto="0" spid="447" grpId="8"/>
+      <p:bldP build="whole" bldLvl="1" animBg="1" rev="0" advAuto="0" spid="471" grpId="27"/>
+      <p:bldP build="whole" bldLvl="1" animBg="1" rev="0" advAuto="0" spid="396" grpId="20"/>
+      <p:bldP build="whole" bldLvl="1" animBg="1" rev="0" advAuto="0" spid="445" grpId="9"/>
+      <p:bldP build="whole" bldLvl="1" animBg="1" rev="0" advAuto="0" spid="495" grpId="55"/>
+      <p:bldP build="whole" bldLvl="1" animBg="1" rev="0" advAuto="0" spid="435" grpId="54"/>
+      <p:bldP build="whole" bldLvl="1" animBg="1" rev="0" advAuto="0" spid="405" grpId="45"/>
+      <p:bldP build="whole" bldLvl="1" animBg="1" rev="0" advAuto="0" spid="491" grpId="58"/>
+      <p:bldP build="whole" bldLvl="1" animBg="1" rev="0" advAuto="0" spid="438" grpId="21"/>
       <p:bldP build="whole" bldLvl="1" animBg="1" rev="0" advAuto="0" spid="509" grpId="64"/>
-      <p:bldP build="whole" bldLvl="1" animBg="1" rev="0" advAuto="0" spid="455" grpId="41"/>
-      <p:bldP build="whole" bldLvl="1" animBg="1" rev="0" advAuto="0" spid="471" grpId="27"/>
-      <p:bldP build="whole" bldLvl="1" animBg="1" rev="0" advAuto="0" spid="402" grpId="17"/>
-      <p:bldP build="whole" bldLvl="1" animBg="1" rev="0" advAuto="0" spid="423" grpId="15"/>
-      <p:bldP build="whole" bldLvl="1" animBg="1" rev="0" advAuto="0" spid="357" grpId="32"/>
+      <p:bldP build="whole" bldLvl="1" animBg="1" rev="0" advAuto="0" spid="441" grpId="7"/>
+      <p:bldP build="whole" bldLvl="1" animBg="1" rev="0" advAuto="0" spid="453" grpId="12"/>
+      <p:bldP build="whole" bldLvl="1" animBg="1" rev="0" advAuto="0" spid="387" grpId="18"/>
       <p:bldP build="whole" bldLvl="1" animBg="1" rev="0" advAuto="0" spid="461" grpId="43"/>
-      <p:bldP build="whole" bldLvl="1" animBg="1" rev="0" advAuto="0" spid="479" grpId="38"/>
-      <p:bldP build="whole" bldLvl="1" animBg="1" rev="0" advAuto="0" spid="381" grpId="33"/>
-      <p:bldP build="whole" bldLvl="1" animBg="1" rev="0" advAuto="0" spid="393" grpId="16"/>
-      <p:bldP build="whole" bldLvl="1" animBg="1" rev="0" advAuto="0" spid="411" grpId="49"/>
-      <p:bldP build="whole" bldLvl="1" animBg="1" rev="0" advAuto="0" spid="465" grpId="26"/>
-      <p:bldP build="whole" bldLvl="1" animBg="1" rev="0" advAuto="0" spid="375" grpId="50"/>
-      <p:bldP build="whole" bldLvl="1" animBg="1" rev="0" advAuto="0" spid="449" grpId="10"/>
-      <p:bldP build="whole" bldLvl="1" animBg="1" rev="0" advAuto="0" spid="432" grpId="53"/>
-      <p:bldP build="whole" bldLvl="1" animBg="1" rev="0" advAuto="0" spid="469" grpId="23"/>
-      <p:bldP build="whole" bldLvl="1" animBg="1" rev="0" advAuto="0" spid="369" grpId="4"/>
-      <p:bldP build="whole" bldLvl="1" animBg="1" rev="0" advAuto="0" spid="457" grpId="42"/>
-      <p:bldP build="whole" bldLvl="1" animBg="1" rev="0" advAuto="0" spid="384" grpId="13"/>
-      <p:bldP build="whole" bldLvl="1" animBg="1" rev="0" advAuto="0" spid="435" grpId="54"/>
-      <p:bldP build="whole" bldLvl="1" animBg="1" rev="0" advAuto="0" spid="453" grpId="12"/>
-      <p:bldP build="whole" bldLvl="1" animBg="1" rev="0" advAuto="0" spid="495" grpId="55"/>
-      <p:bldP build="whole" bldLvl="1" animBg="1" rev="0" advAuto="0" spid="360" grpId="1"/>
-      <p:bldP build="whole" bldLvl="1" animBg="1" rev="0" advAuto="0" spid="414" grpId="34"/>
-      <p:bldP build="whole" bldLvl="1" animBg="1" rev="0" advAuto="0" spid="445" grpId="9"/>
-      <p:bldP build="whole" bldLvl="1" animBg="1" rev="0" advAuto="0" spid="463" grpId="25"/>
-      <p:bldP build="whole" bldLvl="1" animBg="1" rev="0" advAuto="0" spid="438" grpId="21"/>
-      <p:bldP build="whole" bldLvl="1" animBg="1" rev="0" advAuto="0" spid="491" grpId="58"/>
-      <p:bldP build="whole" bldLvl="1" animBg="1" rev="0" advAuto="0" spid="501" grpId="59"/>
-      <p:bldP build="whole" bldLvl="1" animBg="1" rev="0" advAuto="0" spid="503" grpId="61"/>
-      <p:bldP build="whole" bldLvl="1" animBg="1" rev="0" advAuto="0" spid="475" grpId="39"/>
-      <p:bldP build="whole" bldLvl="1" animBg="1" rev="0" advAuto="0" spid="396" grpId="20"/>
-      <p:bldP build="whole" bldLvl="1" animBg="1" rev="0" advAuto="0" spid="473" grpId="22"/>
-      <p:bldP build="whole" bldLvl="1" animBg="1" rev="0" advAuto="0" spid="483" grpId="28"/>
-      <p:bldP build="whole" bldLvl="1" animBg="1" rev="0" advAuto="0" spid="405" grpId="45"/>
-      <p:bldP build="whole" bldLvl="1" animBg="1" rev="0" advAuto="0" spid="481" grpId="37"/>
-      <p:bldP build="whole" bldLvl="1" animBg="1" rev="0" advAuto="0" spid="497" grpId="56"/>
-      <p:bldP build="whole" bldLvl="1" animBg="1" rev="0" advAuto="0" spid="387" grpId="18"/>
-      <p:bldP build="whole" bldLvl="1" animBg="1" rev="0" advAuto="0" spid="451" grpId="11"/>
-      <p:bldP build="whole" bldLvl="1" animBg="1" rev="0" advAuto="0" spid="439" grpId="6"/>
       <p:bldP build="whole" bldLvl="1" animBg="1" rev="0" advAuto="0" spid="363" grpId="2"/>
       <p:bldP build="whole" bldLvl="1" animBg="1" rev="0" advAuto="0" spid="426" grpId="51"/>
       <p:bldP build="whole" bldLvl="1" animBg="1" rev="0" advAuto="0" spid="417" grpId="35"/>
-      <p:bldP build="whole" bldLvl="1" animBg="1" rev="0" advAuto="0" spid="441" grpId="7"/>
+      <p:bldP build="whole" bldLvl="1" animBg="1" rev="0" advAuto="0" spid="357" grpId="32"/>
+      <p:bldP build="whole" bldLvl="1" animBg="1" rev="0" advAuto="0" spid="375" grpId="50"/>
+      <p:bldP build="whole" bldLvl="1" animBg="1" rev="0" advAuto="0" spid="489" grpId="31"/>
+      <p:bldP build="whole" bldLvl="1" animBg="1" rev="0" advAuto="0" spid="439" grpId="6"/>
       <p:bldP build="whole" bldLvl="1" animBg="1" rev="0" advAuto="0" spid="477" grpId="36"/>
+      <p:bldP build="whole" bldLvl="1" animBg="1" rev="0" advAuto="0" spid="369" grpId="4"/>
+      <p:bldP build="whole" bldLvl="1" animBg="1" rev="0" advAuto="0" spid="503" grpId="61"/>
+      <p:bldP build="whole" bldLvl="1" animBg="1" rev="0" advAuto="0" spid="420" grpId="14"/>
+      <p:bldP build="whole" bldLvl="1" animBg="1" rev="0" advAuto="0" spid="501" grpId="59"/>
+      <p:bldP build="whole" bldLvl="1" animBg="1" rev="0" advAuto="0" spid="455" grpId="41"/>
+      <p:bldP build="whole" bldLvl="1" animBg="1" rev="0" advAuto="0" spid="465" grpId="26"/>
+      <p:bldP build="whole" bldLvl="1" animBg="1" rev="0" advAuto="0" spid="479" grpId="38"/>
+      <p:bldP build="whole" bldLvl="1" animBg="1" rev="0" advAuto="0" spid="408" grpId="48"/>
+      <p:bldP build="whole" bldLvl="1" animBg="1" rev="0" advAuto="0" spid="390" grpId="19"/>
+      <p:bldP build="whole" bldLvl="1" animBg="1" rev="0" advAuto="0" spid="449" grpId="10"/>
+      <p:bldP build="whole" bldLvl="1" animBg="1" rev="0" advAuto="0" spid="483" grpId="28"/>
+      <p:bldP build="whole" bldLvl="1" animBg="1" rev="0" advAuto="0" spid="481" grpId="37"/>
+      <p:bldP build="whole" bldLvl="1" animBg="1" rev="0" advAuto="0" spid="378" grpId="44"/>
+      <p:bldP build="whole" bldLvl="1" animBg="1" rev="0" advAuto="0" spid="366" grpId="3"/>
+      <p:bldP build="whole" bldLvl="1" animBg="1" rev="0" advAuto="0" spid="429" grpId="52"/>
+      <p:bldP build="whole" bldLvl="1" animBg="1" rev="0" advAuto="0" spid="443" grpId="5"/>
+      <p:bldP build="whole" bldLvl="1" animBg="1" rev="0" advAuto="0" spid="485" grpId="29"/>
+      <p:bldP build="whole" bldLvl="1" animBg="1" rev="0" advAuto="0" spid="399" grpId="46"/>
+      <p:bldP build="whole" bldLvl="1" animBg="1" rev="0" advAuto="0" spid="505" grpId="62"/>
+      <p:bldP build="whole" bldLvl="1" animBg="1" rev="0" advAuto="0" spid="493" grpId="63"/>
+      <p:bldP build="whole" bldLvl="1" animBg="1" rev="0" advAuto="0" spid="463" grpId="25"/>
+      <p:bldP build="whole" bldLvl="1" animBg="1" rev="0" advAuto="0" spid="402" grpId="17"/>
+      <p:bldP build="whole" bldLvl="1" animBg="1" rev="0" advAuto="0" spid="467" grpId="24"/>
+      <p:bldP build="whole" bldLvl="1" animBg="1" rev="0" advAuto="0" spid="423" grpId="15"/>
+      <p:bldP build="whole" bldLvl="1" animBg="1" rev="0" advAuto="0" spid="381" grpId="33"/>
+      <p:bldP build="whole" bldLvl="1" animBg="1" rev="0" advAuto="0" spid="497" grpId="56"/>
       <p:bldP build="whole" bldLvl="1" animBg="1" rev="0" advAuto="0" spid="507" grpId="60"/>
-      <p:bldP build="whole" bldLvl="1" animBg="1" rev="0" advAuto="0" spid="467" grpId="24"/>
+      <p:bldP build="whole" bldLvl="1" animBg="1" rev="0" advAuto="0" spid="451" grpId="11"/>
+      <p:bldP build="whole" bldLvl="1" animBg="1" rev="0" advAuto="0" spid="393" grpId="16"/>
+      <p:bldP build="whole" bldLvl="1" animBg="1" rev="0" advAuto="0" spid="411" grpId="49"/>
+      <p:bldP build="whole" bldLvl="1" animBg="1" rev="0" advAuto="0" spid="459" grpId="40"/>
+      <p:bldP build="whole" bldLvl="1" animBg="1" rev="0" advAuto="0" spid="499" grpId="57"/>
+      <p:bldP build="whole" bldLvl="1" animBg="1" rev="0" advAuto="0" spid="432" grpId="53"/>
       <p:bldP build="whole" bldLvl="1" animBg="1" rev="0" advAuto="0" spid="487" grpId="30"/>
-      <p:bldP build="whole" bldLvl="1" animBg="1" rev="0" advAuto="0" spid="447" grpId="8"/>
-      <p:bldP build="whole" bldLvl="1" animBg="1" rev="0" advAuto="0" spid="420" grpId="14"/>
-      <p:bldP build="whole" bldLvl="1" animBg="1" rev="0" advAuto="0" spid="459" grpId="40"/>
-      <p:bldP build="whole" bldLvl="1" animBg="1" rev="0" advAuto="0" spid="485" grpId="29"/>
-      <p:bldP build="whole" bldLvl="1" animBg="1" rev="0" advAuto="0" spid="493" grpId="63"/>
-      <p:bldP build="whole" bldLvl="1" animBg="1" rev="0" advAuto="0" spid="429" grpId="52"/>
-      <p:bldP build="whole" bldLvl="1" animBg="1" rev="0" advAuto="0" spid="372" grpId="47"/>
-      <p:bldP build="whole" bldLvl="1" animBg="1" rev="0" advAuto="0" spid="408" grpId="48"/>
+      <p:bldP build="whole" bldLvl="1" animBg="1" rev="0" advAuto="0" spid="384" grpId="13"/>
+      <p:bldP build="whole" bldLvl="1" animBg="1" rev="0" advAuto="0" spid="457" grpId="42"/>
+      <p:bldP build="whole" bldLvl="1" animBg="1" rev="0" advAuto="0" spid="360" grpId="1"/>
+      <p:bldP build="whole" bldLvl="1" animBg="1" rev="0" advAuto="0" spid="475" grpId="39"/>
+      <p:bldP build="whole" bldLvl="1" animBg="1" rev="0" advAuto="0" spid="469" grpId="23"/>
     </p:bldLst>
   </p:timing>
 </p:sld>
@@ -28906,14 +28906,14 @@
       </p:par>
     </p:tnLst>
     <p:bldLst>
+      <p:bldP build="whole" bldLvl="1" animBg="1" rev="0" advAuto="0" spid="516" grpId="5"/>
+      <p:bldP build="whole" bldLvl="1" animBg="1" rev="0" advAuto="0" spid="522" grpId="1"/>
       <p:bldP build="whole" bldLvl="1" animBg="1" rev="0" advAuto="0" spid="531" grpId="2"/>
+      <p:bldP build="whole" bldLvl="1" animBg="1" rev="0" advAuto="0" spid="527" grpId="4"/>
+      <p:bldP build="whole" bldLvl="1" animBg="1" rev="0" advAuto="0" spid="526" grpId="7"/>
+      <p:bldP build="whole" bldLvl="1" animBg="1" rev="0" advAuto="0" spid="526" grpId="8"/>
       <p:bldP build="whole" bldLvl="1" animBg="1" rev="0" advAuto="0" spid="529" grpId="6"/>
-      <p:bldP build="whole" bldLvl="1" animBg="1" rev="0" advAuto="0" spid="527" grpId="4"/>
-      <p:bldP build="whole" bldLvl="1" animBg="1" rev="0" advAuto="0" spid="516" grpId="5"/>
       <p:bldP build="whole" bldLvl="1" animBg="1" rev="0" advAuto="0" spid="519" grpId="3"/>
-      <p:bldP build="whole" bldLvl="1" animBg="1" rev="0" advAuto="0" spid="526" grpId="7"/>
-      <p:bldP build="whole" bldLvl="1" animBg="1" rev="0" advAuto="0" spid="522" grpId="1"/>
-      <p:bldP build="whole" bldLvl="1" animBg="1" rev="0" advAuto="0" spid="526" grpId="8"/>
     </p:bldLst>
   </p:timing>
 </p:sld>
@@ -29016,7 +29016,7 @@
         </p:nvGrpSpPr>
         <p:grpSpPr>
           <a:xfrm>
-            <a:off x="1270000" y="4317293"/>
+            <a:off x="1270000" y="3936293"/>
             <a:ext cx="5071915" cy="1765652"/>
             <a:chOff x="0" y="0"/>
             <a:chExt cx="5071914" cy="1765651"/>
@@ -29180,7 +29180,7 @@
         </p:nvGrpSpPr>
         <p:grpSpPr>
           <a:xfrm>
-            <a:off x="1270000" y="5586610"/>
+            <a:off x="1270000" y="5205610"/>
             <a:ext cx="5071915" cy="1765653"/>
             <a:chOff x="0" y="0"/>
             <a:chExt cx="5071914" cy="1765651"/>
@@ -29344,7 +29344,7 @@
         </p:nvGrpSpPr>
         <p:grpSpPr>
           <a:xfrm>
-            <a:off x="1270000" y="8969566"/>
+            <a:off x="1270000" y="8207566"/>
             <a:ext cx="5071915" cy="1765653"/>
             <a:chOff x="0" y="0"/>
             <a:chExt cx="5071914" cy="1765651"/>
@@ -29508,7 +29508,7 @@
         </p:nvGrpSpPr>
         <p:grpSpPr>
           <a:xfrm>
-            <a:off x="1270000" y="10257829"/>
+            <a:off x="1270000" y="9495829"/>
             <a:ext cx="5071915" cy="1765653"/>
             <a:chOff x="0" y="0"/>
             <a:chExt cx="5071914" cy="1765651"/>
@@ -29672,7 +29672,7 @@
         </p:nvGrpSpPr>
         <p:grpSpPr>
           <a:xfrm>
-            <a:off x="1270000" y="11546092"/>
+            <a:off x="1270000" y="10784092"/>
             <a:ext cx="5071915" cy="1765653"/>
             <a:chOff x="0" y="0"/>
             <a:chExt cx="5071914" cy="1765651"/>
@@ -29836,7 +29836,7 @@
         </p:nvGrpSpPr>
         <p:grpSpPr>
           <a:xfrm>
-            <a:off x="1139726" y="3536041"/>
+            <a:off x="1139726" y="3155041"/>
             <a:ext cx="2579838" cy="1270001"/>
             <a:chOff x="0" y="503237"/>
             <a:chExt cx="2579837" cy="1270000"/>
@@ -29951,7 +29951,7 @@
         </p:nvGrpSpPr>
         <p:grpSpPr>
           <a:xfrm>
-            <a:off x="1139726" y="8169370"/>
+            <a:off x="1139726" y="7407370"/>
             <a:ext cx="2991990" cy="1270001"/>
             <a:chOff x="0" y="503237"/>
             <a:chExt cx="2991989" cy="1270000"/>
@@ -30058,6 +30058,170 @@
           </p:txBody>
         </p:sp>
       </p:grpSp>
+      <p:grpSp>
+        <p:nvGrpSpPr>
+          <p:cNvPr id="565" name="Group"/>
+          <p:cNvGrpSpPr/>
+          <p:nvPr/>
+        </p:nvGrpSpPr>
+        <p:grpSpPr>
+          <a:xfrm>
+            <a:off x="1270000" y="12072354"/>
+            <a:ext cx="5071915" cy="1765653"/>
+            <a:chOff x="0" y="0"/>
+            <a:chExt cx="5071914" cy="1765651"/>
+          </a:xfrm>
+        </p:grpSpPr>
+        <p:sp>
+          <p:nvSpPr>
+            <p:cNvPr id="562" name="Rectangle"/>
+            <p:cNvSpPr/>
+            <p:nvPr/>
+          </p:nvSpPr>
+          <p:spPr>
+            <a:xfrm>
+              <a:off x="1038" y="-1"/>
+              <a:ext cx="5070877" cy="991305"/>
+            </a:xfrm>
+            <a:prstGeom prst="rect">
+              <a:avLst/>
+            </a:prstGeom>
+            <a:solidFill>
+              <a:srgbClr val="263238"/>
+            </a:solidFill>
+            <a:ln w="12700" cap="flat">
+              <a:noFill/>
+              <a:miter lim="400000"/>
+            </a:ln>
+            <a:effectLst/>
+          </p:spPr>
+          <p:txBody>
+            <a:bodyPr wrap="square" lIns="71437" tIns="71437" rIns="71437" bIns="71437" numCol="1" anchor="ctr">
+              <a:noAutofit/>
+            </a:bodyPr>
+            <a:lstStyle/>
+            <a:p>
+              <a:pPr algn="ctr">
+                <a:lnSpc>
+                  <a:spcPct val="80000"/>
+                </a:lnSpc>
+                <a:spcBef>
+                  <a:spcPts val="0"/>
+                </a:spcBef>
+                <a:defRPr cap="all" sz="3800">
+                  <a:solidFill>
+                    <a:srgbClr val="263238"/>
+                  </a:solidFill>
+                  <a:latin typeface="+mn-lt"/>
+                  <a:ea typeface="+mn-ea"/>
+                  <a:cs typeface="+mn-cs"/>
+                  <a:sym typeface="DIN Condensed"/>
+                </a:defRPr>
+              </a:pPr>
+            </a:p>
+          </p:txBody>
+        </p:sp>
+        <p:sp>
+          <p:nvSpPr>
+            <p:cNvPr id="563" name="types"/>
+            <p:cNvSpPr/>
+            <p:nvPr/>
+          </p:nvSpPr>
+          <p:spPr>
+            <a:xfrm>
+              <a:off x="844184" y="495651"/>
+              <a:ext cx="1270001" cy="1270001"/>
+            </a:xfrm>
+            <a:prstGeom prst="line">
+              <a:avLst/>
+            </a:prstGeom>
+            <a:noFill/>
+            <a:ln w="12700" cap="flat">
+              <a:noFill/>
+              <a:miter lim="400000"/>
+            </a:ln>
+            <a:effectLst/>
+            <a:extLst>
+              <a:ext uri="{C572A759-6A51-4108-AA02-DFA0A04FC94B}">
+                <ma14:wrappingTextBoxFlag xmlns:ma14="http://schemas.microsoft.com/office/mac/drawingml/2011/main" val="1"/>
+              </a:ext>
+            </a:extLst>
+          </p:spPr>
+          <p:txBody>
+            <a:bodyPr wrap="none" lIns="71437" tIns="71437" rIns="71437" bIns="71437" numCol="1" anchor="ctr">
+              <a:spAutoFit/>
+            </a:bodyPr>
+            <a:lstStyle>
+              <a:lvl1pPr>
+                <a:defRPr sz="4200">
+                  <a:solidFill>
+                    <a:srgbClr val="FFFFFF"/>
+                  </a:solidFill>
+                  <a:latin typeface="Meslo LG M for Powerline"/>
+                  <a:ea typeface="Meslo LG M for Powerline"/>
+                  <a:cs typeface="Meslo LG M for Powerline"/>
+                  <a:sym typeface="Meslo LG M for Powerline"/>
+                </a:defRPr>
+              </a:lvl1pPr>
+            </a:lstStyle>
+            <a:p>
+              <a:pPr/>
+              <a:r>
+                <a:t>types</a:t>
+              </a:r>
+            </a:p>
+          </p:txBody>
+        </p:sp>
+        <p:sp>
+          <p:nvSpPr>
+            <p:cNvPr id="564" name="Rectangle"/>
+            <p:cNvSpPr/>
+            <p:nvPr/>
+          </p:nvSpPr>
+          <p:spPr>
+            <a:xfrm>
+              <a:off x="0" y="0"/>
+              <a:ext cx="530148" cy="991304"/>
+            </a:xfrm>
+            <a:prstGeom prst="rect">
+              <a:avLst/>
+            </a:prstGeom>
+            <a:solidFill>
+              <a:srgbClr val="03A9F4"/>
+            </a:solidFill>
+            <a:ln w="12700" cap="flat">
+              <a:noFill/>
+              <a:miter lim="400000"/>
+            </a:ln>
+            <a:effectLst/>
+          </p:spPr>
+          <p:txBody>
+            <a:bodyPr wrap="square" lIns="71437" tIns="71437" rIns="71437" bIns="71437" numCol="1" anchor="ctr">
+              <a:noAutofit/>
+            </a:bodyPr>
+            <a:lstStyle/>
+            <a:p>
+              <a:pPr algn="ctr">
+                <a:lnSpc>
+                  <a:spcPct val="80000"/>
+                </a:lnSpc>
+                <a:spcBef>
+                  <a:spcPts val="0"/>
+                </a:spcBef>
+                <a:defRPr cap="all" sz="3800">
+                  <a:solidFill>
+                    <a:srgbClr val="FFFFFF"/>
+                  </a:solidFill>
+                  <a:latin typeface="+mn-lt"/>
+                  <a:ea typeface="+mn-ea"/>
+                  <a:cs typeface="+mn-cs"/>
+                  <a:sym typeface="DIN Condensed"/>
+                </a:defRPr>
+              </a:pPr>
+            </a:p>
+          </p:txBody>
+        </p:sp>
+      </p:grpSp>
     </p:spTree>
   </p:cSld>
   <p:clrMapOvr>
@@ -30592,6 +30756,87 @@
                             </p:childTnLst>
                           </p:cTn>
                         </p:par>
+                        <p:par>
+                          <p:cTn id="38" fill="hold">
+                            <p:stCondLst>
+                              <p:cond delay="2800"/>
+                            </p:stCondLst>
+                            <p:childTnLst>
+                              <p:par>
+                                <p:cTn id="39" presetClass="entr" nodeType="afterEffect" presetSubtype="8" presetID="2" grpId="8" fill="hold">
+                                  <p:stCondLst>
+                                    <p:cond delay="0"/>
+                                  </p:stCondLst>
+                                  <p:iterate type="el" backwards="0">
+                                    <p:tmAbs val="0"/>
+                                  </p:iterate>
+                                  <p:childTnLst>
+                                    <p:set>
+                                      <p:cBhvr>
+                                        <p:cTn id="40" fill="hold"/>
+                                        <p:tgtEl>
+                                          <p:spTgt spid="565"/>
+                                        </p:tgtEl>
+                                        <p:attrNameLst>
+                                          <p:attrName>style.visibility</p:attrName>
+                                        </p:attrNameLst>
+                                      </p:cBhvr>
+                                      <p:to>
+                                        <p:strVal val="visible"/>
+                                      </p:to>
+                                    </p:set>
+                                    <p:anim calcmode="lin" valueType="num">
+                                      <p:cBhvr>
+                                        <p:cTn id="41" dur="700" fill="hold"/>
+                                        <p:tgtEl>
+                                          <p:spTgt spid="565"/>
+                                        </p:tgtEl>
+                                        <p:attrNameLst>
+                                          <p:attrName>ppt_x</p:attrName>
+                                        </p:attrNameLst>
+                                      </p:cBhvr>
+                                      <p:tavLst>
+                                        <p:tav tm="0">
+                                          <p:val>
+                                            <p:strVal val="0-#ppt_w/2"/>
+                                          </p:val>
+                                        </p:tav>
+                                        <p:tav tm="100000">
+                                          <p:val>
+                                            <p:strVal val="#ppt_x"/>
+                                          </p:val>
+                                        </p:tav>
+                                      </p:tavLst>
+                                    </p:anim>
+                                    <p:anim calcmode="lin" valueType="num">
+                                      <p:cBhvr>
+                                        <p:cTn id="42" dur="700" fill="hold"/>
+                                        <p:tgtEl>
+                                          <p:spTgt spid="565"/>
+                                        </p:tgtEl>
+                                        <p:attrNameLst>
+                                          <p:attrName>ppt_y</p:attrName>
+                                        </p:attrNameLst>
+                                      </p:cBhvr>
+                                      <p:tavLst>
+                                        <p:tav tm="0">
+                                          <p:val>
+                                            <p:strVal val="#ppt_y"/>
+                                          </p:val>
+                                        </p:tav>
+                                        <p:tav tm="100000">
+                                          <p:val>
+                                            <p:strVal val="#ppt_y"/>
+                                          </p:val>
+                                        </p:tav>
+                                      </p:tavLst>
+                                    </p:anim>
+                                  </p:childTnLst>
+                                </p:cTn>
+                              </p:par>
+                            </p:childTnLst>
+                          </p:cTn>
+                        </p:par>
                       </p:childTnLst>
                     </p:cTn>
                   </p:par>
@@ -30617,13 +30862,14 @@
       </p:par>
     </p:tnLst>
     <p:bldLst>
+      <p:bldP build="whole" bldLvl="1" animBg="1" rev="0" advAuto="0" spid="543" grpId="3"/>
+      <p:bldP build="whole" bldLvl="1" animBg="1" rev="0" advAuto="0" spid="539" grpId="2"/>
+      <p:bldP build="whole" bldLvl="1" animBg="1" rev="0" advAuto="0" spid="565" grpId="8"/>
+      <p:bldP build="whole" bldLvl="1" animBg="1" rev="0" advAuto="0" spid="555" grpId="7"/>
+      <p:bldP build="whole" bldLvl="1" animBg="1" rev="0" advAuto="0" spid="551" grpId="6"/>
       <p:bldP build="whole" bldLvl="1" animBg="1" rev="0" advAuto="0" spid="561" grpId="4"/>
       <p:bldP build="whole" bldLvl="1" animBg="1" rev="0" advAuto="0" spid="558" grpId="1"/>
-      <p:bldP build="whole" bldLvl="1" animBg="1" rev="0" advAuto="0" spid="543" grpId="3"/>
-      <p:bldP build="whole" bldLvl="1" animBg="1" rev="0" advAuto="0" spid="539" grpId="2"/>
       <p:bldP build="whole" bldLvl="1" animBg="1" rev="0" advAuto="0" spid="547" grpId="5"/>
-      <p:bldP build="whole" bldLvl="1" animBg="1" rev="0" advAuto="0" spid="551" grpId="6"/>
-      <p:bldP build="whole" bldLvl="1" animBg="1" rev="0" advAuto="0" spid="555" grpId="7"/>
     </p:bldLst>
   </p:timing>
 </p:sld>

</xml_diff>